<commit_message>
correct the calcIdealWorstCaseValueByPath to calculate 5%-tile if the vecQuantiles are not specified
update the Compare_Statistical_Worstcase_Vs_RefPrice.png to include the 50%-tile, 5%-tile, and 2%-tile.

update the powerpoint slide.
</commit_message>
<xml_diff>
--- a/ppt/SPP TCR Reference Price Calculation.pptx
+++ b/ppt/SPP TCR Reference Price Calculation.pptx
@@ -24,7 +24,7 @@
     <p:sldId id="275" r:id="rId15"/>
     <p:sldId id="292" r:id="rId16"/>
     <p:sldId id="276" r:id="rId17"/>
-    <p:sldId id="278" r:id="rId18"/>
+    <p:sldId id="294" r:id="rId18"/>
     <p:sldId id="288" r:id="rId19"/>
     <p:sldId id="289" r:id="rId20"/>
     <p:sldId id="291" r:id="rId21"/>
@@ -225,7 +225,7 @@
           <a:p>
             <a:fld id="{DC9FF35D-67E9-443F-A58B-481559A40312}" type="datetimeFigureOut">
               <a:rPr lang="en-US" smtClean="0"/>
-              <a:t>5/11/2017</a:t>
+              <a:t>5/15/2017</a:t>
             </a:fld>
             <a:endParaRPr lang="en-US"/>
           </a:p>
@@ -1028,7 +1028,7 @@
           <a:p>
             <a:fld id="{15F1E40C-1ADA-49EE-97E6-66D3E249BA19}" type="datetime1">
               <a:rPr lang="en-US" smtClean="0"/>
-              <a:t>5/11/2017</a:t>
+              <a:t>5/15/2017</a:t>
             </a:fld>
             <a:endParaRPr lang="en-US"/>
           </a:p>
@@ -1391,7 +1391,7 @@
             <a:fld id="{0F631D50-F0AA-46A8-84F7-AFEADD7F3562}" type="datetime1">
               <a:rPr lang="en-US" smtClean="0"/>
               <a:pPr/>
-              <a:t>5/11/2017</a:t>
+              <a:t>5/15/2017</a:t>
             </a:fld>
             <a:endParaRPr lang="en-US"/>
           </a:p>
@@ -1780,7 +1780,7 @@
           <a:p>
             <a:fld id="{66269BD1-B55D-45D2-A064-5404BCD67C62}" type="datetime1">
               <a:rPr lang="en-US" smtClean="0"/>
-              <a:t>5/11/2017</a:t>
+              <a:t>5/15/2017</a:t>
             </a:fld>
             <a:endParaRPr lang="en-US"/>
           </a:p>
@@ -2125,7 +2125,7 @@
           <a:p>
             <a:fld id="{A897F7A3-A02E-43B7-A35D-28422C891F34}" type="datetime1">
               <a:rPr lang="en-US" smtClean="0"/>
-              <a:t>5/11/2017</a:t>
+              <a:t>5/15/2017</a:t>
             </a:fld>
             <a:endParaRPr lang="en-US"/>
           </a:p>
@@ -2305,7 +2305,7 @@
           <a:p>
             <a:fld id="{D3235EA8-B38B-49E7-A85C-5CBC6D007238}" type="datetime1">
               <a:rPr lang="en-US" smtClean="0"/>
-              <a:t>5/11/2017</a:t>
+              <a:t>5/15/2017</a:t>
             </a:fld>
             <a:endParaRPr lang="en-US"/>
           </a:p>
@@ -2587,7 +2587,7 @@
           <a:p>
             <a:fld id="{9DAC76DD-E0E5-4982-B60F-3E1F6AAD9050}" type="datetime1">
               <a:rPr lang="en-US" smtClean="0"/>
-              <a:t>5/11/2017</a:t>
+              <a:t>5/15/2017</a:t>
             </a:fld>
             <a:endParaRPr lang="en-US"/>
           </a:p>
@@ -3021,7 +3021,7 @@
           <a:p>
             <a:r>
               <a:rPr lang="en-US" dirty="0" smtClean="0"/>
-              <a:t>5/11/2017</a:t>
+              <a:t>5/---/2017</a:t>
             </a:r>
             <a:endParaRPr lang="en-US" dirty="0"/>
           </a:p>
@@ -3384,7 +3384,7 @@
           <a:p>
             <a:fld id="{F5C0FD1E-3C60-41B6-B28F-CC9190028EC6}" type="datetime1">
               <a:rPr lang="en-US" smtClean="0"/>
-              <a:t>5/11/2017</a:t>
+              <a:t>5/15/2017</a:t>
             </a:fld>
             <a:endParaRPr lang="en-US"/>
           </a:p>
@@ -4194,7 +4194,7 @@
           <a:p>
             <a:fld id="{0E7351DC-D08B-471F-A63F-48C7CB5F0F4B}" type="datetime1">
               <a:rPr lang="en-US" smtClean="0"/>
-              <a:t>5/11/2017</a:t>
+              <a:t>5/15/2017</a:t>
             </a:fld>
             <a:endParaRPr lang="en-US"/>
           </a:p>
@@ -6897,7 +6897,7 @@
           <a:p>
             <a:fld id="{B98CDE6E-B057-427D-9091-9156558AC489}" type="datetime1">
               <a:rPr lang="en-US" smtClean="0"/>
-              <a:t>5/11/2017</a:t>
+              <a:t>5/15/2017</a:t>
             </a:fld>
             <a:endParaRPr lang="en-US"/>
           </a:p>
@@ -7380,7 +7380,7 @@
           <a:p>
             <a:fld id="{9755A163-F46C-4E1E-8BEB-8FD339A02777}" type="datetime1">
               <a:rPr lang="en-US" smtClean="0"/>
-              <a:t>5/11/2017</a:t>
+              <a:t>5/15/2017</a:t>
             </a:fld>
             <a:endParaRPr lang="en-US"/>
           </a:p>
@@ -7885,7 +7885,7 @@
           <a:p>
             <a:fld id="{D78AE1DB-9BFB-4075-9AE4-DA80E04FCFC0}" type="datetime1">
               <a:rPr lang="en-US" smtClean="0"/>
-              <a:t>5/11/2017</a:t>
+              <a:t>5/15/2017</a:t>
             </a:fld>
             <a:endParaRPr lang="en-US"/>
           </a:p>
@@ -8035,7 +8035,7 @@
           <a:p>
             <a:fld id="{15F1E40C-1ADA-49EE-97E6-66D3E249BA19}" type="datetime1">
               <a:rPr lang="en-US" smtClean="0"/>
-              <a:t>5/11/2017</a:t>
+              <a:t>5/15/2017</a:t>
             </a:fld>
             <a:endParaRPr lang="en-US"/>
           </a:p>
@@ -8371,7 +8371,7 @@
           <a:p>
             <a:fld id="{1A77BCBE-5264-4BF6-B61B-E810E9F10A32}" type="datetime1">
               <a:rPr lang="en-US" smtClean="0"/>
-              <a:t>5/11/2017</a:t>
+              <a:t>5/15/2017</a:t>
             </a:fld>
             <a:endParaRPr lang="en-US"/>
           </a:p>
@@ -8440,7 +8440,7 @@
       </p:grpSpPr>
       <p:pic>
         <p:nvPicPr>
-          <p:cNvPr id="7" name="Content Placeholder 6"/>
+          <p:cNvPr id="21" name="Content Placeholder 6"/>
           <p:cNvPicPr>
             <a:picLocks noGrp="1" noChangeAspect="1"/>
           </p:cNvPicPr>
@@ -8449,18 +8449,21 @@
           </p:nvPr>
         </p:nvPicPr>
         <p:blipFill rotWithShape="1">
-          <a:blip r:embed="rId2"/>
-          <a:srcRect l="2830" b="3165"/>
+          <a:blip r:embed="rId2" cstate="print">
+            <a:extLst>
+              <a:ext uri="{28A0092B-C50C-407E-A947-70E740481C1C}">
+                <a14:useLocalDpi xmlns:a14="http://schemas.microsoft.com/office/drawing/2010/main" val="0"/>
+              </a:ext>
+            </a:extLst>
+          </a:blip>
+          <a:srcRect l="4570" b="3400"/>
           <a:stretch/>
         </p:blipFill>
         <p:spPr>
           <a:xfrm>
-            <a:off x="571500" y="2160756"/>
-            <a:ext cx="3924300" cy="3297069"/>
+            <a:off x="712102" y="2121687"/>
+            <a:ext cx="3329976" cy="3370798"/>
           </a:xfrm>
-          <a:prstGeom prst="rect">
-            <a:avLst/>
-          </a:prstGeom>
         </p:spPr>
       </p:pic>
       <p:sp>
@@ -8504,14 +8507,14 @@
             <p:ph sz="half" idx="2"/>
             <p:extLst>
               <p:ext uri="{D42A27DB-BD31-4B8C-83A1-F6EECF244321}">
-                <p14:modId xmlns:p14="http://schemas.microsoft.com/office/powerpoint/2010/main" val="209945715"/>
+                <p14:modId xmlns:p14="http://schemas.microsoft.com/office/powerpoint/2010/main" val="2527782186"/>
               </p:ext>
             </p:extLst>
           </p:nvPr>
         </p:nvGraphicFramePr>
         <p:xfrm>
           <a:off x="4550835" y="1636240"/>
-          <a:ext cx="4038600" cy="1615440"/>
+          <a:ext cx="4038599" cy="1752600"/>
         </p:xfrm>
         <a:graphic>
           <a:graphicData uri="http://schemas.openxmlformats.org/drawingml/2006/table">
@@ -8520,31 +8523,45 @@
                 <a:tableStyleId>{5C22544A-7EE6-4342-B048-85BDC9FD1C3A}</a:tableStyleId>
               </a:tblPr>
               <a:tblGrid>
-                <a:gridCol w="1253122">
+                <a:gridCol w="900729">
                   <a:extLst>
                     <a:ext uri="{9D8B030D-6E8A-4147-A177-3AD203B41FA5}">
                       <a16:colId xmlns:a16="http://schemas.microsoft.com/office/drawing/2014/main" val="1720791856"/>
                     </a:ext>
                   </a:extLst>
                 </a:gridCol>
-                <a:gridCol w="1205450">
+                <a:gridCol w="866462">
                   <a:extLst>
                     <a:ext uri="{9D8B030D-6E8A-4147-A177-3AD203B41FA5}">
                       <a16:colId xmlns:a16="http://schemas.microsoft.com/office/drawing/2014/main" val="3076233498"/>
                     </a:ext>
                   </a:extLst>
                 </a:gridCol>
-                <a:gridCol w="790014">
+                <a:gridCol w="567852">
                   <a:extLst>
                     <a:ext uri="{9D8B030D-6E8A-4147-A177-3AD203B41FA5}">
                       <a16:colId xmlns:a16="http://schemas.microsoft.com/office/drawing/2014/main" val="2525463396"/>
                     </a:ext>
                   </a:extLst>
                 </a:gridCol>
-                <a:gridCol w="790014">
+                <a:gridCol w="567852">
                   <a:extLst>
                     <a:ext uri="{9D8B030D-6E8A-4147-A177-3AD203B41FA5}">
                       <a16:colId xmlns:a16="http://schemas.microsoft.com/office/drawing/2014/main" val="178231948"/>
+                    </a:ext>
+                  </a:extLst>
+                </a:gridCol>
+                <a:gridCol w="567852">
+                  <a:extLst>
+                    <a:ext uri="{9D8B030D-6E8A-4147-A177-3AD203B41FA5}">
+                      <a16:colId xmlns:a16="http://schemas.microsoft.com/office/drawing/2014/main" val="398921545"/>
+                    </a:ext>
+                  </a:extLst>
+                </a:gridCol>
+                <a:gridCol w="567852">
+                  <a:extLst>
+                    <a:ext uri="{9D8B030D-6E8A-4147-A177-3AD203B41FA5}">
+                      <a16:colId xmlns:a16="http://schemas.microsoft.com/office/drawing/2014/main" val="3126656325"/>
                     </a:ext>
                   </a:extLst>
                 </a:gridCol>
@@ -8623,11 +8640,69 @@
                       </a:pPr>
                       <a:r>
                         <a:rPr lang="en-US" sz="900" dirty="0" smtClean="0"/>
-                        <a:t>Statistical</a:t>
+                        <a:t>5%-tile</a:t>
                       </a:r>
+                      <a:endParaRPr lang="en-US" sz="900" dirty="0" smtClean="0"/>
+                    </a:p>
+                  </a:txBody>
+                  <a:tcPr/>
+                </a:tc>
+                <a:tc>
+                  <a:txBody>
+                    <a:bodyPr/>
+                    <a:lstStyle/>
+                    <a:p>
+                      <a:pPr marL="0" marR="0" indent="0" algn="ctr" defTabSz="385763" rtl="0" eaLnBrk="1" fontAlgn="auto" latinLnBrk="0" hangingPunct="1">
+                        <a:lnSpc>
+                          <a:spcPct val="100000"/>
+                        </a:lnSpc>
+                        <a:spcBef>
+                          <a:spcPts val="0"/>
+                        </a:spcBef>
+                        <a:spcAft>
+                          <a:spcPts val="0"/>
+                        </a:spcAft>
+                        <a:buClrTx/>
+                        <a:buSzTx/>
+                        <a:buFontTx/>
+                        <a:buNone/>
+                        <a:tabLst/>
+                        <a:defRPr/>
+                      </a:pPr>
                       <a:r>
-                        <a:rPr lang="en-US" sz="900" baseline="0" dirty="0" smtClean="0"/>
-                        <a:t> Worst Case in $/MWh</a:t>
+                        <a:rPr lang="en-US" sz="900" dirty="0" smtClean="0"/>
+                        <a:t>2%-tile</a:t>
+                      </a:r>
+                      <a:endParaRPr lang="en-US" sz="900" dirty="0" smtClean="0"/>
+                    </a:p>
+                  </a:txBody>
+                  <a:tcPr/>
+                </a:tc>
+                <a:tc>
+                  <a:txBody>
+                    <a:bodyPr/>
+                    <a:lstStyle/>
+                    <a:p>
+                      <a:pPr marL="0" marR="0" indent="0" algn="ctr" defTabSz="385763" rtl="0" eaLnBrk="1" fontAlgn="auto" latinLnBrk="0" hangingPunct="1">
+                        <a:lnSpc>
+                          <a:spcPct val="100000"/>
+                        </a:lnSpc>
+                        <a:spcBef>
+                          <a:spcPts val="0"/>
+                        </a:spcBef>
+                        <a:spcAft>
+                          <a:spcPts val="0"/>
+                        </a:spcAft>
+                        <a:buClrTx/>
+                        <a:buSzTx/>
+                        <a:buFontTx/>
+                        <a:buNone/>
+                        <a:tabLst/>
+                        <a:defRPr/>
+                      </a:pPr>
+                      <a:r>
+                        <a:rPr lang="en-US" sz="900" dirty="0" smtClean="0"/>
+                        <a:t>50%-tile</a:t>
                       </a:r>
                       <a:endParaRPr lang="en-US" sz="900" dirty="0" smtClean="0"/>
                     </a:p>
@@ -8680,6 +8755,36 @@
                       <a:r>
                         <a:rPr lang="en-US" sz="900" dirty="0" smtClean="0"/>
                         <a:t>31.28</a:t>
+                      </a:r>
+                      <a:endParaRPr lang="en-US" sz="900" dirty="0"/>
+                    </a:p>
+                  </a:txBody>
+                  <a:tcPr/>
+                </a:tc>
+                <a:tc>
+                  <a:txBody>
+                    <a:bodyPr/>
+                    <a:lstStyle/>
+                    <a:p>
+                      <a:pPr algn="ctr"/>
+                      <a:r>
+                        <a:rPr lang="en-US" sz="900" dirty="0" smtClean="0"/>
+                        <a:t>30.53</a:t>
+                      </a:r>
+                      <a:endParaRPr lang="en-US" sz="900" dirty="0"/>
+                    </a:p>
+                  </a:txBody>
+                  <a:tcPr/>
+                </a:tc>
+                <a:tc>
+                  <a:txBody>
+                    <a:bodyPr/>
+                    <a:lstStyle/>
+                    <a:p>
+                      <a:pPr algn="ctr"/>
+                      <a:r>
+                        <a:rPr lang="en-US" sz="900" dirty="0" smtClean="0"/>
+                        <a:t>30.53</a:t>
                       </a:r>
                       <a:endParaRPr lang="en-US" sz="900" dirty="0"/>
                     </a:p>
@@ -8761,6 +8866,36 @@
                       <a:pPr algn="ctr"/>
                       <a:r>
                         <a:rPr lang="en-US" sz="900" dirty="0" smtClean="0"/>
+                        <a:t>24.35</a:t>
+                      </a:r>
+                      <a:endParaRPr lang="en-US" sz="900" dirty="0"/>
+                    </a:p>
+                  </a:txBody>
+                  <a:tcPr/>
+                </a:tc>
+                <a:tc>
+                  <a:txBody>
+                    <a:bodyPr/>
+                    <a:lstStyle/>
+                    <a:p>
+                      <a:pPr algn="ctr"/>
+                      <a:r>
+                        <a:rPr lang="en-US" sz="900" dirty="0" smtClean="0"/>
+                        <a:t>24.35</a:t>
+                      </a:r>
+                      <a:endParaRPr lang="en-US" sz="900" dirty="0"/>
+                    </a:p>
+                  </a:txBody>
+                  <a:tcPr/>
+                </a:tc>
+                <a:tc>
+                  <a:txBody>
+                    <a:bodyPr/>
+                    <a:lstStyle/>
+                    <a:p>
+                      <a:pPr algn="ctr"/>
+                      <a:r>
+                        <a:rPr lang="en-US" sz="900" dirty="0" smtClean="0"/>
                         <a:t>25.65</a:t>
                       </a:r>
                       <a:endParaRPr lang="en-US" sz="900" dirty="0"/>
@@ -8828,6 +8963,36 @@
                       <a:pPr algn="ctr"/>
                       <a:r>
                         <a:rPr lang="en-US" sz="900" dirty="0" smtClean="0"/>
+                        <a:t>18.87</a:t>
+                      </a:r>
+                      <a:endParaRPr lang="en-US" sz="900" dirty="0"/>
+                    </a:p>
+                  </a:txBody>
+                  <a:tcPr/>
+                </a:tc>
+                <a:tc>
+                  <a:txBody>
+                    <a:bodyPr/>
+                    <a:lstStyle/>
+                    <a:p>
+                      <a:pPr algn="ctr"/>
+                      <a:r>
+                        <a:rPr lang="en-US" sz="900" dirty="0" smtClean="0"/>
+                        <a:t>18.82</a:t>
+                      </a:r>
+                      <a:endParaRPr lang="en-US" sz="900" dirty="0"/>
+                    </a:p>
+                  </a:txBody>
+                  <a:tcPr/>
+                </a:tc>
+                <a:tc>
+                  <a:txBody>
+                    <a:bodyPr/>
+                    <a:lstStyle/>
+                    <a:p>
+                      <a:pPr algn="ctr"/>
+                      <a:r>
+                        <a:rPr lang="en-US" sz="900" dirty="0" smtClean="0"/>
                         <a:t>19.72</a:t>
                       </a:r>
                       <a:endParaRPr lang="en-US" sz="900" dirty="0"/>
@@ -8926,8 +9091,8 @@
         </p:nvCxnSpPr>
         <p:spPr>
           <a:xfrm>
-            <a:off x="712261" y="3517900"/>
-            <a:ext cx="3776132" cy="0"/>
+            <a:off x="861060" y="3517900"/>
+            <a:ext cx="3118276" cy="0"/>
           </a:xfrm>
           <a:prstGeom prst="line">
             <a:avLst/>
@@ -8955,9 +9120,9 @@
           <p:nvPr/>
         </p:nvCxnSpPr>
         <p:spPr>
-          <a:xfrm flipH="1" flipV="1">
-            <a:off x="1862668" y="2211794"/>
-            <a:ext cx="16933" cy="3097891"/>
+          <a:xfrm flipV="1">
+            <a:off x="1872520" y="2146043"/>
+            <a:ext cx="0" cy="3262068"/>
           </a:xfrm>
           <a:prstGeom prst="line">
             <a:avLst/>
@@ -8987,14 +9152,14 @@
           <p:nvPr>
             <p:extLst>
               <p:ext uri="{D42A27DB-BD31-4B8C-83A1-F6EECF244321}">
-                <p14:modId xmlns:p14="http://schemas.microsoft.com/office/powerpoint/2010/main" val="124309081"/>
+                <p14:modId xmlns:p14="http://schemas.microsoft.com/office/powerpoint/2010/main" val="1767118142"/>
               </p:ext>
             </p:extLst>
           </p:nvPr>
         </p:nvGraphicFramePr>
         <p:xfrm>
           <a:off x="4521203" y="3850858"/>
-          <a:ext cx="4038600" cy="1244600"/>
+          <a:ext cx="4038602" cy="1381760"/>
         </p:xfrm>
         <a:graphic>
           <a:graphicData uri="http://schemas.openxmlformats.org/drawingml/2006/table">
@@ -9003,31 +9168,45 @@
                 <a:tableStyleId>{5C22544A-7EE6-4342-B048-85BDC9FD1C3A}</a:tableStyleId>
               </a:tblPr>
               <a:tblGrid>
-                <a:gridCol w="1230908">
+                <a:gridCol w="880488">
                   <a:extLst>
                     <a:ext uri="{9D8B030D-6E8A-4147-A177-3AD203B41FA5}">
                       <a16:colId xmlns:a16="http://schemas.microsoft.com/office/drawing/2014/main" val="1720791856"/>
                     </a:ext>
                   </a:extLst>
                 </a:gridCol>
-                <a:gridCol w="1200390">
+                <a:gridCol w="858658">
                   <a:extLst>
                     <a:ext uri="{9D8B030D-6E8A-4147-A177-3AD203B41FA5}">
                       <a16:colId xmlns:a16="http://schemas.microsoft.com/office/drawing/2014/main" val="3076233498"/>
                     </a:ext>
                   </a:extLst>
                 </a:gridCol>
-                <a:gridCol w="803651">
+                <a:gridCol w="574864">
                   <a:extLst>
                     <a:ext uri="{9D8B030D-6E8A-4147-A177-3AD203B41FA5}">
                       <a16:colId xmlns:a16="http://schemas.microsoft.com/office/drawing/2014/main" val="2525463396"/>
                     </a:ext>
                   </a:extLst>
                 </a:gridCol>
-                <a:gridCol w="803651">
+                <a:gridCol w="574864">
                   <a:extLst>
                     <a:ext uri="{9D8B030D-6E8A-4147-A177-3AD203B41FA5}">
                       <a16:colId xmlns:a16="http://schemas.microsoft.com/office/drawing/2014/main" val="2987825150"/>
+                    </a:ext>
+                  </a:extLst>
+                </a:gridCol>
+                <a:gridCol w="574864">
+                  <a:extLst>
+                    <a:ext uri="{9D8B030D-6E8A-4147-A177-3AD203B41FA5}">
+                      <a16:colId xmlns:a16="http://schemas.microsoft.com/office/drawing/2014/main" val="3452109494"/>
+                    </a:ext>
+                  </a:extLst>
+                </a:gridCol>
+                <a:gridCol w="574864">
+                  <a:extLst>
+                    <a:ext uri="{9D8B030D-6E8A-4147-A177-3AD203B41FA5}">
+                      <a16:colId xmlns:a16="http://schemas.microsoft.com/office/drawing/2014/main" val="2342233279"/>
                     </a:ext>
                   </a:extLst>
                 </a:gridCol>
@@ -9087,15 +9266,90 @@
                     <a:bodyPr/>
                     <a:lstStyle/>
                     <a:p>
-                      <a:pPr algn="ctr"/>
+                      <a:pPr marL="0" marR="0" indent="0" algn="ctr" defTabSz="385763" rtl="0" eaLnBrk="1" fontAlgn="auto" latinLnBrk="0" hangingPunct="1">
+                        <a:lnSpc>
+                          <a:spcPct val="100000"/>
+                        </a:lnSpc>
+                        <a:spcBef>
+                          <a:spcPts val="0"/>
+                        </a:spcBef>
+                        <a:spcAft>
+                          <a:spcPts val="0"/>
+                        </a:spcAft>
+                        <a:buClrTx/>
+                        <a:buSzTx/>
+                        <a:buFontTx/>
+                        <a:buNone/>
+                        <a:tabLst/>
+                        <a:defRPr/>
+                      </a:pPr>
                       <a:r>
                         <a:rPr lang="en-US" sz="900" dirty="0" smtClean="0"/>
-                        <a:t>Statistical</a:t>
+                        <a:t>5%-tile</a:t>
                       </a:r>
+                    </a:p>
+                  </a:txBody>
+                  <a:tcPr/>
+                </a:tc>
+                <a:tc>
+                  <a:txBody>
+                    <a:bodyPr/>
+                    <a:lstStyle/>
+                    <a:p>
+                      <a:pPr marL="0" marR="0" indent="0" algn="ctr" defTabSz="385763" rtl="0" eaLnBrk="1" fontAlgn="auto" latinLnBrk="0" hangingPunct="1">
+                        <a:lnSpc>
+                          <a:spcPct val="100000"/>
+                        </a:lnSpc>
+                        <a:spcBef>
+                          <a:spcPts val="0"/>
+                        </a:spcBef>
+                        <a:spcAft>
+                          <a:spcPts val="0"/>
+                        </a:spcAft>
+                        <a:buClrTx/>
+                        <a:buSzTx/>
+                        <a:buFontTx/>
+                        <a:buNone/>
+                        <a:tabLst/>
+                        <a:defRPr/>
+                      </a:pPr>
                       <a:r>
-                        <a:rPr lang="en-US" sz="900" baseline="0" dirty="0" smtClean="0"/>
-                        <a:t> Worst Case in $/MWh</a:t>
+                        <a:rPr lang="en-US" sz="900" dirty="0" smtClean="0"/>
+                        <a:t>2%-tile</a:t>
                       </a:r>
+                    </a:p>
+                  </a:txBody>
+                  <a:tcPr/>
+                </a:tc>
+                <a:tc>
+                  <a:txBody>
+                    <a:bodyPr/>
+                    <a:lstStyle/>
+                    <a:p>
+                      <a:pPr marL="0" marR="0" indent="0" algn="ctr" defTabSz="385763" rtl="0" eaLnBrk="1" fontAlgn="auto" latinLnBrk="0" hangingPunct="1">
+                        <a:lnSpc>
+                          <a:spcPct val="100000"/>
+                        </a:lnSpc>
+                        <a:spcBef>
+                          <a:spcPts val="0"/>
+                        </a:spcBef>
+                        <a:spcAft>
+                          <a:spcPts val="0"/>
+                        </a:spcAft>
+                        <a:buClrTx/>
+                        <a:buSzTx/>
+                        <a:buFontTx/>
+                        <a:buNone/>
+                        <a:tabLst/>
+                        <a:defRPr/>
+                      </a:pPr>
+                      <a:r>
+                        <a:rPr lang="en-US" sz="900" dirty="0" smtClean="0"/>
+                        <a:t>50%-tile</a:t>
+                      </a:r>
+                    </a:p>
+                    <a:p>
+                      <a:pPr algn="ctr"/>
                       <a:endParaRPr lang="en-US" sz="900" dirty="0"/>
                     </a:p>
                   </a:txBody>
@@ -9147,6 +9401,36 @@
                       <a:r>
                         <a:rPr lang="en-US" sz="900" dirty="0" smtClean="0"/>
                         <a:t>-43.24</a:t>
+                      </a:r>
+                      <a:endParaRPr lang="en-US" sz="900" dirty="0"/>
+                    </a:p>
+                  </a:txBody>
+                  <a:tcPr/>
+                </a:tc>
+                <a:tc>
+                  <a:txBody>
+                    <a:bodyPr/>
+                    <a:lstStyle/>
+                    <a:p>
+                      <a:pPr algn="ctr"/>
+                      <a:r>
+                        <a:rPr lang="en-US" sz="900" dirty="0" smtClean="0"/>
+                        <a:t>-13.40</a:t>
+                      </a:r>
+                      <a:endParaRPr lang="en-US" sz="900" dirty="0"/>
+                    </a:p>
+                  </a:txBody>
+                  <a:tcPr/>
+                </a:tc>
+                <a:tc>
+                  <a:txBody>
+                    <a:bodyPr/>
+                    <a:lstStyle/>
+                    <a:p>
+                      <a:pPr algn="ctr"/>
+                      <a:r>
+                        <a:rPr lang="en-US" sz="900" dirty="0" smtClean="0"/>
+                        <a:t>-14.10</a:t>
                       </a:r>
                       <a:endParaRPr lang="en-US" sz="900" dirty="0"/>
                     </a:p>
@@ -9228,6 +9512,36 @@
                       <a:pPr algn="ctr"/>
                       <a:r>
                         <a:rPr lang="en-US" sz="900" dirty="0" smtClean="0"/>
+                        <a:t>-8.67</a:t>
+                      </a:r>
+                      <a:endParaRPr lang="en-US" sz="900" dirty="0"/>
+                    </a:p>
+                  </a:txBody>
+                  <a:tcPr/>
+                </a:tc>
+                <a:tc>
+                  <a:txBody>
+                    <a:bodyPr/>
+                    <a:lstStyle/>
+                    <a:p>
+                      <a:pPr algn="ctr"/>
+                      <a:r>
+                        <a:rPr lang="en-US" sz="900" dirty="0" smtClean="0"/>
+                        <a:t>-9.00</a:t>
+                      </a:r>
+                      <a:endParaRPr lang="en-US" sz="900" dirty="0"/>
+                    </a:p>
+                  </a:txBody>
+                  <a:tcPr/>
+                </a:tc>
+                <a:tc>
+                  <a:txBody>
+                    <a:bodyPr/>
+                    <a:lstStyle/>
+                    <a:p>
+                      <a:pPr algn="ctr"/>
+                      <a:r>
+                        <a:rPr lang="en-US" sz="900" dirty="0" smtClean="0"/>
                         <a:t>-7.27</a:t>
                       </a:r>
                       <a:endParaRPr lang="en-US" sz="900" dirty="0"/>
@@ -9253,7 +9567,7 @@
         </p:nvSpPr>
         <p:spPr>
           <a:xfrm rot="20564727">
-            <a:off x="3175714" y="2381663"/>
+            <a:off x="2815772" y="2337942"/>
             <a:ext cx="1367364" cy="484116"/>
           </a:xfrm>
           <a:prstGeom prst="ellipse">
@@ -9602,7 +9916,7 @@
           <a:p>
             <a:fld id="{0C1B9D5F-4D70-4BF3-996E-37F8958E0F95}" type="datetime1">
               <a:rPr lang="en-US" smtClean="0"/>
-              <a:t>5/11/2017</a:t>
+              <a:t>5/15/2017</a:t>
             </a:fld>
             <a:endParaRPr lang="en-US"/>
           </a:p>
@@ -9682,20 +9996,572 @@
             </a:br>
             <a:r>
               <a:rPr lang="en-US" sz="1200" dirty="0" smtClean="0"/>
-              <a:t>that are generally </a:t>
-            </a:r>
-            <a:r>
-              <a:rPr lang="en-US" sz="1200" dirty="0" smtClean="0"/>
-              <a:t>negatively congested</a:t>
+              <a:t>that are generally negatively congested</a:t>
             </a:r>
             <a:endParaRPr lang="en-US" sz="1200" dirty="0"/>
+          </a:p>
+        </p:txBody>
+      </p:sp>
+      <p:sp>
+        <p:nvSpPr>
+          <p:cNvPr id="4" name="Rectangle 3"/>
+          <p:cNvSpPr/>
+          <p:nvPr/>
+        </p:nvSpPr>
+        <p:spPr>
+          <a:xfrm>
+            <a:off x="2793907" y="3718004"/>
+            <a:ext cx="1016093" cy="636952"/>
+          </a:xfrm>
+          <a:prstGeom prst="rect">
+            <a:avLst/>
+          </a:prstGeom>
+          <a:solidFill>
+            <a:schemeClr val="bg1"/>
+          </a:solidFill>
+          <a:ln w="3175">
+            <a:solidFill>
+              <a:schemeClr val="bg1">
+                <a:lumMod val="50000"/>
+              </a:schemeClr>
+            </a:solidFill>
+          </a:ln>
+        </p:spPr>
+        <p:style>
+          <a:lnRef idx="2">
+            <a:schemeClr val="accent1">
+              <a:shade val="50000"/>
+            </a:schemeClr>
+          </a:lnRef>
+          <a:fillRef idx="1">
+            <a:schemeClr val="accent1"/>
+          </a:fillRef>
+          <a:effectRef idx="0">
+            <a:schemeClr val="accent1"/>
+          </a:effectRef>
+          <a:fontRef idx="minor">
+            <a:schemeClr val="lt1"/>
+          </a:fontRef>
+        </p:style>
+        <p:txBody>
+          <a:bodyPr rtlCol="0" anchor="ctr"/>
+          <a:lstStyle/>
+          <a:p>
+            <a:pPr algn="ctr"/>
+            <a:endParaRPr lang="en-US"/>
+          </a:p>
+        </p:txBody>
+      </p:sp>
+      <p:sp>
+        <p:nvSpPr>
+          <p:cNvPr id="22" name="Rectangle 21"/>
+          <p:cNvSpPr/>
+          <p:nvPr/>
+        </p:nvSpPr>
+        <p:spPr>
+          <a:xfrm>
+            <a:off x="2889157" y="3899729"/>
+            <a:ext cx="330293" cy="114750"/>
+          </a:xfrm>
+          <a:prstGeom prst="rect">
+            <a:avLst/>
+          </a:prstGeom>
+          <a:solidFill>
+            <a:srgbClr val="FEA708"/>
+          </a:solidFill>
+          <a:ln w="3175">
+            <a:solidFill>
+              <a:schemeClr val="bg1">
+                <a:lumMod val="50000"/>
+              </a:schemeClr>
+            </a:solidFill>
+          </a:ln>
+        </p:spPr>
+        <p:style>
+          <a:lnRef idx="2">
+            <a:schemeClr val="accent1">
+              <a:shade val="50000"/>
+            </a:schemeClr>
+          </a:lnRef>
+          <a:fillRef idx="1">
+            <a:schemeClr val="accent1"/>
+          </a:fillRef>
+          <a:effectRef idx="0">
+            <a:schemeClr val="accent1"/>
+          </a:effectRef>
+          <a:fontRef idx="minor">
+            <a:schemeClr val="lt1"/>
+          </a:fontRef>
+        </p:style>
+        <p:txBody>
+          <a:bodyPr rtlCol="0" anchor="ctr"/>
+          <a:lstStyle/>
+          <a:p>
+            <a:pPr algn="ctr"/>
+            <a:endParaRPr lang="en-US"/>
+          </a:p>
+        </p:txBody>
+      </p:sp>
+      <p:sp>
+        <p:nvSpPr>
+          <p:cNvPr id="27" name="Rectangle 26"/>
+          <p:cNvSpPr/>
+          <p:nvPr/>
+        </p:nvSpPr>
+        <p:spPr>
+          <a:xfrm>
+            <a:off x="2889157" y="4048769"/>
+            <a:ext cx="330293" cy="114750"/>
+          </a:xfrm>
+          <a:prstGeom prst="rect">
+            <a:avLst/>
+          </a:prstGeom>
+          <a:solidFill>
+            <a:srgbClr val="0200FF"/>
+          </a:solidFill>
+          <a:ln w="3175">
+            <a:solidFill>
+              <a:schemeClr val="bg1">
+                <a:lumMod val="50000"/>
+              </a:schemeClr>
+            </a:solidFill>
+          </a:ln>
+        </p:spPr>
+        <p:style>
+          <a:lnRef idx="2">
+            <a:schemeClr val="accent1">
+              <a:shade val="50000"/>
+            </a:schemeClr>
+          </a:lnRef>
+          <a:fillRef idx="1">
+            <a:schemeClr val="accent1"/>
+          </a:fillRef>
+          <a:effectRef idx="0">
+            <a:schemeClr val="accent1"/>
+          </a:effectRef>
+          <a:fontRef idx="minor">
+            <a:schemeClr val="lt1"/>
+          </a:fontRef>
+        </p:style>
+        <p:txBody>
+          <a:bodyPr rtlCol="0" anchor="ctr"/>
+          <a:lstStyle/>
+          <a:p>
+            <a:pPr algn="ctr"/>
+            <a:endParaRPr lang="en-US"/>
+          </a:p>
+        </p:txBody>
+      </p:sp>
+      <p:sp>
+        <p:nvSpPr>
+          <p:cNvPr id="28" name="Rectangle 27"/>
+          <p:cNvSpPr/>
+          <p:nvPr/>
+        </p:nvSpPr>
+        <p:spPr>
+          <a:xfrm>
+            <a:off x="2889157" y="4191194"/>
+            <a:ext cx="330293" cy="114750"/>
+          </a:xfrm>
+          <a:prstGeom prst="rect">
+            <a:avLst/>
+          </a:prstGeom>
+          <a:solidFill>
+            <a:srgbClr val="A5EDA5"/>
+          </a:solidFill>
+          <a:ln w="3175">
+            <a:solidFill>
+              <a:schemeClr val="bg1">
+                <a:lumMod val="50000"/>
+              </a:schemeClr>
+            </a:solidFill>
+          </a:ln>
+        </p:spPr>
+        <p:style>
+          <a:lnRef idx="2">
+            <a:schemeClr val="accent1">
+              <a:shade val="50000"/>
+            </a:schemeClr>
+          </a:lnRef>
+          <a:fillRef idx="1">
+            <a:schemeClr val="accent1"/>
+          </a:fillRef>
+          <a:effectRef idx="0">
+            <a:schemeClr val="accent1"/>
+          </a:effectRef>
+          <a:fontRef idx="minor">
+            <a:schemeClr val="lt1"/>
+          </a:fontRef>
+        </p:style>
+        <p:txBody>
+          <a:bodyPr rtlCol="0" anchor="ctr"/>
+          <a:lstStyle/>
+          <a:p>
+            <a:pPr algn="ctr"/>
+            <a:endParaRPr lang="en-US"/>
+          </a:p>
+        </p:txBody>
+      </p:sp>
+      <p:sp>
+        <p:nvSpPr>
+          <p:cNvPr id="29" name="Rectangle 28"/>
+          <p:cNvSpPr/>
+          <p:nvPr/>
+        </p:nvSpPr>
+        <p:spPr>
+          <a:xfrm>
+            <a:off x="3290055" y="3899729"/>
+            <a:ext cx="479779" cy="114750"/>
+          </a:xfrm>
+          <a:prstGeom prst="rect">
+            <a:avLst/>
+          </a:prstGeom>
+          <a:noFill/>
+          <a:ln w="3175">
+            <a:noFill/>
+          </a:ln>
+        </p:spPr>
+        <p:style>
+          <a:lnRef idx="2">
+            <a:schemeClr val="accent1">
+              <a:shade val="50000"/>
+            </a:schemeClr>
+          </a:lnRef>
+          <a:fillRef idx="1">
+            <a:schemeClr val="accent1"/>
+          </a:fillRef>
+          <a:effectRef idx="0">
+            <a:schemeClr val="accent1"/>
+          </a:effectRef>
+          <a:fontRef idx="minor">
+            <a:schemeClr val="lt1"/>
+          </a:fontRef>
+        </p:style>
+        <p:txBody>
+          <a:bodyPr lIns="45720" rIns="45720" rtlCol="0" anchor="ctr"/>
+          <a:lstStyle/>
+          <a:p>
+            <a:pPr algn="ctr"/>
+            <a:r>
+              <a:rPr lang="en-US" sz="600" dirty="0" smtClean="0">
+                <a:solidFill>
+                  <a:schemeClr val="tx1"/>
+                </a:solidFill>
+              </a:rPr>
+              <a:t>50%-tile</a:t>
+            </a:r>
+            <a:endParaRPr lang="en-US" sz="600" dirty="0">
+              <a:solidFill>
+                <a:schemeClr val="tx1"/>
+              </a:solidFill>
+            </a:endParaRPr>
+          </a:p>
+        </p:txBody>
+      </p:sp>
+      <p:sp>
+        <p:nvSpPr>
+          <p:cNvPr id="30" name="Rectangle 29"/>
+          <p:cNvSpPr/>
+          <p:nvPr/>
+        </p:nvSpPr>
+        <p:spPr>
+          <a:xfrm>
+            <a:off x="3288028" y="4042365"/>
+            <a:ext cx="479779" cy="114750"/>
+          </a:xfrm>
+          <a:prstGeom prst="rect">
+            <a:avLst/>
+          </a:prstGeom>
+          <a:noFill/>
+          <a:ln w="3175">
+            <a:noFill/>
+          </a:ln>
+        </p:spPr>
+        <p:style>
+          <a:lnRef idx="2">
+            <a:schemeClr val="accent1">
+              <a:shade val="50000"/>
+            </a:schemeClr>
+          </a:lnRef>
+          <a:fillRef idx="1">
+            <a:schemeClr val="accent1"/>
+          </a:fillRef>
+          <a:effectRef idx="0">
+            <a:schemeClr val="accent1"/>
+          </a:effectRef>
+          <a:fontRef idx="minor">
+            <a:schemeClr val="lt1"/>
+          </a:fontRef>
+        </p:style>
+        <p:txBody>
+          <a:bodyPr lIns="45720" rIns="45720" rtlCol="0" anchor="ctr"/>
+          <a:lstStyle/>
+          <a:p>
+            <a:pPr algn="ctr"/>
+            <a:r>
+              <a:rPr lang="en-US" sz="600" dirty="0" smtClean="0">
+                <a:solidFill>
+                  <a:schemeClr val="tx1"/>
+                </a:solidFill>
+              </a:rPr>
+              <a:t>5%-tile</a:t>
+            </a:r>
+            <a:endParaRPr lang="en-US" sz="600" dirty="0">
+              <a:solidFill>
+                <a:schemeClr val="tx1"/>
+              </a:solidFill>
+            </a:endParaRPr>
+          </a:p>
+        </p:txBody>
+      </p:sp>
+      <p:sp>
+        <p:nvSpPr>
+          <p:cNvPr id="31" name="Rectangle 30"/>
+          <p:cNvSpPr/>
+          <p:nvPr/>
+        </p:nvSpPr>
+        <p:spPr>
+          <a:xfrm>
+            <a:off x="3288028" y="4185001"/>
+            <a:ext cx="479779" cy="114750"/>
+          </a:xfrm>
+          <a:prstGeom prst="rect">
+            <a:avLst/>
+          </a:prstGeom>
+          <a:noFill/>
+          <a:ln w="3175">
+            <a:noFill/>
+          </a:ln>
+        </p:spPr>
+        <p:style>
+          <a:lnRef idx="2">
+            <a:schemeClr val="accent1">
+              <a:shade val="50000"/>
+            </a:schemeClr>
+          </a:lnRef>
+          <a:fillRef idx="1">
+            <a:schemeClr val="accent1"/>
+          </a:fillRef>
+          <a:effectRef idx="0">
+            <a:schemeClr val="accent1"/>
+          </a:effectRef>
+          <a:fontRef idx="minor">
+            <a:schemeClr val="lt1"/>
+          </a:fontRef>
+        </p:style>
+        <p:txBody>
+          <a:bodyPr lIns="45720" rIns="45720" rtlCol="0" anchor="ctr"/>
+          <a:lstStyle/>
+          <a:p>
+            <a:pPr algn="ctr"/>
+            <a:r>
+              <a:rPr lang="en-US" sz="600" dirty="0" smtClean="0">
+                <a:solidFill>
+                  <a:schemeClr val="tx1"/>
+                </a:solidFill>
+              </a:rPr>
+              <a:t>2%-tile</a:t>
+            </a:r>
+            <a:endParaRPr lang="en-US" sz="600" dirty="0">
+              <a:solidFill>
+                <a:schemeClr val="tx1"/>
+              </a:solidFill>
+            </a:endParaRPr>
+          </a:p>
+        </p:txBody>
+      </p:sp>
+      <p:sp>
+        <p:nvSpPr>
+          <p:cNvPr id="32" name="Rectangle 31"/>
+          <p:cNvSpPr/>
+          <p:nvPr/>
+        </p:nvSpPr>
+        <p:spPr>
+          <a:xfrm>
+            <a:off x="2840028" y="3749651"/>
+            <a:ext cx="927779" cy="114750"/>
+          </a:xfrm>
+          <a:prstGeom prst="rect">
+            <a:avLst/>
+          </a:prstGeom>
+          <a:noFill/>
+          <a:ln w="3175">
+            <a:noFill/>
+          </a:ln>
+        </p:spPr>
+        <p:style>
+          <a:lnRef idx="2">
+            <a:schemeClr val="accent1">
+              <a:shade val="50000"/>
+            </a:schemeClr>
+          </a:lnRef>
+          <a:fillRef idx="1">
+            <a:schemeClr val="accent1"/>
+          </a:fillRef>
+          <a:effectRef idx="0">
+            <a:schemeClr val="accent1"/>
+          </a:effectRef>
+          <a:fontRef idx="minor">
+            <a:schemeClr val="lt1"/>
+          </a:fontRef>
+        </p:style>
+        <p:txBody>
+          <a:bodyPr rtlCol="0" anchor="ctr"/>
+          <a:lstStyle/>
+          <a:p>
+            <a:pPr algn="ctr"/>
+            <a:r>
+              <a:rPr lang="en-US" sz="600" dirty="0" smtClean="0">
+                <a:solidFill>
+                  <a:schemeClr val="tx1"/>
+                </a:solidFill>
+              </a:rPr>
+              <a:t>Statistical Worst Case</a:t>
+            </a:r>
+            <a:endParaRPr lang="en-US" sz="600" dirty="0">
+              <a:solidFill>
+                <a:schemeClr val="tx1"/>
+              </a:solidFill>
+            </a:endParaRPr>
+          </a:p>
+        </p:txBody>
+      </p:sp>
+      <p:sp>
+        <p:nvSpPr>
+          <p:cNvPr id="33" name="Rectangle 32"/>
+          <p:cNvSpPr/>
+          <p:nvPr/>
+        </p:nvSpPr>
+        <p:spPr>
+          <a:xfrm>
+            <a:off x="6877050" y="1460748"/>
+            <a:ext cx="1712384" cy="176114"/>
+          </a:xfrm>
+          <a:prstGeom prst="rect">
+            <a:avLst/>
+          </a:prstGeom>
+          <a:solidFill>
+            <a:schemeClr val="bg1">
+              <a:lumMod val="50000"/>
+            </a:schemeClr>
+          </a:solidFill>
+          <a:ln w="3175">
+            <a:solidFill>
+              <a:schemeClr val="bg1"/>
+            </a:solidFill>
+          </a:ln>
+        </p:spPr>
+        <p:style>
+          <a:lnRef idx="2">
+            <a:schemeClr val="accent1">
+              <a:shade val="50000"/>
+            </a:schemeClr>
+          </a:lnRef>
+          <a:fillRef idx="1">
+            <a:schemeClr val="accent1"/>
+          </a:fillRef>
+          <a:effectRef idx="0">
+            <a:schemeClr val="accent1"/>
+          </a:effectRef>
+          <a:fontRef idx="minor">
+            <a:schemeClr val="lt1"/>
+          </a:fontRef>
+        </p:style>
+        <p:txBody>
+          <a:bodyPr rtlCol="0" anchor="ctr"/>
+          <a:lstStyle/>
+          <a:p>
+            <a:pPr algn="ctr"/>
+            <a:r>
+              <a:rPr lang="en-US" sz="900" dirty="0" smtClean="0">
+                <a:solidFill>
+                  <a:schemeClr val="bg1">
+                    <a:lumMod val="95000"/>
+                  </a:schemeClr>
+                </a:solidFill>
+              </a:rPr>
+              <a:t>Statistical Worst Case</a:t>
+            </a:r>
+            <a:endParaRPr lang="en-US" sz="900" dirty="0">
+              <a:solidFill>
+                <a:schemeClr val="bg1">
+                  <a:lumMod val="95000"/>
+                </a:schemeClr>
+              </a:solidFill>
+            </a:endParaRPr>
+          </a:p>
+        </p:txBody>
+      </p:sp>
+      <p:sp>
+        <p:nvSpPr>
+          <p:cNvPr id="34" name="Rectangle 33"/>
+          <p:cNvSpPr/>
+          <p:nvPr/>
+        </p:nvSpPr>
+        <p:spPr>
+          <a:xfrm>
+            <a:off x="6842655" y="3672682"/>
+            <a:ext cx="1712384" cy="176114"/>
+          </a:xfrm>
+          <a:prstGeom prst="rect">
+            <a:avLst/>
+          </a:prstGeom>
+          <a:solidFill>
+            <a:schemeClr val="bg1">
+              <a:lumMod val="50000"/>
+            </a:schemeClr>
+          </a:solidFill>
+          <a:ln w="3175">
+            <a:solidFill>
+              <a:schemeClr val="bg1"/>
+            </a:solidFill>
+          </a:ln>
+        </p:spPr>
+        <p:style>
+          <a:lnRef idx="2">
+            <a:schemeClr val="accent1">
+              <a:shade val="50000"/>
+            </a:schemeClr>
+          </a:lnRef>
+          <a:fillRef idx="1">
+            <a:schemeClr val="accent1"/>
+          </a:fillRef>
+          <a:effectRef idx="0">
+            <a:schemeClr val="accent1"/>
+          </a:effectRef>
+          <a:fontRef idx="minor">
+            <a:schemeClr val="lt1"/>
+          </a:fontRef>
+        </p:style>
+        <p:txBody>
+          <a:bodyPr rtlCol="0" anchor="ctr"/>
+          <a:lstStyle/>
+          <a:p>
+            <a:pPr algn="ctr"/>
+            <a:r>
+              <a:rPr lang="en-US" sz="900" dirty="0" smtClean="0">
+                <a:solidFill>
+                  <a:schemeClr val="bg1">
+                    <a:lumMod val="95000"/>
+                  </a:schemeClr>
+                </a:solidFill>
+              </a:rPr>
+              <a:t>Statistical Worst Case</a:t>
+            </a:r>
+            <a:endParaRPr lang="en-US" sz="900" dirty="0">
+              <a:solidFill>
+                <a:schemeClr val="bg1">
+                  <a:lumMod val="95000"/>
+                </a:schemeClr>
+              </a:solidFill>
+            </a:endParaRPr>
           </a:p>
         </p:txBody>
       </p:sp>
     </p:spTree>
     <p:extLst>
       <p:ext uri="{BB962C8B-B14F-4D97-AF65-F5344CB8AC3E}">
-        <p14:creationId xmlns:p14="http://schemas.microsoft.com/office/powerpoint/2010/main" val="4172320641"/>
+        <p14:creationId xmlns:p14="http://schemas.microsoft.com/office/powerpoint/2010/main" val="1594731486"/>
       </p:ext>
     </p:extLst>
   </p:cSld>
@@ -10119,7 +10985,7 @@
           <a:p>
             <a:fld id="{67261995-B660-41D4-8FC6-4FC94EE9C233}" type="datetime1">
               <a:rPr lang="en-US" smtClean="0"/>
-              <a:t>5/11/2017</a:t>
+              <a:t>5/15/2017</a:t>
             </a:fld>
             <a:endParaRPr lang="en-US"/>
           </a:p>
@@ -10245,7 +11111,7 @@
           <a:p>
             <a:fld id="{B23014AC-C763-4CE9-B2AE-48A9332E8134}" type="datetime1">
               <a:rPr lang="en-US" smtClean="0"/>
-              <a:t>5/11/2017</a:t>
+              <a:t>5/15/2017</a:t>
             </a:fld>
             <a:endParaRPr lang="en-US"/>
           </a:p>
@@ -10415,7 +11281,7 @@
           <a:p>
             <a:fld id="{02EE789E-1D84-4897-8ED5-C6C6A8AFBCC7}" type="datetime1">
               <a:rPr lang="en-US" smtClean="0"/>
-              <a:t>5/11/2017</a:t>
+              <a:t>5/15/2017</a:t>
             </a:fld>
             <a:endParaRPr lang="en-US"/>
           </a:p>
@@ -10590,7 +11456,7 @@
           <a:p>
             <a:fld id="{15F1E40C-1ADA-49EE-97E6-66D3E249BA19}" type="datetime1">
               <a:rPr lang="en-US" smtClean="0"/>
-              <a:t>5/11/2017</a:t>
+              <a:t>5/15/2017</a:t>
             </a:fld>
             <a:endParaRPr lang="en-US"/>
           </a:p>
@@ -10691,7 +11557,7 @@
           <a:p>
             <a:fld id="{DE2C4BE6-EF26-45B8-903D-20D6902B7E3E}" type="datetime1">
               <a:rPr lang="en-US" smtClean="0"/>
-              <a:t>5/11/2017</a:t>
+              <a:t>5/15/2017</a:t>
             </a:fld>
             <a:endParaRPr lang="en-US"/>
           </a:p>
@@ -10825,7 +11691,7 @@
           <a:p>
             <a:fld id="{5A4C56E2-66F2-44BA-B218-7B8216EFB5DF}" type="datetime1">
               <a:rPr lang="en-US" smtClean="0"/>
-              <a:t>5/11/2017</a:t>
+              <a:t>5/15/2017</a:t>
             </a:fld>
             <a:endParaRPr lang="en-US"/>
           </a:p>
@@ -10999,7 +11865,7 @@
           <a:p>
             <a:fld id="{EA5AFDA7-7CB9-4939-983D-F402B7996BDF}" type="datetime1">
               <a:rPr lang="en-US" smtClean="0"/>
-              <a:t>5/11/2017</a:t>
+              <a:t>5/15/2017</a:t>
             </a:fld>
             <a:endParaRPr lang="en-US"/>
           </a:p>
@@ -11283,7 +12149,7 @@
           <a:p>
             <a:fld id="{99D11DF9-A47C-497D-9422-A14D7972A9CD}" type="datetime1">
               <a:rPr lang="en-US" smtClean="0"/>
-              <a:t>5/11/2017</a:t>
+              <a:t>5/15/2017</a:t>
             </a:fld>
             <a:endParaRPr lang="en-US"/>
           </a:p>
@@ -11484,7 +12350,7 @@
           <a:p>
             <a:fld id="{15F1E40C-1ADA-49EE-97E6-66D3E249BA19}" type="datetime1">
               <a:rPr lang="en-US" smtClean="0"/>
-              <a:t>5/11/2017</a:t>
+              <a:t>5/15/2017</a:t>
             </a:fld>
             <a:endParaRPr lang="en-US"/>
           </a:p>
@@ -11586,7 +12452,7 @@
           <a:p>
             <a:fld id="{1B53BFA5-37C2-4F38-A422-53BB79326F92}" type="datetime1">
               <a:rPr lang="en-US" smtClean="0"/>
-              <a:t>5/11/2017</a:t>
+              <a:t>5/15/2017</a:t>
             </a:fld>
             <a:endParaRPr lang="en-US"/>
           </a:p>
@@ -12082,7 +12948,7 @@
           <a:p>
             <a:fld id="{8F44D27A-E4D6-48B7-8B9F-A8B1DD49F081}" type="datetime1">
               <a:rPr lang="en-US" smtClean="0"/>
-              <a:t>5/11/2017</a:t>
+              <a:t>5/15/2017</a:t>
             </a:fld>
             <a:endParaRPr lang="en-US"/>
           </a:p>
@@ -12592,7 +13458,7 @@
           <a:p>
             <a:fld id="{F7E66C20-724A-4125-9A6E-398B354EF203}" type="datetime1">
               <a:rPr lang="en-US" smtClean="0"/>
-              <a:t>5/11/2017</a:t>
+              <a:t>5/15/2017</a:t>
             </a:fld>
             <a:endParaRPr lang="en-US"/>
           </a:p>
@@ -12974,7 +13840,7 @@
           <a:p>
             <a:fld id="{3A23D5B7-62B4-4A7D-9111-6530A6D3FDBF}" type="datetime1">
               <a:rPr lang="en-US" smtClean="0"/>
-              <a:t>5/11/2017</a:t>
+              <a:t>5/15/2017</a:t>
             </a:fld>
             <a:endParaRPr lang="en-US"/>
           </a:p>
@@ -13082,15 +13948,7 @@
           <a:p>
             <a:r>
               <a:rPr lang="en-US" dirty="0" smtClean="0"/>
-              <a:t>Comply with FERC Order </a:t>
-            </a:r>
-            <a:r>
-              <a:rPr lang="en-US" dirty="0" smtClean="0"/>
-              <a:t>741</a:t>
-            </a:r>
-            <a:r>
-              <a:rPr lang="en-US" dirty="0" smtClean="0"/>
-              <a:t/>
+              <a:t>Comply with FERC Order 741</a:t>
             </a:r>
             <a:br>
               <a:rPr lang="en-US" dirty="0" smtClean="0"/>
@@ -13153,7 +14011,7 @@
           <a:p>
             <a:fld id="{193E42F9-7246-46BA-ACFD-939E0BDD16E6}" type="datetime1">
               <a:rPr lang="en-US" smtClean="0"/>
-              <a:t>5/11/2017</a:t>
+              <a:t>5/15/2017</a:t>
             </a:fld>
             <a:endParaRPr lang="en-US"/>
           </a:p>
@@ -13602,7 +14460,7 @@
           <a:p>
             <a:fld id="{02509BB5-7594-4E2C-AD31-6E71F932CBD5}" type="datetime1">
               <a:rPr lang="en-US" smtClean="0"/>
-              <a:t>5/11/2017</a:t>
+              <a:t>5/15/2017</a:t>
             </a:fld>
             <a:endParaRPr lang="en-US"/>
           </a:p>
@@ -14226,7 +15084,7 @@
           <a:p>
             <a:fld id="{73654314-6442-4A30-BD0E-D5CFC826B6F6}" type="datetime1">
               <a:rPr lang="en-US" smtClean="0"/>
-              <a:t>5/11/2017</a:t>
+              <a:t>5/15/2017</a:t>
             </a:fld>
             <a:endParaRPr lang="en-US"/>
           </a:p>
@@ -14378,7 +15236,7 @@
           <a:p>
             <a:fld id="{CD9BA50C-F3CE-4421-AF99-B3B8738D4AEB}" type="datetime1">
               <a:rPr lang="en-US" smtClean="0"/>
-              <a:t>5/11/2017</a:t>
+              <a:t>5/15/2017</a:t>
             </a:fld>
             <a:endParaRPr lang="en-US"/>
           </a:p>
@@ -16328,7 +17186,7 @@
           <a:p>
             <a:fld id="{3CDEAFCB-6FD7-45C9-8EAC-D20D6E1B8ED5}" type="datetime1">
               <a:rPr lang="en-US" smtClean="0"/>
-              <a:t>5/11/2017</a:t>
+              <a:t>5/15/2017</a:t>
             </a:fld>
             <a:endParaRPr lang="en-US"/>
           </a:p>
@@ -16568,11 +17426,7 @@
           <a:p>
             <a:r>
               <a:rPr lang="en-US" dirty="0" smtClean="0"/>
-              <a:t>Reflects the “statistical” worst-case congestion value of a particular TCR path for a particular period</a:t>
-            </a:r>
-            <a:r>
-              <a:rPr lang="en-US" dirty="0" smtClean="0"/>
-              <a:t>.</a:t>
+              <a:t>Reflects the “statistical” worst-case congestion value of a particular TCR path for a particular period.</a:t>
             </a:r>
             <a:br>
               <a:rPr lang="en-US" dirty="0" smtClean="0"/>
@@ -16582,23 +17436,7 @@
           <a:p>
             <a:r>
               <a:rPr lang="en-US" dirty="0" smtClean="0"/>
-              <a:t>Such that when the product is bid at a particular bid </a:t>
-            </a:r>
-            <a:r>
-              <a:rPr lang="en-US" dirty="0" smtClean="0"/>
-              <a:t>price, </a:t>
-            </a:r>
-            <a:r>
-              <a:rPr lang="en-US" dirty="0" smtClean="0"/>
-              <a:t>the credit </a:t>
-            </a:r>
-            <a:r>
-              <a:rPr lang="en-US" dirty="0" smtClean="0"/>
-              <a:t>requirement corresponds to the spread between the bid price and the “statistical” worst-case congestion value.</a:t>
-            </a:r>
-            <a:r>
-              <a:rPr lang="en-US" dirty="0" smtClean="0"/>
-              <a:t/>
+              <a:t>Such that when the product is bid at a particular bid price, the credit requirement corresponds to the spread between the bid price and the “statistical” worst-case congestion value.</a:t>
             </a:r>
             <a:br>
               <a:rPr lang="en-US" dirty="0" smtClean="0"/>
@@ -16624,7 +17462,7 @@
           <a:p>
             <a:fld id="{CB0C22E2-02EF-4C49-AD7F-87037CC0F4DE}" type="datetime1">
               <a:rPr lang="en-US" smtClean="0"/>
-              <a:t>5/11/2017</a:t>
+              <a:t>5/15/2017</a:t>
             </a:fld>
             <a:endParaRPr lang="en-US"/>
           </a:p>
@@ -16754,34 +17592,14 @@
             <a:pPr lvl="1"/>
             <a:r>
               <a:rPr lang="en-US" dirty="0" smtClean="0"/>
-              <a:t>Step 2: Draw from the distribution until we collect </a:t>
-            </a:r>
+              <a:t>Step 2: Draw from the distribution until we collect 400 hourly samples</a:t>
+            </a:r>
+          </a:p>
+          <a:p>
+            <a:pPr lvl="1"/>
             <a:r>
               <a:rPr lang="en-US" dirty="0" smtClean="0"/>
-              <a:t>400 </a:t>
-            </a:r>
-            <a:r>
-              <a:rPr lang="en-US" dirty="0" smtClean="0"/>
-              <a:t>hourly samples</a:t>
-            </a:r>
-          </a:p>
-          <a:p>
-            <a:pPr lvl="1"/>
-            <a:r>
-              <a:rPr lang="en-US" dirty="0" smtClean="0"/>
-              <a:t>Step 3: Sum the </a:t>
-            </a:r>
-            <a:r>
-              <a:rPr lang="en-US" dirty="0" smtClean="0"/>
-              <a:t>40</a:t>
-            </a:r>
-            <a:r>
-              <a:rPr lang="en-US" dirty="0" smtClean="0"/>
-              <a:t>0 </a:t>
-            </a:r>
-            <a:r>
-              <a:rPr lang="en-US" dirty="0" smtClean="0"/>
-              <a:t>hourly samples to produce one Monthly sample, </a:t>
+              <a:t>Step 3: Sum the 400 hourly samples to produce one Monthly sample, </a:t>
             </a:r>
             <a:br>
               <a:rPr lang="en-US" dirty="0" smtClean="0"/>
@@ -16830,7 +17648,7 @@
           <a:p>
             <a:fld id="{46ED6C3A-6D6B-41C7-990B-03054BDE5A6E}" type="datetime1">
               <a:rPr lang="en-US" smtClean="0"/>
-              <a:t>5/11/2017</a:t>
+              <a:t>5/15/2017</a:t>
             </a:fld>
             <a:endParaRPr lang="en-US"/>
           </a:p>

</xml_diff>

<commit_message>
assess over / under collateralization
</commit_message>
<xml_diff>
--- a/ppt/SPP TCR Reference Price Calculation.pptx
+++ b/ppt/SPP TCR Reference Price Calculation.pptx
@@ -5,7 +5,7 @@
     <p:sldMasterId id="2147483660" r:id="rId1"/>
   </p:sldMasterIdLst>
   <p:notesMasterIdLst>
-    <p:notesMasterId r:id="rId31"/>
+    <p:notesMasterId r:id="rId39"/>
   </p:notesMasterIdLst>
   <p:sldIdLst>
     <p:sldId id="256" r:id="rId2"/>
@@ -25,18 +25,26 @@
     <p:sldId id="292" r:id="rId16"/>
     <p:sldId id="276" r:id="rId17"/>
     <p:sldId id="294" r:id="rId18"/>
-    <p:sldId id="288" r:id="rId19"/>
-    <p:sldId id="289" r:id="rId20"/>
-    <p:sldId id="291" r:id="rId21"/>
-    <p:sldId id="279" r:id="rId22"/>
-    <p:sldId id="287" r:id="rId23"/>
-    <p:sldId id="284" r:id="rId24"/>
-    <p:sldId id="283" r:id="rId25"/>
-    <p:sldId id="290" r:id="rId26"/>
-    <p:sldId id="269" r:id="rId27"/>
-    <p:sldId id="258" r:id="rId28"/>
-    <p:sldId id="259" r:id="rId29"/>
-    <p:sldId id="260" r:id="rId30"/>
+    <p:sldId id="295" r:id="rId19"/>
+    <p:sldId id="296" r:id="rId20"/>
+    <p:sldId id="297" r:id="rId21"/>
+    <p:sldId id="298" r:id="rId22"/>
+    <p:sldId id="299" r:id="rId23"/>
+    <p:sldId id="300" r:id="rId24"/>
+    <p:sldId id="301" r:id="rId25"/>
+    <p:sldId id="302" r:id="rId26"/>
+    <p:sldId id="288" r:id="rId27"/>
+    <p:sldId id="289" r:id="rId28"/>
+    <p:sldId id="279" r:id="rId29"/>
+    <p:sldId id="287" r:id="rId30"/>
+    <p:sldId id="284" r:id="rId31"/>
+    <p:sldId id="303" r:id="rId32"/>
+    <p:sldId id="283" r:id="rId33"/>
+    <p:sldId id="290" r:id="rId34"/>
+    <p:sldId id="269" r:id="rId35"/>
+    <p:sldId id="258" r:id="rId36"/>
+    <p:sldId id="259" r:id="rId37"/>
+    <p:sldId id="260" r:id="rId38"/>
   </p:sldIdLst>
   <p:sldSz cx="9144000" cy="6858000" type="screen4x3"/>
   <p:notesSz cx="6858000" cy="9144000"/>
@@ -225,7 +233,7 @@
           <a:p>
             <a:fld id="{DC9FF35D-67E9-443F-A58B-481559A40312}" type="datetimeFigureOut">
               <a:rPr lang="en-US" smtClean="0"/>
-              <a:t>5/15/2017</a:t>
+              <a:t>5/17/2017</a:t>
             </a:fld>
             <a:endParaRPr lang="en-US"/>
           </a:p>
@@ -1028,7 +1036,7 @@
           <a:p>
             <a:fld id="{15F1E40C-1ADA-49EE-97E6-66D3E249BA19}" type="datetime1">
               <a:rPr lang="en-US" smtClean="0"/>
-              <a:t>5/15/2017</a:t>
+              <a:t>5/17/2017</a:t>
             </a:fld>
             <a:endParaRPr lang="en-US"/>
           </a:p>
@@ -1123,7 +1131,7 @@
           </a:bodyPr>
           <a:lstStyle>
             <a:lvl1pPr algn="l">
-              <a:defRPr sz="1013" b="1" cap="all" baseline="0">
+              <a:defRPr sz="2000" b="1" cap="none" baseline="0">
                 <a:solidFill>
                   <a:srgbClr val="878785"/>
                 </a:solidFill>
@@ -1391,7 +1399,7 @@
             <a:fld id="{0F631D50-F0AA-46A8-84F7-AFEADD7F3562}" type="datetime1">
               <a:rPr lang="en-US" smtClean="0"/>
               <a:pPr/>
-              <a:t>5/15/2017</a:t>
+              <a:t>5/17/2017</a:t>
             </a:fld>
             <a:endParaRPr lang="en-US"/>
           </a:p>
@@ -1780,7 +1788,7 @@
           <a:p>
             <a:fld id="{66269BD1-B55D-45D2-A064-5404BCD67C62}" type="datetime1">
               <a:rPr lang="en-US" smtClean="0"/>
-              <a:t>5/15/2017</a:t>
+              <a:t>5/17/2017</a:t>
             </a:fld>
             <a:endParaRPr lang="en-US"/>
           </a:p>
@@ -2125,7 +2133,7 @@
           <a:p>
             <a:fld id="{A897F7A3-A02E-43B7-A35D-28422C891F34}" type="datetime1">
               <a:rPr lang="en-US" smtClean="0"/>
-              <a:t>5/15/2017</a:t>
+              <a:t>5/17/2017</a:t>
             </a:fld>
             <a:endParaRPr lang="en-US"/>
           </a:p>
@@ -2305,7 +2313,7 @@
           <a:p>
             <a:fld id="{D3235EA8-B38B-49E7-A85C-5CBC6D007238}" type="datetime1">
               <a:rPr lang="en-US" smtClean="0"/>
-              <a:t>5/15/2017</a:t>
+              <a:t>5/17/2017</a:t>
             </a:fld>
             <a:endParaRPr lang="en-US"/>
           </a:p>
@@ -2587,7 +2595,7 @@
           <a:p>
             <a:fld id="{9DAC76DD-E0E5-4982-B60F-3E1F6AAD9050}" type="datetime1">
               <a:rPr lang="en-US" smtClean="0"/>
-              <a:t>5/15/2017</a:t>
+              <a:t>5/17/2017</a:t>
             </a:fld>
             <a:endParaRPr lang="en-US"/>
           </a:p>
@@ -3384,7 +3392,7 @@
           <a:p>
             <a:fld id="{F5C0FD1E-3C60-41B6-B28F-CC9190028EC6}" type="datetime1">
               <a:rPr lang="en-US" smtClean="0"/>
-              <a:t>5/15/2017</a:t>
+              <a:t>5/17/2017</a:t>
             </a:fld>
             <a:endParaRPr lang="en-US"/>
           </a:p>
@@ -4194,7 +4202,7 @@
           <a:p>
             <a:fld id="{0E7351DC-D08B-471F-A63F-48C7CB5F0F4B}" type="datetime1">
               <a:rPr lang="en-US" smtClean="0"/>
-              <a:t>5/15/2017</a:t>
+              <a:t>5/17/2017</a:t>
             </a:fld>
             <a:endParaRPr lang="en-US"/>
           </a:p>
@@ -6897,7 +6905,7 @@
           <a:p>
             <a:fld id="{B98CDE6E-B057-427D-9091-9156558AC489}" type="datetime1">
               <a:rPr lang="en-US" smtClean="0"/>
-              <a:t>5/15/2017</a:t>
+              <a:t>5/17/2017</a:t>
             </a:fld>
             <a:endParaRPr lang="en-US"/>
           </a:p>
@@ -7380,7 +7388,7 @@
           <a:p>
             <a:fld id="{9755A163-F46C-4E1E-8BEB-8FD339A02777}" type="datetime1">
               <a:rPr lang="en-US" smtClean="0"/>
-              <a:t>5/15/2017</a:t>
+              <a:t>5/17/2017</a:t>
             </a:fld>
             <a:endParaRPr lang="en-US"/>
           </a:p>
@@ -7885,7 +7893,7 @@
           <a:p>
             <a:fld id="{D78AE1DB-9BFB-4075-9AE4-DA80E04FCFC0}" type="datetime1">
               <a:rPr lang="en-US" smtClean="0"/>
-              <a:t>5/15/2017</a:t>
+              <a:t>5/17/2017</a:t>
             </a:fld>
             <a:endParaRPr lang="en-US"/>
           </a:p>
@@ -8035,7 +8043,7 @@
           <a:p>
             <a:fld id="{15F1E40C-1ADA-49EE-97E6-66D3E249BA19}" type="datetime1">
               <a:rPr lang="en-US" smtClean="0"/>
-              <a:t>5/15/2017</a:t>
+              <a:t>5/17/2017</a:t>
             </a:fld>
             <a:endParaRPr lang="en-US"/>
           </a:p>
@@ -8371,7 +8379,7 @@
           <a:p>
             <a:fld id="{1A77BCBE-5264-4BF6-B61B-E810E9F10A32}" type="datetime1">
               <a:rPr lang="en-US" smtClean="0"/>
-              <a:t>5/15/2017</a:t>
+              <a:t>5/17/2017</a:t>
             </a:fld>
             <a:endParaRPr lang="en-US"/>
           </a:p>
@@ -8642,7 +8650,6 @@
                         <a:rPr lang="en-US" sz="900" dirty="0" smtClean="0"/>
                         <a:t>5%-tile</a:t>
                       </a:r>
-                      <a:endParaRPr lang="en-US" sz="900" dirty="0" smtClean="0"/>
                     </a:p>
                   </a:txBody>
                   <a:tcPr/>
@@ -8673,7 +8680,6 @@
                         <a:rPr lang="en-US" sz="900" dirty="0" smtClean="0"/>
                         <a:t>2%-tile</a:t>
                       </a:r>
-                      <a:endParaRPr lang="en-US" sz="900" dirty="0" smtClean="0"/>
                     </a:p>
                   </a:txBody>
                   <a:tcPr/>
@@ -8704,7 +8710,6 @@
                         <a:rPr lang="en-US" sz="900" dirty="0" smtClean="0"/>
                         <a:t>50%-tile</a:t>
                       </a:r>
-                      <a:endParaRPr lang="en-US" sz="900" dirty="0" smtClean="0"/>
                     </a:p>
                   </a:txBody>
                   <a:tcPr/>
@@ -9916,7 +9921,7 @@
           <a:p>
             <a:fld id="{0C1B9D5F-4D70-4BF3-996E-37F8958E0F95}" type="datetime1">
               <a:rPr lang="en-US" smtClean="0"/>
-              <a:t>5/15/2017</a:t>
+              <a:t>5/17/2017</a:t>
             </a:fld>
             <a:endParaRPr lang="en-US"/>
           </a:p>
@@ -10661,6 +10666,2594 @@
 </file>
 
 <file path=ppt/slides/slide18.xml><?xml version="1.0" encoding="utf-8"?>
+<p:sld xmlns:a="http://schemas.openxmlformats.org/drawingml/2006/main" xmlns:r="http://schemas.openxmlformats.org/officeDocument/2006/relationships" xmlns:p="http://schemas.openxmlformats.org/presentationml/2006/main">
+  <p:cSld>
+    <p:spTree>
+      <p:nvGrpSpPr>
+        <p:cNvPr id="1" name=""/>
+        <p:cNvGrpSpPr/>
+        <p:nvPr/>
+      </p:nvGrpSpPr>
+      <p:grpSpPr>
+        <a:xfrm>
+          <a:off x="0" y="0"/>
+          <a:ext cx="0" cy="0"/>
+          <a:chOff x="0" y="0"/>
+          <a:chExt cx="0" cy="0"/>
+        </a:xfrm>
+      </p:grpSpPr>
+      <p:sp>
+        <p:nvSpPr>
+          <p:cNvPr id="7" name="Title 6"/>
+          <p:cNvSpPr>
+            <a:spLocks noGrp="1"/>
+          </p:cNvSpPr>
+          <p:nvPr>
+            <p:ph type="title"/>
+          </p:nvPr>
+        </p:nvSpPr>
+        <p:spPr/>
+        <p:txBody>
+          <a:bodyPr/>
+          <a:lstStyle/>
+          <a:p>
+            <a:r>
+              <a:rPr lang="en-US" dirty="0" smtClean="0"/>
+              <a:t>An assessment of how much we are over-collateralizing or under-collateralizing</a:t>
+            </a:r>
+            <a:endParaRPr lang="en-US" dirty="0"/>
+          </a:p>
+        </p:txBody>
+      </p:sp>
+      <p:sp>
+        <p:nvSpPr>
+          <p:cNvPr id="8" name="Text Placeholder 7"/>
+          <p:cNvSpPr>
+            <a:spLocks noGrp="1"/>
+          </p:cNvSpPr>
+          <p:nvPr>
+            <p:ph type="body" idx="1"/>
+          </p:nvPr>
+        </p:nvSpPr>
+        <p:spPr/>
+        <p:txBody>
+          <a:bodyPr/>
+          <a:lstStyle/>
+          <a:p>
+            <a:r>
+              <a:rPr lang="en-US" dirty="0" err="1" smtClean="0"/>
+              <a:t>Backtesting</a:t>
+            </a:r>
+            <a:endParaRPr lang="en-US" dirty="0"/>
+          </a:p>
+        </p:txBody>
+      </p:sp>
+      <p:sp>
+        <p:nvSpPr>
+          <p:cNvPr id="5" name="Slide Number Placeholder 4"/>
+          <p:cNvSpPr>
+            <a:spLocks noGrp="1"/>
+          </p:cNvSpPr>
+          <p:nvPr>
+            <p:ph type="sldNum" sz="quarter" idx="12"/>
+          </p:nvPr>
+        </p:nvSpPr>
+        <p:spPr/>
+        <p:txBody>
+          <a:bodyPr/>
+          <a:lstStyle/>
+          <a:p>
+            <a:fld id="{08ED2EC4-456D-42C8-8DCA-F679E5FEF3E2}" type="slidenum">
+              <a:rPr lang="en-US" smtClean="0"/>
+              <a:t>18</a:t>
+            </a:fld>
+            <a:endParaRPr lang="en-US"/>
+          </a:p>
+        </p:txBody>
+      </p:sp>
+      <p:sp>
+        <p:nvSpPr>
+          <p:cNvPr id="6" name="Date Placeholder 5"/>
+          <p:cNvSpPr>
+            <a:spLocks noGrp="1"/>
+          </p:cNvSpPr>
+          <p:nvPr>
+            <p:ph type="dt" sz="half" idx="10"/>
+          </p:nvPr>
+        </p:nvSpPr>
+        <p:spPr/>
+        <p:txBody>
+          <a:bodyPr/>
+          <a:lstStyle/>
+          <a:p>
+            <a:fld id="{66269BD1-B55D-45D2-A064-5404BCD67C62}" type="datetime1">
+              <a:rPr lang="en-US" smtClean="0"/>
+              <a:t>5/17/2017</a:t>
+            </a:fld>
+            <a:endParaRPr lang="en-US"/>
+          </a:p>
+        </p:txBody>
+      </p:sp>
+    </p:spTree>
+    <p:extLst>
+      <p:ext uri="{BB962C8B-B14F-4D97-AF65-F5344CB8AC3E}">
+        <p14:creationId xmlns:p14="http://schemas.microsoft.com/office/powerpoint/2010/main" val="2454129327"/>
+      </p:ext>
+    </p:extLst>
+  </p:cSld>
+  <p:clrMapOvr>
+    <a:masterClrMapping/>
+  </p:clrMapOvr>
+</p:sld>
+</file>
+
+<file path=ppt/slides/slide19.xml><?xml version="1.0" encoding="utf-8"?>
+<p:sld xmlns:a="http://schemas.openxmlformats.org/drawingml/2006/main" xmlns:r="http://schemas.openxmlformats.org/officeDocument/2006/relationships" xmlns:p="http://schemas.openxmlformats.org/presentationml/2006/main">
+  <p:cSld>
+    <p:spTree>
+      <p:nvGrpSpPr>
+        <p:cNvPr id="1" name=""/>
+        <p:cNvGrpSpPr/>
+        <p:nvPr/>
+      </p:nvGrpSpPr>
+      <p:grpSpPr>
+        <a:xfrm>
+          <a:off x="0" y="0"/>
+          <a:ext cx="0" cy="0"/>
+          <a:chOff x="0" y="0"/>
+          <a:chExt cx="0" cy="0"/>
+        </a:xfrm>
+      </p:grpSpPr>
+      <p:sp>
+        <p:nvSpPr>
+          <p:cNvPr id="6" name="Title 5"/>
+          <p:cNvSpPr>
+            <a:spLocks noGrp="1"/>
+          </p:cNvSpPr>
+          <p:nvPr>
+            <p:ph type="title"/>
+          </p:nvPr>
+        </p:nvSpPr>
+        <p:spPr/>
+        <p:txBody>
+          <a:bodyPr/>
+          <a:lstStyle/>
+          <a:p>
+            <a:r>
+              <a:rPr lang="en-US" dirty="0" err="1" smtClean="0"/>
+              <a:t>Backtesting</a:t>
+            </a:r>
+            <a:r>
+              <a:rPr lang="en-US" dirty="0" smtClean="0"/>
+              <a:t> Method</a:t>
+            </a:r>
+            <a:endParaRPr lang="en-US" dirty="0"/>
+          </a:p>
+        </p:txBody>
+      </p:sp>
+      <mc:AlternateContent xmlns:mc="http://schemas.openxmlformats.org/markup-compatibility/2006">
+        <mc:Choice xmlns:a14="http://schemas.microsoft.com/office/drawing/2010/main" Requires="a14">
+          <p:sp>
+            <p:nvSpPr>
+              <p:cNvPr id="7" name="Content Placeholder 6"/>
+              <p:cNvSpPr>
+                <a:spLocks noGrp="1"/>
+              </p:cNvSpPr>
+              <p:nvPr>
+                <p:ph idx="1"/>
+              </p:nvPr>
+            </p:nvSpPr>
+            <p:spPr/>
+            <p:txBody>
+              <a:bodyPr/>
+              <a:lstStyle/>
+              <a:p>
+                <a:r>
+                  <a:rPr lang="en-US" dirty="0" smtClean="0"/>
+                  <a:t>Current credit requirement is a function of the Bid Curve and the Reference Price.</a:t>
+                </a:r>
+              </a:p>
+              <a:p>
+                <a:pPr marL="0" indent="0">
+                  <a:buNone/>
+                </a:pPr>
+                <a14:m>
+                  <m:oMathPara xmlns:m="http://schemas.openxmlformats.org/officeDocument/2006/math">
+                    <m:oMathParaPr>
+                      <m:jc m:val="centerGroup"/>
+                    </m:oMathParaPr>
+                    <m:oMath xmlns:m="http://schemas.openxmlformats.org/officeDocument/2006/math">
+                      <m:r>
+                        <a:rPr lang="en-US" b="0" i="1" smtClean="0">
+                          <a:latin typeface="Cambria Math" panose="02040503050406030204" pitchFamily="18" charset="0"/>
+                        </a:rPr>
+                        <m:t>𝑓</m:t>
+                      </m:r>
+                      <m:r>
+                        <a:rPr lang="en-US" b="0" i="1" smtClean="0">
+                          <a:latin typeface="Cambria Math" panose="02040503050406030204" pitchFamily="18" charset="0"/>
+                        </a:rPr>
+                        <m:t>(</m:t>
+                      </m:r>
+                      <m:r>
+                        <m:rPr>
+                          <m:nor/>
+                        </m:rPr>
+                        <a:rPr lang="en-US" b="0" i="0" smtClean="0">
+                          <a:latin typeface="Cambria Math" panose="02040503050406030204" pitchFamily="18" charset="0"/>
+                        </a:rPr>
+                        <m:t>BidCurve</m:t>
+                      </m:r>
+                      <m:r>
+                        <a:rPr lang="en-US" b="0" i="1" smtClean="0">
+                          <a:latin typeface="Cambria Math" panose="02040503050406030204" pitchFamily="18" charset="0"/>
+                        </a:rPr>
+                        <m:t>, </m:t>
+                      </m:r>
+                      <m:r>
+                        <m:rPr>
+                          <m:nor/>
+                        </m:rPr>
+                        <a:rPr lang="en-US" b="0" i="0" smtClean="0">
+                          <a:latin typeface="Cambria Math" panose="02040503050406030204" pitchFamily="18" charset="0"/>
+                        </a:rPr>
+                        <m:t>ReferencePrice</m:t>
+                      </m:r>
+                      <m:r>
+                        <a:rPr lang="en-US" b="0" i="1" smtClean="0">
+                          <a:latin typeface="Cambria Math" panose="02040503050406030204" pitchFamily="18" charset="0"/>
+                        </a:rPr>
+                        <m:t>)</m:t>
+                      </m:r>
+                    </m:oMath>
+                  </m:oMathPara>
+                </a14:m>
+                <a:endParaRPr lang="en-US" dirty="0" smtClean="0"/>
+              </a:p>
+              <a:p>
+                <a:pPr marL="0" indent="0">
+                  <a:buNone/>
+                </a:pPr>
+                <a:endParaRPr lang="en-US" dirty="0"/>
+              </a:p>
+              <a:p>
+                <a:r>
+                  <a:rPr lang="en-US" dirty="0" smtClean="0"/>
+                  <a:t>We can apply the same function to the actual value</a:t>
+                </a:r>
+              </a:p>
+              <a:p>
+                <a:pPr marL="0" indent="0">
+                  <a:buNone/>
+                </a:pPr>
+                <a14:m>
+                  <m:oMathPara xmlns:m="http://schemas.openxmlformats.org/officeDocument/2006/math">
+                    <m:oMathParaPr>
+                      <m:jc m:val="centerGroup"/>
+                    </m:oMathParaPr>
+                    <m:oMath xmlns:m="http://schemas.openxmlformats.org/officeDocument/2006/math">
+                      <m:r>
+                        <a:rPr lang="en-US" i="1">
+                          <a:latin typeface="Cambria Math" panose="02040503050406030204" pitchFamily="18" charset="0"/>
+                        </a:rPr>
+                        <m:t>𝑓</m:t>
+                      </m:r>
+                      <m:r>
+                        <a:rPr lang="en-US" i="1">
+                          <a:latin typeface="Cambria Math" panose="02040503050406030204" pitchFamily="18" charset="0"/>
+                        </a:rPr>
+                        <m:t>(</m:t>
+                      </m:r>
+                      <m:r>
+                        <m:rPr>
+                          <m:nor/>
+                        </m:rPr>
+                        <a:rPr lang="en-US">
+                          <a:latin typeface="Cambria Math" panose="02040503050406030204" pitchFamily="18" charset="0"/>
+                        </a:rPr>
+                        <m:t>BidCurve</m:t>
+                      </m:r>
+                      <m:r>
+                        <a:rPr lang="en-US" i="1">
+                          <a:latin typeface="Cambria Math" panose="02040503050406030204" pitchFamily="18" charset="0"/>
+                        </a:rPr>
+                        <m:t>, </m:t>
+                      </m:r>
+                      <m:r>
+                        <m:rPr>
+                          <m:nor/>
+                        </m:rPr>
+                        <a:rPr lang="en-US" b="0" i="0" smtClean="0">
+                          <a:latin typeface="Cambria Math" panose="02040503050406030204" pitchFamily="18" charset="0"/>
+                        </a:rPr>
+                        <m:t>ActualValue</m:t>
+                      </m:r>
+                      <m:r>
+                        <a:rPr lang="en-US" i="1">
+                          <a:latin typeface="Cambria Math" panose="02040503050406030204" pitchFamily="18" charset="0"/>
+                        </a:rPr>
+                        <m:t>)</m:t>
+                      </m:r>
+                    </m:oMath>
+                  </m:oMathPara>
+                </a14:m>
+                <a:endParaRPr lang="en-US" dirty="0"/>
+              </a:p>
+            </p:txBody>
+          </p:sp>
+        </mc:Choice>
+        <mc:Fallback>
+          <p:sp>
+            <p:nvSpPr>
+              <p:cNvPr id="7" name="Content Placeholder 6"/>
+              <p:cNvSpPr>
+                <a:spLocks noGrp="1" noRot="1" noChangeAspect="1" noMove="1" noResize="1" noEditPoints="1" noAdjustHandles="1" noChangeArrowheads="1" noChangeShapeType="1" noTextEdit="1"/>
+              </p:cNvSpPr>
+              <p:nvPr>
+                <p:ph idx="1"/>
+              </p:nvPr>
+            </p:nvSpPr>
+            <p:spPr>
+              <a:blipFill>
+                <a:blip r:embed="rId2"/>
+                <a:stretch>
+                  <a:fillRect l="-1704" t="-1752"/>
+                </a:stretch>
+              </a:blipFill>
+            </p:spPr>
+            <p:txBody>
+              <a:bodyPr/>
+              <a:lstStyle/>
+              <a:p>
+                <a:r>
+                  <a:rPr lang="en-US">
+                    <a:noFill/>
+                  </a:rPr>
+                  <a:t> </a:t>
+                </a:r>
+              </a:p>
+            </p:txBody>
+          </p:sp>
+        </mc:Fallback>
+      </mc:AlternateContent>
+      <p:sp>
+        <p:nvSpPr>
+          <p:cNvPr id="4" name="Slide Number Placeholder 3"/>
+          <p:cNvSpPr>
+            <a:spLocks noGrp="1"/>
+          </p:cNvSpPr>
+          <p:nvPr>
+            <p:ph type="sldNum" sz="quarter" idx="12"/>
+          </p:nvPr>
+        </p:nvSpPr>
+        <p:spPr/>
+        <p:txBody>
+          <a:bodyPr/>
+          <a:lstStyle/>
+          <a:p>
+            <a:fld id="{08ED2EC4-456D-42C8-8DCA-F679E5FEF3E2}" type="slidenum">
+              <a:rPr lang="en-US" smtClean="0"/>
+              <a:pPr/>
+              <a:t>19</a:t>
+            </a:fld>
+            <a:endParaRPr lang="en-US"/>
+          </a:p>
+        </p:txBody>
+      </p:sp>
+      <p:sp>
+        <p:nvSpPr>
+          <p:cNvPr id="5" name="Date Placeholder 4"/>
+          <p:cNvSpPr>
+            <a:spLocks noGrp="1"/>
+          </p:cNvSpPr>
+          <p:nvPr>
+            <p:ph type="dt" sz="half" idx="10"/>
+          </p:nvPr>
+        </p:nvSpPr>
+        <p:spPr/>
+        <p:txBody>
+          <a:bodyPr/>
+          <a:lstStyle/>
+          <a:p>
+            <a:fld id="{0F631D50-F0AA-46A8-84F7-AFEADD7F3562}" type="datetime1">
+              <a:rPr lang="en-US" smtClean="0"/>
+              <a:pPr/>
+              <a:t>5/17/2017</a:t>
+            </a:fld>
+            <a:endParaRPr lang="en-US"/>
+          </a:p>
+        </p:txBody>
+      </p:sp>
+    </p:spTree>
+    <p:extLst>
+      <p:ext uri="{BB962C8B-B14F-4D97-AF65-F5344CB8AC3E}">
+        <p14:creationId xmlns:p14="http://schemas.microsoft.com/office/powerpoint/2010/main" val="2664456817"/>
+      </p:ext>
+    </p:extLst>
+  </p:cSld>
+  <p:clrMapOvr>
+    <a:masterClrMapping/>
+  </p:clrMapOvr>
+</p:sld>
+</file>
+
+<file path=ppt/slides/slide2.xml><?xml version="1.0" encoding="utf-8"?>
+<p:sld xmlns:a="http://schemas.openxmlformats.org/drawingml/2006/main" xmlns:r="http://schemas.openxmlformats.org/officeDocument/2006/relationships" xmlns:p="http://schemas.openxmlformats.org/presentationml/2006/main">
+  <p:cSld>
+    <p:spTree>
+      <p:nvGrpSpPr>
+        <p:cNvPr id="1" name=""/>
+        <p:cNvGrpSpPr/>
+        <p:nvPr/>
+      </p:nvGrpSpPr>
+      <p:grpSpPr>
+        <a:xfrm>
+          <a:off x="0" y="0"/>
+          <a:ext cx="0" cy="0"/>
+          <a:chOff x="0" y="0"/>
+          <a:chExt cx="0" cy="0"/>
+        </a:xfrm>
+      </p:grpSpPr>
+      <p:sp>
+        <p:nvSpPr>
+          <p:cNvPr id="2" name="Title 1"/>
+          <p:cNvSpPr>
+            <a:spLocks noGrp="1"/>
+          </p:cNvSpPr>
+          <p:nvPr>
+            <p:ph type="title"/>
+          </p:nvPr>
+        </p:nvSpPr>
+        <p:spPr/>
+        <p:txBody>
+          <a:bodyPr/>
+          <a:lstStyle/>
+          <a:p>
+            <a:r>
+              <a:rPr lang="en-US" dirty="0" smtClean="0"/>
+              <a:t>Motivation</a:t>
+            </a:r>
+            <a:endParaRPr lang="en-US" dirty="0"/>
+          </a:p>
+        </p:txBody>
+      </p:sp>
+      <p:sp>
+        <p:nvSpPr>
+          <p:cNvPr id="3" name="Content Placeholder 2"/>
+          <p:cNvSpPr>
+            <a:spLocks noGrp="1"/>
+          </p:cNvSpPr>
+          <p:nvPr>
+            <p:ph idx="1"/>
+          </p:nvPr>
+        </p:nvSpPr>
+        <p:spPr/>
+        <p:txBody>
+          <a:bodyPr/>
+          <a:lstStyle/>
+          <a:p>
+            <a:r>
+              <a:rPr lang="en-US" dirty="0" smtClean="0"/>
+              <a:t>Why over-collateralization is not good:</a:t>
+            </a:r>
+          </a:p>
+          <a:p>
+            <a:pPr lvl="1"/>
+            <a:r>
+              <a:rPr lang="en-US" dirty="0" smtClean="0"/>
+              <a:t>Illiquid market</a:t>
+            </a:r>
+          </a:p>
+          <a:p>
+            <a:pPr lvl="2"/>
+            <a:r>
+              <a:rPr lang="en-US" dirty="0" smtClean="0"/>
+              <a:t>Auction values are not reflective of actual market value, but may include the cost of posting such collateral</a:t>
+            </a:r>
+          </a:p>
+          <a:p>
+            <a:pPr lvl="2"/>
+            <a:endParaRPr lang="en-US" dirty="0" smtClean="0"/>
+          </a:p>
+          <a:p>
+            <a:pPr lvl="1"/>
+            <a:r>
+              <a:rPr lang="en-US" dirty="0" smtClean="0"/>
+              <a:t>Inefficiency</a:t>
+            </a:r>
+          </a:p>
+          <a:p>
+            <a:pPr lvl="2"/>
+            <a:r>
+              <a:rPr lang="en-US" dirty="0" smtClean="0"/>
+              <a:t>Lack of </a:t>
+            </a:r>
+            <a:r>
+              <a:rPr lang="en-US" dirty="0" err="1" smtClean="0"/>
+              <a:t>counterflow</a:t>
+            </a:r>
+            <a:r>
+              <a:rPr lang="en-US" dirty="0" smtClean="0"/>
+              <a:t> bids may result in high clearing price on paths that affect binding constraints in the prevailing direction</a:t>
+            </a:r>
+            <a:endParaRPr lang="en-US" dirty="0"/>
+          </a:p>
+        </p:txBody>
+      </p:sp>
+      <p:sp>
+        <p:nvSpPr>
+          <p:cNvPr id="4" name="Date Placeholder 3"/>
+          <p:cNvSpPr>
+            <a:spLocks noGrp="1"/>
+          </p:cNvSpPr>
+          <p:nvPr>
+            <p:ph type="dt" sz="half" idx="10"/>
+          </p:nvPr>
+        </p:nvSpPr>
+        <p:spPr/>
+        <p:txBody>
+          <a:bodyPr/>
+          <a:lstStyle/>
+          <a:p>
+            <a:fld id="{02EE789E-1D84-4897-8ED5-C6C6A8AFBCC7}" type="datetime1">
+              <a:rPr lang="en-US" smtClean="0"/>
+              <a:t>5/17/2017</a:t>
+            </a:fld>
+            <a:endParaRPr lang="en-US"/>
+          </a:p>
+        </p:txBody>
+      </p:sp>
+      <p:sp>
+        <p:nvSpPr>
+          <p:cNvPr id="5" name="Slide Number Placeholder 4"/>
+          <p:cNvSpPr>
+            <a:spLocks noGrp="1"/>
+          </p:cNvSpPr>
+          <p:nvPr>
+            <p:ph type="sldNum" sz="quarter" idx="12"/>
+          </p:nvPr>
+        </p:nvSpPr>
+        <p:spPr/>
+        <p:txBody>
+          <a:bodyPr/>
+          <a:lstStyle/>
+          <a:p>
+            <a:fld id="{08ED2EC4-456D-42C8-8DCA-F679E5FEF3E2}" type="slidenum">
+              <a:rPr lang="en-US" smtClean="0"/>
+              <a:pPr/>
+              <a:t>2</a:t>
+            </a:fld>
+            <a:endParaRPr lang="en-US"/>
+          </a:p>
+        </p:txBody>
+      </p:sp>
+    </p:spTree>
+    <p:extLst>
+      <p:ext uri="{BB962C8B-B14F-4D97-AF65-F5344CB8AC3E}">
+        <p14:creationId xmlns:p14="http://schemas.microsoft.com/office/powerpoint/2010/main" val="481656138"/>
+      </p:ext>
+    </p:extLst>
+  </p:cSld>
+  <p:clrMapOvr>
+    <a:masterClrMapping/>
+  </p:clrMapOvr>
+  <p:timing>
+    <p:tnLst>
+      <p:par>
+        <p:cTn id="1" dur="indefinite" restart="never" nodeType="tmRoot"/>
+      </p:par>
+    </p:tnLst>
+  </p:timing>
+</p:sld>
+</file>
+
+<file path=ppt/slides/slide20.xml><?xml version="1.0" encoding="utf-8"?>
+<p:sld xmlns:a="http://schemas.openxmlformats.org/drawingml/2006/main" xmlns:r="http://schemas.openxmlformats.org/officeDocument/2006/relationships" xmlns:p="http://schemas.openxmlformats.org/presentationml/2006/main">
+  <p:cSld>
+    <p:spTree>
+      <p:nvGrpSpPr>
+        <p:cNvPr id="1" name=""/>
+        <p:cNvGrpSpPr/>
+        <p:nvPr/>
+      </p:nvGrpSpPr>
+      <p:grpSpPr>
+        <a:xfrm>
+          <a:off x="0" y="0"/>
+          <a:ext cx="0" cy="0"/>
+          <a:chOff x="0" y="0"/>
+          <a:chExt cx="0" cy="0"/>
+        </a:xfrm>
+      </p:grpSpPr>
+      <p:sp>
+        <p:nvSpPr>
+          <p:cNvPr id="2" name="Title 1"/>
+          <p:cNvSpPr>
+            <a:spLocks noGrp="1"/>
+          </p:cNvSpPr>
+          <p:nvPr>
+            <p:ph type="title"/>
+          </p:nvPr>
+        </p:nvSpPr>
+        <p:spPr/>
+        <p:txBody>
+          <a:bodyPr/>
+          <a:lstStyle/>
+          <a:p>
+            <a:r>
+              <a:rPr lang="en-US" dirty="0" err="1"/>
+              <a:t>Backtesting</a:t>
+            </a:r>
+            <a:r>
+              <a:rPr lang="en-US" dirty="0"/>
+              <a:t> Method</a:t>
+            </a:r>
+          </a:p>
+        </p:txBody>
+      </p:sp>
+      <mc:AlternateContent xmlns:mc="http://schemas.openxmlformats.org/markup-compatibility/2006">
+        <mc:Choice xmlns:a14="http://schemas.microsoft.com/office/drawing/2010/main" Requires="a14">
+          <p:sp>
+            <p:nvSpPr>
+              <p:cNvPr id="3" name="Content Placeholder 2"/>
+              <p:cNvSpPr>
+                <a:spLocks noGrp="1"/>
+              </p:cNvSpPr>
+              <p:nvPr>
+                <p:ph idx="1"/>
+              </p:nvPr>
+            </p:nvSpPr>
+            <p:spPr/>
+            <p:txBody>
+              <a:bodyPr/>
+              <a:lstStyle/>
+              <a:p>
+                <a:r>
+                  <a:rPr lang="en-US" dirty="0" smtClean="0"/>
+                  <a:t>We assess Over-Collateralization if the collateral requirements using Reference Price is higher than using the Actual Value.</a:t>
+                </a:r>
+              </a:p>
+              <a:p>
+                <a:endParaRPr lang="en-US" dirty="0" smtClean="0"/>
+              </a:p>
+              <a:p>
+                <a:pPr marL="0" indent="0" algn="ctr">
+                  <a:buNone/>
+                </a:pPr>
+                <a14:m>
+                  <m:oMath xmlns:m="http://schemas.openxmlformats.org/officeDocument/2006/math">
+                    <m:r>
+                      <a:rPr lang="en-US" sz="2400" i="1">
+                        <a:latin typeface="Cambria Math" panose="02040503050406030204" pitchFamily="18" charset="0"/>
+                      </a:rPr>
+                      <m:t>𝑓</m:t>
+                    </m:r>
+                    <m:r>
+                      <a:rPr lang="en-US" sz="2400" i="1">
+                        <a:latin typeface="Cambria Math" panose="02040503050406030204" pitchFamily="18" charset="0"/>
+                      </a:rPr>
+                      <m:t>(</m:t>
+                    </m:r>
+                    <m:r>
+                      <m:rPr>
+                        <m:nor/>
+                      </m:rPr>
+                      <a:rPr lang="en-US" sz="2400">
+                        <a:latin typeface="Cambria Math" panose="02040503050406030204" pitchFamily="18" charset="0"/>
+                      </a:rPr>
+                      <m:t>BidCurve</m:t>
+                    </m:r>
+                    <m:r>
+                      <a:rPr lang="en-US" sz="2400" i="1">
+                        <a:latin typeface="Cambria Math" panose="02040503050406030204" pitchFamily="18" charset="0"/>
+                      </a:rPr>
+                      <m:t>, </m:t>
+                    </m:r>
+                    <m:r>
+                      <m:rPr>
+                        <m:nor/>
+                      </m:rPr>
+                      <a:rPr lang="en-US" sz="2400">
+                        <a:latin typeface="Cambria Math" panose="02040503050406030204" pitchFamily="18" charset="0"/>
+                      </a:rPr>
+                      <m:t>ReferencePrice</m:t>
+                    </m:r>
+                    <m:r>
+                      <a:rPr lang="en-US" sz="2400" i="1">
+                        <a:latin typeface="Cambria Math" panose="02040503050406030204" pitchFamily="18" charset="0"/>
+                      </a:rPr>
+                      <m:t>)</m:t>
+                    </m:r>
+                  </m:oMath>
+                </a14:m>
+                <a:r>
+                  <a:rPr lang="en-US" sz="2400" dirty="0" smtClean="0"/>
+                  <a:t> &gt; </a:t>
+                </a:r>
+                <a14:m>
+                  <m:oMath xmlns:m="http://schemas.openxmlformats.org/officeDocument/2006/math">
+                    <m:r>
+                      <a:rPr lang="en-US" sz="2400" i="1">
+                        <a:latin typeface="Cambria Math" panose="02040503050406030204" pitchFamily="18" charset="0"/>
+                      </a:rPr>
+                      <m:t>𝑓</m:t>
+                    </m:r>
+                    <m:d>
+                      <m:dPr>
+                        <m:ctrlPr>
+                          <a:rPr lang="en-US" sz="2400" i="1">
+                            <a:latin typeface="Cambria Math" panose="02040503050406030204" pitchFamily="18" charset="0"/>
+                          </a:rPr>
+                        </m:ctrlPr>
+                      </m:dPr>
+                      <m:e>
+                        <m:r>
+                          <m:rPr>
+                            <m:nor/>
+                          </m:rPr>
+                          <a:rPr lang="en-US" sz="2400">
+                            <a:latin typeface="Cambria Math" panose="02040503050406030204" pitchFamily="18" charset="0"/>
+                          </a:rPr>
+                          <m:t>BidCurve</m:t>
+                        </m:r>
+                        <m:r>
+                          <a:rPr lang="en-US" sz="2400" i="1">
+                            <a:latin typeface="Cambria Math" panose="02040503050406030204" pitchFamily="18" charset="0"/>
+                          </a:rPr>
+                          <m:t>, </m:t>
+                        </m:r>
+                        <m:r>
+                          <m:rPr>
+                            <m:nor/>
+                          </m:rPr>
+                          <a:rPr lang="en-US" sz="2400">
+                            <a:latin typeface="Cambria Math" panose="02040503050406030204" pitchFamily="18" charset="0"/>
+                          </a:rPr>
+                          <m:t>ActualValue</m:t>
+                        </m:r>
+                      </m:e>
+                    </m:d>
+                  </m:oMath>
+                </a14:m>
+                <a:endParaRPr lang="en-US" sz="2400" dirty="0" smtClean="0"/>
+              </a:p>
+              <a:p>
+                <a:pPr marL="0" indent="0" algn="ctr">
+                  <a:buNone/>
+                </a:pPr>
+                <a:endParaRPr lang="en-US" sz="3600" dirty="0" smtClean="0"/>
+              </a:p>
+              <a:p>
+                <a:r>
+                  <a:rPr lang="en-US" sz="3600" dirty="0" smtClean="0"/>
+                  <a:t>Similarly, we can assess Under-Collateralization</a:t>
+                </a:r>
+                <a:endParaRPr lang="en-US" sz="3600" dirty="0"/>
+              </a:p>
+            </p:txBody>
+          </p:sp>
+        </mc:Choice>
+        <mc:Fallback>
+          <p:sp>
+            <p:nvSpPr>
+              <p:cNvPr id="3" name="Content Placeholder 2"/>
+              <p:cNvSpPr>
+                <a:spLocks noGrp="1" noRot="1" noChangeAspect="1" noMove="1" noResize="1" noEditPoints="1" noAdjustHandles="1" noChangeArrowheads="1" noChangeShapeType="1" noTextEdit="1"/>
+              </p:cNvSpPr>
+              <p:nvPr>
+                <p:ph idx="1"/>
+              </p:nvPr>
+            </p:nvSpPr>
+            <p:spPr>
+              <a:blipFill>
+                <a:blip r:embed="rId2"/>
+                <a:stretch>
+                  <a:fillRect l="-2000" t="-1752" r="-2741" b="-4852"/>
+                </a:stretch>
+              </a:blipFill>
+            </p:spPr>
+            <p:txBody>
+              <a:bodyPr/>
+              <a:lstStyle/>
+              <a:p>
+                <a:r>
+                  <a:rPr lang="en-US">
+                    <a:noFill/>
+                  </a:rPr>
+                  <a:t> </a:t>
+                </a:r>
+              </a:p>
+            </p:txBody>
+          </p:sp>
+        </mc:Fallback>
+      </mc:AlternateContent>
+      <p:sp>
+        <p:nvSpPr>
+          <p:cNvPr id="4" name="Slide Number Placeholder 3"/>
+          <p:cNvSpPr>
+            <a:spLocks noGrp="1"/>
+          </p:cNvSpPr>
+          <p:nvPr>
+            <p:ph type="sldNum" sz="quarter" idx="12"/>
+          </p:nvPr>
+        </p:nvSpPr>
+        <p:spPr/>
+        <p:txBody>
+          <a:bodyPr/>
+          <a:lstStyle/>
+          <a:p>
+            <a:fld id="{08ED2EC4-456D-42C8-8DCA-F679E5FEF3E2}" type="slidenum">
+              <a:rPr lang="en-US" smtClean="0"/>
+              <a:pPr/>
+              <a:t>20</a:t>
+            </a:fld>
+            <a:endParaRPr lang="en-US"/>
+          </a:p>
+        </p:txBody>
+      </p:sp>
+      <p:sp>
+        <p:nvSpPr>
+          <p:cNvPr id="5" name="Date Placeholder 4"/>
+          <p:cNvSpPr>
+            <a:spLocks noGrp="1"/>
+          </p:cNvSpPr>
+          <p:nvPr>
+            <p:ph type="dt" sz="half" idx="10"/>
+          </p:nvPr>
+        </p:nvSpPr>
+        <p:spPr/>
+        <p:txBody>
+          <a:bodyPr/>
+          <a:lstStyle/>
+          <a:p>
+            <a:fld id="{15F1E40C-1ADA-49EE-97E6-66D3E249BA19}" type="datetime1">
+              <a:rPr lang="en-US" smtClean="0"/>
+              <a:t>5/17/2017</a:t>
+            </a:fld>
+            <a:endParaRPr lang="en-US"/>
+          </a:p>
+        </p:txBody>
+      </p:sp>
+    </p:spTree>
+    <p:extLst>
+      <p:ext uri="{BB962C8B-B14F-4D97-AF65-F5344CB8AC3E}">
+        <p14:creationId xmlns:p14="http://schemas.microsoft.com/office/powerpoint/2010/main" val="3306865538"/>
+      </p:ext>
+    </p:extLst>
+  </p:cSld>
+  <p:clrMapOvr>
+    <a:masterClrMapping/>
+  </p:clrMapOvr>
+</p:sld>
+</file>
+
+<file path=ppt/slides/slide21.xml><?xml version="1.0" encoding="utf-8"?>
+<p:sld xmlns:a="http://schemas.openxmlformats.org/drawingml/2006/main" xmlns:r="http://schemas.openxmlformats.org/officeDocument/2006/relationships" xmlns:p="http://schemas.openxmlformats.org/presentationml/2006/main">
+  <p:cSld>
+    <p:spTree>
+      <p:nvGrpSpPr>
+        <p:cNvPr id="1" name=""/>
+        <p:cNvGrpSpPr/>
+        <p:nvPr/>
+      </p:nvGrpSpPr>
+      <p:grpSpPr>
+        <a:xfrm>
+          <a:off x="0" y="0"/>
+          <a:ext cx="0" cy="0"/>
+          <a:chOff x="0" y="0"/>
+          <a:chExt cx="0" cy="0"/>
+        </a:xfrm>
+      </p:grpSpPr>
+      <p:sp>
+        <p:nvSpPr>
+          <p:cNvPr id="4" name="Slide Number Placeholder 3"/>
+          <p:cNvSpPr>
+            <a:spLocks noGrp="1"/>
+          </p:cNvSpPr>
+          <p:nvPr>
+            <p:ph type="sldNum" sz="quarter" idx="12"/>
+          </p:nvPr>
+        </p:nvSpPr>
+        <p:spPr/>
+        <p:txBody>
+          <a:bodyPr/>
+          <a:lstStyle/>
+          <a:p>
+            <a:fld id="{08ED2EC4-456D-42C8-8DCA-F679E5FEF3E2}" type="slidenum">
+              <a:rPr lang="en-US" smtClean="0"/>
+              <a:pPr/>
+              <a:t>21</a:t>
+            </a:fld>
+            <a:endParaRPr lang="en-US"/>
+          </a:p>
+        </p:txBody>
+      </p:sp>
+      <p:sp>
+        <p:nvSpPr>
+          <p:cNvPr id="5" name="Date Placeholder 4"/>
+          <p:cNvSpPr>
+            <a:spLocks noGrp="1"/>
+          </p:cNvSpPr>
+          <p:nvPr>
+            <p:ph type="dt" sz="half" idx="10"/>
+          </p:nvPr>
+        </p:nvSpPr>
+        <p:spPr/>
+        <p:txBody>
+          <a:bodyPr/>
+          <a:lstStyle/>
+          <a:p>
+            <a:fld id="{15F1E40C-1ADA-49EE-97E6-66D3E249BA19}" type="datetime1">
+              <a:rPr lang="en-US" smtClean="0"/>
+              <a:t>5/17/2017</a:t>
+            </a:fld>
+            <a:endParaRPr lang="en-US"/>
+          </a:p>
+        </p:txBody>
+      </p:sp>
+      <p:sp>
+        <p:nvSpPr>
+          <p:cNvPr id="2" name="Title 1"/>
+          <p:cNvSpPr>
+            <a:spLocks noGrp="1"/>
+          </p:cNvSpPr>
+          <p:nvPr>
+            <p:ph type="title" idx="4294967295"/>
+          </p:nvPr>
+        </p:nvSpPr>
+        <p:spPr>
+          <a:xfrm>
+            <a:off x="0" y="552450"/>
+            <a:ext cx="8229600" cy="865188"/>
+          </a:xfrm>
+        </p:spPr>
+        <p:txBody>
+          <a:bodyPr/>
+          <a:lstStyle/>
+          <a:p>
+            <a:r>
+              <a:rPr lang="en-US" dirty="0" smtClean="0"/>
+              <a:t>Which bids do we consider?</a:t>
+            </a:r>
+            <a:endParaRPr lang="en-US" dirty="0"/>
+          </a:p>
+        </p:txBody>
+      </p:sp>
+      <p:sp>
+        <p:nvSpPr>
+          <p:cNvPr id="6" name="Rectangle 5"/>
+          <p:cNvSpPr/>
+          <p:nvPr/>
+        </p:nvSpPr>
+        <p:spPr>
+          <a:xfrm>
+            <a:off x="1066800" y="1947333"/>
+            <a:ext cx="7128933" cy="3945467"/>
+          </a:xfrm>
+          <a:prstGeom prst="rect">
+            <a:avLst/>
+          </a:prstGeom>
+          <a:solidFill>
+            <a:schemeClr val="accent1">
+              <a:lumMod val="20000"/>
+              <a:lumOff val="80000"/>
+            </a:schemeClr>
+          </a:solidFill>
+        </p:spPr>
+        <p:style>
+          <a:lnRef idx="2">
+            <a:schemeClr val="accent1">
+              <a:shade val="50000"/>
+            </a:schemeClr>
+          </a:lnRef>
+          <a:fillRef idx="1">
+            <a:schemeClr val="accent1"/>
+          </a:fillRef>
+          <a:effectRef idx="0">
+            <a:schemeClr val="accent1"/>
+          </a:effectRef>
+          <a:fontRef idx="minor">
+            <a:schemeClr val="lt1"/>
+          </a:fontRef>
+        </p:style>
+        <p:txBody>
+          <a:bodyPr rtlCol="0" anchor="t" anchorCtr="0"/>
+          <a:lstStyle/>
+          <a:p>
+            <a:endParaRPr lang="en-US" dirty="0"/>
+          </a:p>
+        </p:txBody>
+      </p:sp>
+      <p:sp>
+        <p:nvSpPr>
+          <p:cNvPr id="7" name="Rectangle 6"/>
+          <p:cNvSpPr/>
+          <p:nvPr/>
+        </p:nvSpPr>
+        <p:spPr>
+          <a:xfrm>
+            <a:off x="1066800" y="1600206"/>
+            <a:ext cx="1557867" cy="350416"/>
+          </a:xfrm>
+          <a:prstGeom prst="rect">
+            <a:avLst/>
+          </a:prstGeom>
+          <a:noFill/>
+          <a:ln>
+            <a:noFill/>
+          </a:ln>
+        </p:spPr>
+        <p:style>
+          <a:lnRef idx="2">
+            <a:schemeClr val="accent1">
+              <a:shade val="50000"/>
+            </a:schemeClr>
+          </a:lnRef>
+          <a:fillRef idx="1">
+            <a:schemeClr val="accent1"/>
+          </a:fillRef>
+          <a:effectRef idx="0">
+            <a:schemeClr val="accent1"/>
+          </a:effectRef>
+          <a:fontRef idx="minor">
+            <a:schemeClr val="lt1"/>
+          </a:fontRef>
+        </p:style>
+        <p:txBody>
+          <a:bodyPr rtlCol="0" anchor="ctr"/>
+          <a:lstStyle/>
+          <a:p>
+            <a:r>
+              <a:rPr lang="en-US" dirty="0" smtClean="0">
+                <a:solidFill>
+                  <a:schemeClr val="tx1"/>
+                </a:solidFill>
+              </a:rPr>
+              <a:t>All Bids</a:t>
+            </a:r>
+            <a:endParaRPr lang="en-US" dirty="0">
+              <a:solidFill>
+                <a:schemeClr val="tx1"/>
+              </a:solidFill>
+            </a:endParaRPr>
+          </a:p>
+        </p:txBody>
+      </p:sp>
+      <p:sp>
+        <p:nvSpPr>
+          <p:cNvPr id="8" name="Rectangle 7"/>
+          <p:cNvSpPr/>
+          <p:nvPr/>
+        </p:nvSpPr>
+        <p:spPr>
+          <a:xfrm>
+            <a:off x="2429933" y="2667000"/>
+            <a:ext cx="5012267" cy="2853267"/>
+          </a:xfrm>
+          <a:prstGeom prst="rect">
+            <a:avLst/>
+          </a:prstGeom>
+          <a:solidFill>
+            <a:schemeClr val="accent1">
+              <a:lumMod val="60000"/>
+              <a:lumOff val="40000"/>
+            </a:schemeClr>
+          </a:solidFill>
+        </p:spPr>
+        <p:style>
+          <a:lnRef idx="2">
+            <a:schemeClr val="accent1">
+              <a:shade val="50000"/>
+            </a:schemeClr>
+          </a:lnRef>
+          <a:fillRef idx="1">
+            <a:schemeClr val="accent1"/>
+          </a:fillRef>
+          <a:effectRef idx="0">
+            <a:schemeClr val="accent1"/>
+          </a:effectRef>
+          <a:fontRef idx="minor">
+            <a:schemeClr val="lt1"/>
+          </a:fontRef>
+        </p:style>
+        <p:txBody>
+          <a:bodyPr rtlCol="0" anchor="ctr"/>
+          <a:lstStyle/>
+          <a:p>
+            <a:pPr algn="ctr"/>
+            <a:endParaRPr lang="en-US"/>
+          </a:p>
+        </p:txBody>
+      </p:sp>
+      <p:sp>
+        <p:nvSpPr>
+          <p:cNvPr id="9" name="Rectangle 8"/>
+          <p:cNvSpPr/>
+          <p:nvPr/>
+        </p:nvSpPr>
+        <p:spPr>
+          <a:xfrm>
+            <a:off x="2429933" y="2316584"/>
+            <a:ext cx="2658534" cy="350416"/>
+          </a:xfrm>
+          <a:prstGeom prst="rect">
+            <a:avLst/>
+          </a:prstGeom>
+          <a:noFill/>
+          <a:ln>
+            <a:noFill/>
+          </a:ln>
+        </p:spPr>
+        <p:style>
+          <a:lnRef idx="2">
+            <a:schemeClr val="accent1">
+              <a:shade val="50000"/>
+            </a:schemeClr>
+          </a:lnRef>
+          <a:fillRef idx="1">
+            <a:schemeClr val="accent1"/>
+          </a:fillRef>
+          <a:effectRef idx="0">
+            <a:schemeClr val="accent1"/>
+          </a:effectRef>
+          <a:fontRef idx="minor">
+            <a:schemeClr val="lt1"/>
+          </a:fontRef>
+        </p:style>
+        <p:txBody>
+          <a:bodyPr rtlCol="0" anchor="ctr"/>
+          <a:lstStyle/>
+          <a:p>
+            <a:r>
+              <a:rPr lang="en-US" dirty="0" smtClean="0">
+                <a:solidFill>
+                  <a:schemeClr val="tx1"/>
+                </a:solidFill>
+              </a:rPr>
+              <a:t>Bids requiring Collateral</a:t>
+            </a:r>
+            <a:endParaRPr lang="en-US" dirty="0">
+              <a:solidFill>
+                <a:schemeClr val="tx1"/>
+              </a:solidFill>
+            </a:endParaRPr>
+          </a:p>
+        </p:txBody>
+      </p:sp>
+      <p:cxnSp>
+        <p:nvCxnSpPr>
+          <p:cNvPr id="11" name="Straight Connector 10"/>
+          <p:cNvCxnSpPr/>
+          <p:nvPr/>
+        </p:nvCxnSpPr>
+        <p:spPr>
+          <a:xfrm>
+            <a:off x="5401733" y="2667000"/>
+            <a:ext cx="0" cy="2853267"/>
+          </a:xfrm>
+          <a:prstGeom prst="line">
+            <a:avLst/>
+          </a:prstGeom>
+          <a:ln w="76200">
+            <a:solidFill>
+              <a:schemeClr val="accent1">
+                <a:lumMod val="50000"/>
+              </a:schemeClr>
+            </a:solidFill>
+          </a:ln>
+        </p:spPr>
+        <p:style>
+          <a:lnRef idx="1">
+            <a:schemeClr val="accent1"/>
+          </a:lnRef>
+          <a:fillRef idx="0">
+            <a:schemeClr val="accent1"/>
+          </a:fillRef>
+          <a:effectRef idx="0">
+            <a:schemeClr val="accent1"/>
+          </a:effectRef>
+          <a:fontRef idx="minor">
+            <a:schemeClr val="tx1"/>
+          </a:fontRef>
+        </p:style>
+      </p:cxnSp>
+      <p:sp>
+        <p:nvSpPr>
+          <p:cNvPr id="12" name="Rectangle 11"/>
+          <p:cNvSpPr/>
+          <p:nvPr/>
+        </p:nvSpPr>
+        <p:spPr>
+          <a:xfrm>
+            <a:off x="2895599" y="3743216"/>
+            <a:ext cx="1752601" cy="752583"/>
+          </a:xfrm>
+          <a:prstGeom prst="rect">
+            <a:avLst/>
+          </a:prstGeom>
+          <a:noFill/>
+          <a:ln>
+            <a:noFill/>
+          </a:ln>
+        </p:spPr>
+        <p:style>
+          <a:lnRef idx="2">
+            <a:schemeClr val="accent1">
+              <a:shade val="50000"/>
+            </a:schemeClr>
+          </a:lnRef>
+          <a:fillRef idx="1">
+            <a:schemeClr val="accent1"/>
+          </a:fillRef>
+          <a:effectRef idx="0">
+            <a:schemeClr val="accent1"/>
+          </a:effectRef>
+          <a:fontRef idx="minor">
+            <a:schemeClr val="lt1"/>
+          </a:fontRef>
+        </p:style>
+        <p:txBody>
+          <a:bodyPr rtlCol="0" anchor="ctr"/>
+          <a:lstStyle/>
+          <a:p>
+            <a:r>
+              <a:rPr lang="en-US" dirty="0" smtClean="0">
+                <a:solidFill>
+                  <a:schemeClr val="tx1"/>
+                </a:solidFill>
+              </a:rPr>
+              <a:t>Over-Collateralization</a:t>
+            </a:r>
+            <a:endParaRPr lang="en-US" dirty="0">
+              <a:solidFill>
+                <a:schemeClr val="tx1"/>
+              </a:solidFill>
+            </a:endParaRPr>
+          </a:p>
+        </p:txBody>
+      </p:sp>
+      <p:sp>
+        <p:nvSpPr>
+          <p:cNvPr id="13" name="Rectangle 12"/>
+          <p:cNvSpPr/>
+          <p:nvPr/>
+        </p:nvSpPr>
+        <p:spPr>
+          <a:xfrm>
+            <a:off x="5676899" y="3717341"/>
+            <a:ext cx="1752601" cy="752583"/>
+          </a:xfrm>
+          <a:prstGeom prst="rect">
+            <a:avLst/>
+          </a:prstGeom>
+          <a:noFill/>
+          <a:ln>
+            <a:noFill/>
+          </a:ln>
+        </p:spPr>
+        <p:style>
+          <a:lnRef idx="2">
+            <a:schemeClr val="accent1">
+              <a:shade val="50000"/>
+            </a:schemeClr>
+          </a:lnRef>
+          <a:fillRef idx="1">
+            <a:schemeClr val="accent1"/>
+          </a:fillRef>
+          <a:effectRef idx="0">
+            <a:schemeClr val="accent1"/>
+          </a:effectRef>
+          <a:fontRef idx="minor">
+            <a:schemeClr val="lt1"/>
+          </a:fontRef>
+        </p:style>
+        <p:txBody>
+          <a:bodyPr rtlCol="0" anchor="ctr"/>
+          <a:lstStyle/>
+          <a:p>
+            <a:r>
+              <a:rPr lang="en-US" dirty="0" smtClean="0">
+                <a:solidFill>
+                  <a:schemeClr val="tx1"/>
+                </a:solidFill>
+              </a:rPr>
+              <a:t>Under-Collateralization</a:t>
+            </a:r>
+            <a:endParaRPr lang="en-US" dirty="0">
+              <a:solidFill>
+                <a:schemeClr val="tx1"/>
+              </a:solidFill>
+            </a:endParaRPr>
+          </a:p>
+        </p:txBody>
+      </p:sp>
+    </p:spTree>
+    <p:extLst>
+      <p:ext uri="{BB962C8B-B14F-4D97-AF65-F5344CB8AC3E}">
+        <p14:creationId xmlns:p14="http://schemas.microsoft.com/office/powerpoint/2010/main" val="760653283"/>
+      </p:ext>
+    </p:extLst>
+  </p:cSld>
+  <p:clrMapOvr>
+    <a:masterClrMapping/>
+  </p:clrMapOvr>
+</p:sld>
+</file>
+
+<file path=ppt/slides/slide22.xml><?xml version="1.0" encoding="utf-8"?>
+<p:sld xmlns:a="http://schemas.openxmlformats.org/drawingml/2006/main" xmlns:r="http://schemas.openxmlformats.org/officeDocument/2006/relationships" xmlns:p="http://schemas.openxmlformats.org/presentationml/2006/main">
+  <p:cSld>
+    <p:spTree>
+      <p:nvGrpSpPr>
+        <p:cNvPr id="1" name=""/>
+        <p:cNvGrpSpPr/>
+        <p:nvPr/>
+      </p:nvGrpSpPr>
+      <p:grpSpPr>
+        <a:xfrm>
+          <a:off x="0" y="0"/>
+          <a:ext cx="0" cy="0"/>
+          <a:chOff x="0" y="0"/>
+          <a:chExt cx="0" cy="0"/>
+        </a:xfrm>
+      </p:grpSpPr>
+      <p:sp>
+        <p:nvSpPr>
+          <p:cNvPr id="4" name="Title 3"/>
+          <p:cNvSpPr>
+            <a:spLocks noGrp="1"/>
+          </p:cNvSpPr>
+          <p:nvPr>
+            <p:ph type="title"/>
+          </p:nvPr>
+        </p:nvSpPr>
+        <p:spPr/>
+        <p:txBody>
+          <a:bodyPr/>
+          <a:lstStyle/>
+          <a:p>
+            <a:r>
+              <a:rPr lang="en-US" dirty="0"/>
+              <a:t>Which bids do we consider</a:t>
+            </a:r>
+            <a:r>
+              <a:rPr lang="en-US" dirty="0" smtClean="0"/>
+              <a:t>? (2)</a:t>
+            </a:r>
+            <a:endParaRPr lang="en-US" dirty="0"/>
+          </a:p>
+        </p:txBody>
+      </p:sp>
+      <p:sp>
+        <p:nvSpPr>
+          <p:cNvPr id="5" name="Content Placeholder 4"/>
+          <p:cNvSpPr>
+            <a:spLocks noGrp="1"/>
+          </p:cNvSpPr>
+          <p:nvPr>
+            <p:ph idx="1"/>
+          </p:nvPr>
+        </p:nvSpPr>
+        <p:spPr/>
+        <p:txBody>
+          <a:bodyPr/>
+          <a:lstStyle/>
+          <a:p>
+            <a:r>
+              <a:rPr lang="en-US" dirty="0" smtClean="0"/>
+              <a:t>We do not look at the bids that do not require collateral under </a:t>
+            </a:r>
+            <a:r>
+              <a:rPr lang="en-US" dirty="0" err="1" smtClean="0"/>
+              <a:t>RefPrice</a:t>
+            </a:r>
+            <a:endParaRPr lang="en-US" dirty="0" smtClean="0"/>
+          </a:p>
+          <a:p>
+            <a:pPr lvl="1"/>
+            <a:r>
+              <a:rPr lang="en-US" dirty="0" smtClean="0"/>
+              <a:t>Specifically, paths that are heavily negatively congested while historically are positively congested are excluded from this analysis</a:t>
+            </a:r>
+          </a:p>
+          <a:p>
+            <a:pPr lvl="1"/>
+            <a:r>
+              <a:rPr lang="en-US" dirty="0" smtClean="0"/>
+              <a:t>Excluding these bids is proper unless we consider Reference Price calculation that understands topological changes on the relevant month</a:t>
+            </a:r>
+            <a:endParaRPr lang="en-US" dirty="0"/>
+          </a:p>
+        </p:txBody>
+      </p:sp>
+      <p:sp>
+        <p:nvSpPr>
+          <p:cNvPr id="2" name="Slide Number Placeholder 1"/>
+          <p:cNvSpPr>
+            <a:spLocks noGrp="1"/>
+          </p:cNvSpPr>
+          <p:nvPr>
+            <p:ph type="sldNum" sz="quarter" idx="12"/>
+          </p:nvPr>
+        </p:nvSpPr>
+        <p:spPr/>
+        <p:txBody>
+          <a:bodyPr/>
+          <a:lstStyle/>
+          <a:p>
+            <a:fld id="{08ED2EC4-456D-42C8-8DCA-F679E5FEF3E2}" type="slidenum">
+              <a:rPr lang="en-US" smtClean="0"/>
+              <a:t>22</a:t>
+            </a:fld>
+            <a:endParaRPr lang="en-US"/>
+          </a:p>
+        </p:txBody>
+      </p:sp>
+      <p:sp>
+        <p:nvSpPr>
+          <p:cNvPr id="3" name="Date Placeholder 2"/>
+          <p:cNvSpPr>
+            <a:spLocks noGrp="1"/>
+          </p:cNvSpPr>
+          <p:nvPr>
+            <p:ph type="dt" sz="half" idx="10"/>
+          </p:nvPr>
+        </p:nvSpPr>
+        <p:spPr/>
+        <p:txBody>
+          <a:bodyPr/>
+          <a:lstStyle/>
+          <a:p>
+            <a:fld id="{D3235EA8-B38B-49E7-A85C-5CBC6D007238}" type="datetime1">
+              <a:rPr lang="en-US" smtClean="0"/>
+              <a:t>5/17/2017</a:t>
+            </a:fld>
+            <a:endParaRPr lang="en-US"/>
+          </a:p>
+        </p:txBody>
+      </p:sp>
+    </p:spTree>
+    <p:extLst>
+      <p:ext uri="{BB962C8B-B14F-4D97-AF65-F5344CB8AC3E}">
+        <p14:creationId xmlns:p14="http://schemas.microsoft.com/office/powerpoint/2010/main" val="1961046540"/>
+      </p:ext>
+    </p:extLst>
+  </p:cSld>
+  <p:clrMapOvr>
+    <a:masterClrMapping/>
+  </p:clrMapOvr>
+  <p:timing>
+    <p:tnLst>
+      <p:par>
+        <p:cTn id="1" dur="indefinite" restart="never" nodeType="tmRoot"/>
+      </p:par>
+    </p:tnLst>
+  </p:timing>
+</p:sld>
+</file>
+
+<file path=ppt/slides/slide23.xml><?xml version="1.0" encoding="utf-8"?>
+<p:sld xmlns:a="http://schemas.openxmlformats.org/drawingml/2006/main" xmlns:r="http://schemas.openxmlformats.org/officeDocument/2006/relationships" xmlns:p="http://schemas.openxmlformats.org/presentationml/2006/main">
+  <p:cSld>
+    <p:spTree>
+      <p:nvGrpSpPr>
+        <p:cNvPr id="1" name=""/>
+        <p:cNvGrpSpPr/>
+        <p:nvPr/>
+      </p:nvGrpSpPr>
+      <p:grpSpPr>
+        <a:xfrm>
+          <a:off x="0" y="0"/>
+          <a:ext cx="0" cy="0"/>
+          <a:chOff x="0" y="0"/>
+          <a:chExt cx="0" cy="0"/>
+        </a:xfrm>
+      </p:grpSpPr>
+      <p:sp>
+        <p:nvSpPr>
+          <p:cNvPr id="2" name="Title 1"/>
+          <p:cNvSpPr>
+            <a:spLocks noGrp="1"/>
+          </p:cNvSpPr>
+          <p:nvPr>
+            <p:ph type="title"/>
+          </p:nvPr>
+        </p:nvSpPr>
+        <p:spPr/>
+        <p:txBody>
+          <a:bodyPr/>
+          <a:lstStyle/>
+          <a:p>
+            <a:r>
+              <a:rPr lang="en-US" dirty="0" smtClean="0"/>
+              <a:t>Over / Under Collateralization in $</a:t>
+            </a:r>
+            <a:endParaRPr lang="en-US" dirty="0"/>
+          </a:p>
+        </p:txBody>
+      </p:sp>
+      <p:sp>
+        <p:nvSpPr>
+          <p:cNvPr id="4" name="Slide Number Placeholder 3"/>
+          <p:cNvSpPr>
+            <a:spLocks noGrp="1"/>
+          </p:cNvSpPr>
+          <p:nvPr>
+            <p:ph type="sldNum" sz="quarter" idx="12"/>
+          </p:nvPr>
+        </p:nvSpPr>
+        <p:spPr/>
+        <p:txBody>
+          <a:bodyPr/>
+          <a:lstStyle/>
+          <a:p>
+            <a:fld id="{08ED2EC4-456D-42C8-8DCA-F679E5FEF3E2}" type="slidenum">
+              <a:rPr lang="en-US" smtClean="0"/>
+              <a:pPr/>
+              <a:t>23</a:t>
+            </a:fld>
+            <a:endParaRPr lang="en-US"/>
+          </a:p>
+        </p:txBody>
+      </p:sp>
+      <p:sp>
+        <p:nvSpPr>
+          <p:cNvPr id="5" name="Date Placeholder 4"/>
+          <p:cNvSpPr>
+            <a:spLocks noGrp="1"/>
+          </p:cNvSpPr>
+          <p:nvPr>
+            <p:ph type="dt" sz="half" idx="10"/>
+          </p:nvPr>
+        </p:nvSpPr>
+        <p:spPr/>
+        <p:txBody>
+          <a:bodyPr/>
+          <a:lstStyle/>
+          <a:p>
+            <a:fld id="{15F1E40C-1ADA-49EE-97E6-66D3E249BA19}" type="datetime1">
+              <a:rPr lang="en-US" smtClean="0"/>
+              <a:t>5/17/2017</a:t>
+            </a:fld>
+            <a:endParaRPr lang="en-US"/>
+          </a:p>
+        </p:txBody>
+      </p:sp>
+      <p:pic>
+        <p:nvPicPr>
+          <p:cNvPr id="10" name="Content Placeholder 9"/>
+          <p:cNvPicPr>
+            <a:picLocks noGrp="1" noChangeAspect="1"/>
+          </p:cNvPicPr>
+          <p:nvPr>
+            <p:ph idx="1"/>
+          </p:nvPr>
+        </p:nvPicPr>
+        <p:blipFill>
+          <a:blip r:embed="rId2" cstate="print">
+            <a:extLst>
+              <a:ext uri="{28A0092B-C50C-407E-A947-70E740481C1C}">
+                <a14:useLocalDpi xmlns:a14="http://schemas.microsoft.com/office/drawing/2010/main" val="0"/>
+              </a:ext>
+            </a:extLst>
+          </a:blip>
+          <a:stretch>
+            <a:fillRect/>
+          </a:stretch>
+        </p:blipFill>
+        <p:spPr>
+          <a:xfrm>
+            <a:off x="800364" y="1600200"/>
+            <a:ext cx="7543272" cy="4525963"/>
+          </a:xfrm>
+        </p:spPr>
+      </p:pic>
+      <p:sp>
+        <p:nvSpPr>
+          <p:cNvPr id="11" name="TextBox 10"/>
+          <p:cNvSpPr txBox="1"/>
+          <p:nvPr/>
+        </p:nvSpPr>
+        <p:spPr>
+          <a:xfrm>
+            <a:off x="93133" y="1600200"/>
+            <a:ext cx="2106539" cy="369332"/>
+          </a:xfrm>
+          <a:prstGeom prst="rect">
+            <a:avLst/>
+          </a:prstGeom>
+          <a:noFill/>
+        </p:spPr>
+        <p:txBody>
+          <a:bodyPr wrap="none" rtlCol="0">
+            <a:spAutoFit/>
+          </a:bodyPr>
+          <a:lstStyle/>
+          <a:p>
+            <a:r>
+              <a:rPr lang="en-US" dirty="0" smtClean="0"/>
+              <a:t>Under-Collateralized</a:t>
+            </a:r>
+            <a:endParaRPr lang="en-US" dirty="0"/>
+          </a:p>
+        </p:txBody>
+      </p:sp>
+      <p:sp>
+        <p:nvSpPr>
+          <p:cNvPr id="12" name="TextBox 11"/>
+          <p:cNvSpPr txBox="1"/>
+          <p:nvPr/>
+        </p:nvSpPr>
+        <p:spPr>
+          <a:xfrm>
+            <a:off x="93133" y="5939391"/>
+            <a:ext cx="1969642" cy="369332"/>
+          </a:xfrm>
+          <a:prstGeom prst="rect">
+            <a:avLst/>
+          </a:prstGeom>
+          <a:noFill/>
+        </p:spPr>
+        <p:txBody>
+          <a:bodyPr wrap="none" rtlCol="0">
+            <a:spAutoFit/>
+          </a:bodyPr>
+          <a:lstStyle/>
+          <a:p>
+            <a:r>
+              <a:rPr lang="en-US" dirty="0" smtClean="0"/>
+              <a:t>Over-Collateralized</a:t>
+            </a:r>
+            <a:endParaRPr lang="en-US" dirty="0"/>
+          </a:p>
+        </p:txBody>
+      </p:sp>
+      <p:cxnSp>
+        <p:nvCxnSpPr>
+          <p:cNvPr id="14" name="Straight Connector 13"/>
+          <p:cNvCxnSpPr/>
+          <p:nvPr/>
+        </p:nvCxnSpPr>
+        <p:spPr>
+          <a:xfrm>
+            <a:off x="160866" y="3353624"/>
+            <a:ext cx="614097" cy="0"/>
+          </a:xfrm>
+          <a:prstGeom prst="line">
+            <a:avLst/>
+          </a:prstGeom>
+          <a:ln>
+            <a:solidFill>
+              <a:schemeClr val="tx1"/>
+            </a:solidFill>
+          </a:ln>
+        </p:spPr>
+        <p:style>
+          <a:lnRef idx="1">
+            <a:schemeClr val="accent1"/>
+          </a:lnRef>
+          <a:fillRef idx="0">
+            <a:schemeClr val="accent1"/>
+          </a:fillRef>
+          <a:effectRef idx="0">
+            <a:schemeClr val="accent1"/>
+          </a:effectRef>
+          <a:fontRef idx="minor">
+            <a:schemeClr val="tx1"/>
+          </a:fontRef>
+        </p:style>
+      </p:cxnSp>
+      <p:cxnSp>
+        <p:nvCxnSpPr>
+          <p:cNvPr id="16" name="Straight Arrow Connector 15"/>
+          <p:cNvCxnSpPr/>
+          <p:nvPr/>
+        </p:nvCxnSpPr>
+        <p:spPr>
+          <a:xfrm flipV="1">
+            <a:off x="457200" y="2057400"/>
+            <a:ext cx="0" cy="1286934"/>
+          </a:xfrm>
+          <a:prstGeom prst="straightConnector1">
+            <a:avLst/>
+          </a:prstGeom>
+          <a:ln w="76200">
+            <a:solidFill>
+              <a:srgbClr val="C00000"/>
+            </a:solidFill>
+            <a:tailEnd type="triangle"/>
+          </a:ln>
+        </p:spPr>
+        <p:style>
+          <a:lnRef idx="1">
+            <a:schemeClr val="accent1"/>
+          </a:lnRef>
+          <a:fillRef idx="0">
+            <a:schemeClr val="accent1"/>
+          </a:fillRef>
+          <a:effectRef idx="0">
+            <a:schemeClr val="accent1"/>
+          </a:effectRef>
+          <a:fontRef idx="minor">
+            <a:schemeClr val="tx1"/>
+          </a:fontRef>
+        </p:style>
+      </p:cxnSp>
+      <p:cxnSp>
+        <p:nvCxnSpPr>
+          <p:cNvPr id="18" name="Straight Arrow Connector 17"/>
+          <p:cNvCxnSpPr/>
+          <p:nvPr/>
+        </p:nvCxnSpPr>
+        <p:spPr>
+          <a:xfrm>
+            <a:off x="575733" y="3344334"/>
+            <a:ext cx="0" cy="2595057"/>
+          </a:xfrm>
+          <a:prstGeom prst="straightConnector1">
+            <a:avLst/>
+          </a:prstGeom>
+          <a:ln w="76200">
+            <a:solidFill>
+              <a:srgbClr val="C00000"/>
+            </a:solidFill>
+            <a:tailEnd type="triangle"/>
+          </a:ln>
+        </p:spPr>
+        <p:style>
+          <a:lnRef idx="1">
+            <a:schemeClr val="accent1"/>
+          </a:lnRef>
+          <a:fillRef idx="0">
+            <a:schemeClr val="accent1"/>
+          </a:fillRef>
+          <a:effectRef idx="0">
+            <a:schemeClr val="accent1"/>
+          </a:effectRef>
+          <a:fontRef idx="minor">
+            <a:schemeClr val="tx1"/>
+          </a:fontRef>
+        </p:style>
+      </p:cxnSp>
+    </p:spTree>
+    <p:extLst>
+      <p:ext uri="{BB962C8B-B14F-4D97-AF65-F5344CB8AC3E}">
+        <p14:creationId xmlns:p14="http://schemas.microsoft.com/office/powerpoint/2010/main" val="1179201107"/>
+      </p:ext>
+    </p:extLst>
+  </p:cSld>
+  <p:clrMapOvr>
+    <a:masterClrMapping/>
+  </p:clrMapOvr>
+  <p:timing>
+    <p:tnLst>
+      <p:par>
+        <p:cTn id="1" dur="indefinite" restart="never" nodeType="tmRoot"/>
+      </p:par>
+    </p:tnLst>
+  </p:timing>
+</p:sld>
+</file>
+
+<file path=ppt/slides/slide24.xml><?xml version="1.0" encoding="utf-8"?>
+<p:sld xmlns:a="http://schemas.openxmlformats.org/drawingml/2006/main" xmlns:r="http://schemas.openxmlformats.org/officeDocument/2006/relationships" xmlns:p="http://schemas.openxmlformats.org/presentationml/2006/main">
+  <p:cSld>
+    <p:spTree>
+      <p:nvGrpSpPr>
+        <p:cNvPr id="1" name=""/>
+        <p:cNvGrpSpPr/>
+        <p:nvPr/>
+      </p:nvGrpSpPr>
+      <p:grpSpPr>
+        <a:xfrm>
+          <a:off x="0" y="0"/>
+          <a:ext cx="0" cy="0"/>
+          <a:chOff x="0" y="0"/>
+          <a:chExt cx="0" cy="0"/>
+        </a:xfrm>
+      </p:grpSpPr>
+      <p:sp>
+        <p:nvSpPr>
+          <p:cNvPr id="2" name="Title 1"/>
+          <p:cNvSpPr>
+            <a:spLocks noGrp="1"/>
+          </p:cNvSpPr>
+          <p:nvPr>
+            <p:ph type="title"/>
+          </p:nvPr>
+        </p:nvSpPr>
+        <p:spPr/>
+        <p:txBody>
+          <a:bodyPr/>
+          <a:lstStyle/>
+          <a:p>
+            <a:r>
+              <a:rPr lang="en-US" dirty="0"/>
+              <a:t>Over / Under Collateralization in </a:t>
+            </a:r>
+            <a:r>
+              <a:rPr lang="en-US" dirty="0" err="1" smtClean="0"/>
+              <a:t>Pct</a:t>
+            </a:r>
+            <a:r>
+              <a:rPr lang="en-US" dirty="0" smtClean="0"/>
+              <a:t> of Bids</a:t>
+            </a:r>
+            <a:endParaRPr lang="en-US" dirty="0"/>
+          </a:p>
+        </p:txBody>
+      </p:sp>
+      <p:sp>
+        <p:nvSpPr>
+          <p:cNvPr id="4" name="Slide Number Placeholder 3"/>
+          <p:cNvSpPr>
+            <a:spLocks noGrp="1"/>
+          </p:cNvSpPr>
+          <p:nvPr>
+            <p:ph type="sldNum" sz="quarter" idx="12"/>
+          </p:nvPr>
+        </p:nvSpPr>
+        <p:spPr/>
+        <p:txBody>
+          <a:bodyPr/>
+          <a:lstStyle/>
+          <a:p>
+            <a:fld id="{08ED2EC4-456D-42C8-8DCA-F679E5FEF3E2}" type="slidenum">
+              <a:rPr lang="en-US" smtClean="0"/>
+              <a:pPr/>
+              <a:t>24</a:t>
+            </a:fld>
+            <a:endParaRPr lang="en-US"/>
+          </a:p>
+        </p:txBody>
+      </p:sp>
+      <p:sp>
+        <p:nvSpPr>
+          <p:cNvPr id="5" name="Date Placeholder 4"/>
+          <p:cNvSpPr>
+            <a:spLocks noGrp="1"/>
+          </p:cNvSpPr>
+          <p:nvPr>
+            <p:ph type="dt" sz="half" idx="10"/>
+          </p:nvPr>
+        </p:nvSpPr>
+        <p:spPr/>
+        <p:txBody>
+          <a:bodyPr/>
+          <a:lstStyle/>
+          <a:p>
+            <a:fld id="{15F1E40C-1ADA-49EE-97E6-66D3E249BA19}" type="datetime1">
+              <a:rPr lang="en-US" smtClean="0"/>
+              <a:t>5/17/2017</a:t>
+            </a:fld>
+            <a:endParaRPr lang="en-US"/>
+          </a:p>
+        </p:txBody>
+      </p:sp>
+      <p:pic>
+        <p:nvPicPr>
+          <p:cNvPr id="8" name="Content Placeholder 7"/>
+          <p:cNvPicPr>
+            <a:picLocks noGrp="1" noChangeAspect="1"/>
+          </p:cNvPicPr>
+          <p:nvPr>
+            <p:ph idx="1"/>
+          </p:nvPr>
+        </p:nvPicPr>
+        <p:blipFill>
+          <a:blip r:embed="rId2" cstate="print">
+            <a:extLst>
+              <a:ext uri="{28A0092B-C50C-407E-A947-70E740481C1C}">
+                <a14:useLocalDpi xmlns:a14="http://schemas.microsoft.com/office/drawing/2010/main" val="0"/>
+              </a:ext>
+            </a:extLst>
+          </a:blip>
+          <a:stretch>
+            <a:fillRect/>
+          </a:stretch>
+        </p:blipFill>
+        <p:spPr>
+          <a:xfrm>
+            <a:off x="800364" y="1600200"/>
+            <a:ext cx="7543272" cy="4525963"/>
+          </a:xfrm>
+        </p:spPr>
+      </p:pic>
+    </p:spTree>
+    <p:extLst>
+      <p:ext uri="{BB962C8B-B14F-4D97-AF65-F5344CB8AC3E}">
+        <p14:creationId xmlns:p14="http://schemas.microsoft.com/office/powerpoint/2010/main" val="2880030437"/>
+      </p:ext>
+    </p:extLst>
+  </p:cSld>
+  <p:clrMapOvr>
+    <a:masterClrMapping/>
+  </p:clrMapOvr>
+</p:sld>
+</file>
+
+<file path=ppt/slides/slide25.xml><?xml version="1.0" encoding="utf-8"?>
+<p:sld xmlns:a="http://schemas.openxmlformats.org/drawingml/2006/main" xmlns:r="http://schemas.openxmlformats.org/officeDocument/2006/relationships" xmlns:p="http://schemas.openxmlformats.org/presentationml/2006/main">
+  <p:cSld>
+    <p:spTree>
+      <p:nvGrpSpPr>
+        <p:cNvPr id="1" name=""/>
+        <p:cNvGrpSpPr/>
+        <p:nvPr/>
+      </p:nvGrpSpPr>
+      <p:grpSpPr>
+        <a:xfrm>
+          <a:off x="0" y="0"/>
+          <a:ext cx="0" cy="0"/>
+          <a:chOff x="0" y="0"/>
+          <a:chExt cx="0" cy="0"/>
+        </a:xfrm>
+      </p:grpSpPr>
+      <p:sp>
+        <p:nvSpPr>
+          <p:cNvPr id="10" name="Content Placeholder 9"/>
+          <p:cNvSpPr>
+            <a:spLocks noGrp="1"/>
+          </p:cNvSpPr>
+          <p:nvPr>
+            <p:ph idx="1"/>
+          </p:nvPr>
+        </p:nvSpPr>
+        <p:spPr/>
+        <p:txBody>
+          <a:bodyPr>
+            <a:normAutofit lnSpcReduction="10000"/>
+          </a:bodyPr>
+          <a:lstStyle/>
+          <a:p>
+            <a:endParaRPr lang="en-US" dirty="0" smtClean="0"/>
+          </a:p>
+          <a:p>
+            <a:endParaRPr lang="en-US" dirty="0"/>
+          </a:p>
+          <a:p>
+            <a:endParaRPr lang="en-US" dirty="0" smtClean="0"/>
+          </a:p>
+          <a:p>
+            <a:r>
+              <a:rPr lang="en-US" dirty="0" smtClean="0"/>
+              <a:t>Using Statistical Worst Case of 5%-tile:</a:t>
+            </a:r>
+          </a:p>
+          <a:p>
+            <a:pPr lvl="1"/>
+            <a:r>
+              <a:rPr lang="en-US" dirty="0" smtClean="0"/>
+              <a:t>Savings </a:t>
+            </a:r>
+            <a:r>
+              <a:rPr lang="en-US" dirty="0"/>
+              <a:t>Market </a:t>
+            </a:r>
+            <a:r>
+              <a:rPr lang="en-US" dirty="0" smtClean="0"/>
+              <a:t>Participants over-collateralization: $58,293,492</a:t>
+            </a:r>
+          </a:p>
+          <a:p>
+            <a:pPr lvl="1"/>
+            <a:r>
+              <a:rPr lang="en-US" dirty="0" smtClean="0"/>
+              <a:t>For the risk </a:t>
+            </a:r>
+            <a:r>
+              <a:rPr lang="en-US" dirty="0"/>
+              <a:t>of under-collateralizing: </a:t>
+            </a:r>
+            <a:r>
+              <a:rPr lang="en-US" dirty="0" smtClean="0"/>
+              <a:t>12,108,618</a:t>
+            </a:r>
+          </a:p>
+          <a:p>
+            <a:pPr lvl="1"/>
+            <a:r>
+              <a:rPr lang="en-US" dirty="0" smtClean="0"/>
+              <a:t>Or a ratio of 4.8</a:t>
+            </a:r>
+          </a:p>
+          <a:p>
+            <a:r>
+              <a:rPr lang="en-US" dirty="0" smtClean="0"/>
+              <a:t>Using Statistical Worst Case of 2%-tile:</a:t>
+            </a:r>
+          </a:p>
+          <a:p>
+            <a:pPr lvl="1"/>
+            <a:r>
+              <a:rPr lang="en-US" dirty="0" smtClean="0"/>
+              <a:t>A ratio of 4.9</a:t>
+            </a:r>
+            <a:endParaRPr lang="en-US" dirty="0"/>
+          </a:p>
+          <a:p>
+            <a:pPr lvl="1"/>
+            <a:endParaRPr lang="en-US" dirty="0"/>
+          </a:p>
+        </p:txBody>
+      </p:sp>
+      <p:sp>
+        <p:nvSpPr>
+          <p:cNvPr id="2" name="Title 1"/>
+          <p:cNvSpPr>
+            <a:spLocks noGrp="1"/>
+          </p:cNvSpPr>
+          <p:nvPr>
+            <p:ph type="title"/>
+          </p:nvPr>
+        </p:nvSpPr>
+        <p:spPr/>
+        <p:txBody>
+          <a:bodyPr/>
+          <a:lstStyle/>
+          <a:p>
+            <a:r>
+              <a:rPr lang="en-US" dirty="0" smtClean="0"/>
+              <a:t>Over / Under Collateralization Ratio</a:t>
+            </a:r>
+            <a:endParaRPr lang="en-US" dirty="0"/>
+          </a:p>
+        </p:txBody>
+      </p:sp>
+      <p:sp>
+        <p:nvSpPr>
+          <p:cNvPr id="4" name="Slide Number Placeholder 3"/>
+          <p:cNvSpPr>
+            <a:spLocks noGrp="1"/>
+          </p:cNvSpPr>
+          <p:nvPr>
+            <p:ph type="sldNum" sz="quarter" idx="12"/>
+          </p:nvPr>
+        </p:nvSpPr>
+        <p:spPr/>
+        <p:txBody>
+          <a:bodyPr/>
+          <a:lstStyle/>
+          <a:p>
+            <a:fld id="{08ED2EC4-456D-42C8-8DCA-F679E5FEF3E2}" type="slidenum">
+              <a:rPr lang="en-US" smtClean="0"/>
+              <a:pPr/>
+              <a:t>25</a:t>
+            </a:fld>
+            <a:endParaRPr lang="en-US"/>
+          </a:p>
+        </p:txBody>
+      </p:sp>
+      <p:sp>
+        <p:nvSpPr>
+          <p:cNvPr id="5" name="Date Placeholder 4"/>
+          <p:cNvSpPr>
+            <a:spLocks noGrp="1"/>
+          </p:cNvSpPr>
+          <p:nvPr>
+            <p:ph type="dt" sz="half" idx="10"/>
+          </p:nvPr>
+        </p:nvSpPr>
+        <p:spPr/>
+        <p:txBody>
+          <a:bodyPr/>
+          <a:lstStyle/>
+          <a:p>
+            <a:fld id="{15F1E40C-1ADA-49EE-97E6-66D3E249BA19}" type="datetime1">
+              <a:rPr lang="en-US" smtClean="0"/>
+              <a:t>5/17/2017</a:t>
+            </a:fld>
+            <a:endParaRPr lang="en-US"/>
+          </a:p>
+        </p:txBody>
+      </p:sp>
+      <p:graphicFrame>
+        <p:nvGraphicFramePr>
+          <p:cNvPr id="9" name="Table 8"/>
+          <p:cNvGraphicFramePr>
+            <a:graphicFrameLocks noGrp="1"/>
+          </p:cNvGraphicFramePr>
+          <p:nvPr>
+            <p:extLst>
+              <p:ext uri="{D42A27DB-BD31-4B8C-83A1-F6EECF244321}">
+                <p14:modId xmlns:p14="http://schemas.microsoft.com/office/powerpoint/2010/main" val="1183928830"/>
+              </p:ext>
+            </p:extLst>
+          </p:nvPr>
+        </p:nvGraphicFramePr>
+        <p:xfrm>
+          <a:off x="1524000" y="1857489"/>
+          <a:ext cx="5542219" cy="1238250"/>
+        </p:xfrm>
+        <a:graphic>
+          <a:graphicData uri="http://schemas.openxmlformats.org/drawingml/2006/table">
+            <a:tbl>
+              <a:tblPr firstRow="1" firstCol="1">
+                <a:tableStyleId>{9D7B26C5-4107-4FEC-AEDC-1716B250A1EF}</a:tableStyleId>
+              </a:tblPr>
+              <a:tblGrid>
+                <a:gridCol w="1308432">
+                  <a:extLst>
+                    <a:ext uri="{9D8B030D-6E8A-4147-A177-3AD203B41FA5}">
+                      <a16:colId xmlns:a16="http://schemas.microsoft.com/office/drawing/2014/main" val="2081406776"/>
+                    </a:ext>
+                  </a:extLst>
+                </a:gridCol>
+                <a:gridCol w="1085041">
+                  <a:extLst>
+                    <a:ext uri="{9D8B030D-6E8A-4147-A177-3AD203B41FA5}">
+                      <a16:colId xmlns:a16="http://schemas.microsoft.com/office/drawing/2014/main" val="842851541"/>
+                    </a:ext>
+                  </a:extLst>
+                </a:gridCol>
+                <a:gridCol w="1159504">
+                  <a:extLst>
+                    <a:ext uri="{9D8B030D-6E8A-4147-A177-3AD203B41FA5}">
+                      <a16:colId xmlns:a16="http://schemas.microsoft.com/office/drawing/2014/main" val="2730663036"/>
+                    </a:ext>
+                  </a:extLst>
+                </a:gridCol>
+                <a:gridCol w="957389">
+                  <a:extLst>
+                    <a:ext uri="{9D8B030D-6E8A-4147-A177-3AD203B41FA5}">
+                      <a16:colId xmlns:a16="http://schemas.microsoft.com/office/drawing/2014/main" val="645626965"/>
+                    </a:ext>
+                  </a:extLst>
+                </a:gridCol>
+                <a:gridCol w="1031853">
+                  <a:extLst>
+                    <a:ext uri="{9D8B030D-6E8A-4147-A177-3AD203B41FA5}">
+                      <a16:colId xmlns:a16="http://schemas.microsoft.com/office/drawing/2014/main" val="98024330"/>
+                    </a:ext>
+                  </a:extLst>
+                </a:gridCol>
+              </a:tblGrid>
+              <a:tr h="0">
+                <a:tc>
+                  <a:txBody>
+                    <a:bodyPr/>
+                    <a:lstStyle/>
+                    <a:p>
+                      <a:pPr algn="l"/>
+                      <a:r>
+                        <a:rPr lang="en-US" sz="1000" dirty="0" err="1">
+                          <a:effectLst/>
+                        </a:rPr>
+                        <a:t>MethodType</a:t>
+                      </a:r>
+                      <a:endParaRPr lang="en-US" sz="1000" b="1" dirty="0">
+                        <a:solidFill>
+                          <a:srgbClr val="555555"/>
+                        </a:solidFill>
+                        <a:effectLst/>
+                      </a:endParaRPr>
+                    </a:p>
+                  </a:txBody>
+                  <a:tcPr marL="47625" marR="47625" marT="47625" marB="47625" anchor="ctr"/>
+                </a:tc>
+                <a:tc>
+                  <a:txBody>
+                    <a:bodyPr/>
+                    <a:lstStyle/>
+                    <a:p>
+                      <a:pPr algn="ctr"/>
+                      <a:r>
+                        <a:rPr lang="en-US" sz="1000" dirty="0" smtClean="0">
+                          <a:effectLst/>
+                        </a:rPr>
+                        <a:t>Over-Collateralized ($)</a:t>
+                      </a:r>
+                      <a:endParaRPr lang="en-US" sz="1000" b="1" dirty="0">
+                        <a:solidFill>
+                          <a:srgbClr val="555555"/>
+                        </a:solidFill>
+                        <a:effectLst/>
+                      </a:endParaRPr>
+                    </a:p>
+                  </a:txBody>
+                  <a:tcPr marL="47625" marR="47625" marT="47625" marB="47625" anchor="ctr"/>
+                </a:tc>
+                <a:tc>
+                  <a:txBody>
+                    <a:bodyPr/>
+                    <a:lstStyle/>
+                    <a:p>
+                      <a:pPr algn="ctr"/>
+                      <a:r>
+                        <a:rPr lang="en-US" sz="1000" dirty="0" smtClean="0">
+                          <a:effectLst/>
+                        </a:rPr>
+                        <a:t>Under-Collateralized ($)</a:t>
+                      </a:r>
+                      <a:endParaRPr lang="en-US" sz="1000" b="1" dirty="0">
+                        <a:solidFill>
+                          <a:srgbClr val="555555"/>
+                        </a:solidFill>
+                        <a:effectLst/>
+                      </a:endParaRPr>
+                    </a:p>
+                  </a:txBody>
+                  <a:tcPr marL="47625" marR="47625" marT="47625" marB="47625" anchor="ctr"/>
+                </a:tc>
+                <a:tc>
+                  <a:txBody>
+                    <a:bodyPr/>
+                    <a:lstStyle/>
+                    <a:p>
+                      <a:pPr algn="ctr"/>
+                      <a:r>
+                        <a:rPr lang="en-US" sz="1000" dirty="0" smtClean="0">
+                          <a:effectLst/>
+                        </a:rPr>
+                        <a:t>Over-Collateralized #Bids</a:t>
+                      </a:r>
+                      <a:endParaRPr lang="en-US" sz="1000" b="1" dirty="0">
+                        <a:solidFill>
+                          <a:srgbClr val="555555"/>
+                        </a:solidFill>
+                        <a:effectLst/>
+                      </a:endParaRPr>
+                    </a:p>
+                  </a:txBody>
+                  <a:tcPr marL="47625" marR="47625" marT="47625" marB="47625" anchor="ctr"/>
+                </a:tc>
+                <a:tc>
+                  <a:txBody>
+                    <a:bodyPr/>
+                    <a:lstStyle/>
+                    <a:p>
+                      <a:pPr algn="ctr"/>
+                      <a:r>
+                        <a:rPr lang="en-US" sz="1000" dirty="0" smtClean="0">
+                          <a:effectLst/>
+                        </a:rPr>
+                        <a:t>Under-Collateralized #Bids</a:t>
+                      </a:r>
+                      <a:endParaRPr lang="en-US" sz="1000" b="1" dirty="0">
+                        <a:solidFill>
+                          <a:srgbClr val="555555"/>
+                        </a:solidFill>
+                        <a:effectLst/>
+                      </a:endParaRPr>
+                    </a:p>
+                  </a:txBody>
+                  <a:tcPr marL="47625" marR="47625" marT="47625" marB="47625" anchor="ctr"/>
+                </a:tc>
+                <a:extLst>
+                  <a:ext uri="{0D108BD9-81ED-4DB2-BD59-A6C34878D82A}">
+                    <a16:rowId xmlns:a16="http://schemas.microsoft.com/office/drawing/2014/main" val="3370319081"/>
+                  </a:ext>
+                </a:extLst>
+              </a:tr>
+              <a:tr h="219075">
+                <a:tc>
+                  <a:txBody>
+                    <a:bodyPr/>
+                    <a:lstStyle/>
+                    <a:p>
+                      <a:r>
+                        <a:rPr lang="en-US" sz="1000">
+                          <a:effectLst/>
+                        </a:rPr>
+                        <a:t>CreditRequired</a:t>
+                      </a:r>
+                    </a:p>
+                  </a:txBody>
+                  <a:tcPr marL="47625" marR="47625" marT="38100" marB="38100" anchor="ctr"/>
+                </a:tc>
+                <a:tc>
+                  <a:txBody>
+                    <a:bodyPr/>
+                    <a:lstStyle/>
+                    <a:p>
+                      <a:pPr algn="ctr"/>
+                      <a:r>
+                        <a:rPr lang="en-US" sz="1000" dirty="0">
+                          <a:effectLst/>
+                        </a:rPr>
+                        <a:t>-</a:t>
+                      </a:r>
+                      <a:r>
+                        <a:rPr lang="en-US" sz="1000" dirty="0" smtClean="0">
+                          <a:effectLst/>
+                        </a:rPr>
+                        <a:t>80,706,752</a:t>
+                      </a:r>
+                      <a:endParaRPr lang="en-US" sz="1000" dirty="0">
+                        <a:effectLst/>
+                      </a:endParaRPr>
+                    </a:p>
+                  </a:txBody>
+                  <a:tcPr marL="47625" marR="47625" marT="38100" marB="38100" anchor="ctr"/>
+                </a:tc>
+                <a:tc>
+                  <a:txBody>
+                    <a:bodyPr/>
+                    <a:lstStyle/>
+                    <a:p>
+                      <a:pPr algn="ctr"/>
+                      <a:r>
+                        <a:rPr lang="en-US" sz="1000" dirty="0" smtClean="0">
+                          <a:effectLst/>
+                        </a:rPr>
+                        <a:t>27,027,451</a:t>
+                      </a:r>
+                      <a:endParaRPr lang="en-US" sz="1000" dirty="0">
+                        <a:effectLst/>
+                      </a:endParaRPr>
+                    </a:p>
+                  </a:txBody>
+                  <a:tcPr marL="47625" marR="47625" marT="38100" marB="38100" anchor="ctr"/>
+                </a:tc>
+                <a:tc>
+                  <a:txBody>
+                    <a:bodyPr/>
+                    <a:lstStyle/>
+                    <a:p>
+                      <a:pPr algn="ctr"/>
+                      <a:r>
+                        <a:rPr lang="en-US" sz="1000" dirty="0" smtClean="0">
+                          <a:effectLst/>
+                        </a:rPr>
+                        <a:t>16,354</a:t>
+                      </a:r>
+                      <a:endParaRPr lang="en-US" sz="1000" dirty="0">
+                        <a:effectLst/>
+                      </a:endParaRPr>
+                    </a:p>
+                  </a:txBody>
+                  <a:tcPr marL="47625" marR="47625" marT="38100" marB="38100" anchor="ctr"/>
+                </a:tc>
+                <a:tc>
+                  <a:txBody>
+                    <a:bodyPr/>
+                    <a:lstStyle/>
+                    <a:p>
+                      <a:pPr algn="ctr"/>
+                      <a:r>
+                        <a:rPr lang="en-US" sz="1000" dirty="0" smtClean="0">
+                          <a:effectLst/>
+                        </a:rPr>
+                        <a:t>4,561</a:t>
+                      </a:r>
+                      <a:endParaRPr lang="en-US" sz="1000" dirty="0">
+                        <a:effectLst/>
+                      </a:endParaRPr>
+                    </a:p>
+                  </a:txBody>
+                  <a:tcPr marL="47625" marR="47625" marT="38100" marB="38100" anchor="ctr"/>
+                </a:tc>
+                <a:extLst>
+                  <a:ext uri="{0D108BD9-81ED-4DB2-BD59-A6C34878D82A}">
+                    <a16:rowId xmlns:a16="http://schemas.microsoft.com/office/drawing/2014/main" val="1113831369"/>
+                  </a:ext>
+                </a:extLst>
+              </a:tr>
+              <a:tr h="219075">
+                <a:tc>
+                  <a:txBody>
+                    <a:bodyPr/>
+                    <a:lstStyle/>
+                    <a:p>
+                      <a:r>
+                        <a:rPr lang="en-US" sz="1000">
+                          <a:effectLst/>
+                        </a:rPr>
+                        <a:t>CreditRequiredStats05</a:t>
+                      </a:r>
+                    </a:p>
+                  </a:txBody>
+                  <a:tcPr marL="47625" marR="47625" marT="38100" marB="38100" anchor="ctr"/>
+                </a:tc>
+                <a:tc>
+                  <a:txBody>
+                    <a:bodyPr/>
+                    <a:lstStyle/>
+                    <a:p>
+                      <a:pPr algn="ctr"/>
+                      <a:r>
+                        <a:rPr lang="en-US" sz="1000" dirty="0">
+                          <a:effectLst/>
+                        </a:rPr>
+                        <a:t>-</a:t>
+                      </a:r>
+                      <a:r>
+                        <a:rPr lang="en-US" sz="1000" dirty="0" smtClean="0">
+                          <a:effectLst/>
+                        </a:rPr>
+                        <a:t>22,413,260</a:t>
+                      </a:r>
+                      <a:endParaRPr lang="en-US" sz="1000" dirty="0">
+                        <a:effectLst/>
+                      </a:endParaRPr>
+                    </a:p>
+                  </a:txBody>
+                  <a:tcPr marL="47625" marR="47625" marT="38100" marB="38100" anchor="ctr"/>
+                </a:tc>
+                <a:tc>
+                  <a:txBody>
+                    <a:bodyPr/>
+                    <a:lstStyle/>
+                    <a:p>
+                      <a:pPr algn="ctr"/>
+                      <a:r>
+                        <a:rPr lang="en-US" sz="1000" dirty="0" smtClean="0">
+                          <a:effectLst/>
+                        </a:rPr>
+                        <a:t>39,136,069</a:t>
+                      </a:r>
+                      <a:endParaRPr lang="en-US" sz="1000" dirty="0">
+                        <a:effectLst/>
+                      </a:endParaRPr>
+                    </a:p>
+                  </a:txBody>
+                  <a:tcPr marL="47625" marR="47625" marT="38100" marB="38100" anchor="ctr"/>
+                </a:tc>
+                <a:tc>
+                  <a:txBody>
+                    <a:bodyPr/>
+                    <a:lstStyle/>
+                    <a:p>
+                      <a:pPr algn="ctr"/>
+                      <a:r>
+                        <a:rPr lang="en-US" sz="1000" dirty="0" smtClean="0">
+                          <a:effectLst/>
+                        </a:rPr>
+                        <a:t>14,748</a:t>
+                      </a:r>
+                      <a:endParaRPr lang="en-US" sz="1000" dirty="0">
+                        <a:effectLst/>
+                      </a:endParaRPr>
+                    </a:p>
+                  </a:txBody>
+                  <a:tcPr marL="47625" marR="47625" marT="38100" marB="38100" anchor="ctr"/>
+                </a:tc>
+                <a:tc>
+                  <a:txBody>
+                    <a:bodyPr/>
+                    <a:lstStyle/>
+                    <a:p>
+                      <a:pPr algn="ctr"/>
+                      <a:r>
+                        <a:rPr lang="en-US" sz="1000" dirty="0" smtClean="0">
+                          <a:effectLst/>
+                        </a:rPr>
+                        <a:t>6,167</a:t>
+                      </a:r>
+                      <a:endParaRPr lang="en-US" sz="1000" dirty="0">
+                        <a:effectLst/>
+                      </a:endParaRPr>
+                    </a:p>
+                  </a:txBody>
+                  <a:tcPr marL="47625" marR="47625" marT="38100" marB="38100" anchor="ctr"/>
+                </a:tc>
+                <a:extLst>
+                  <a:ext uri="{0D108BD9-81ED-4DB2-BD59-A6C34878D82A}">
+                    <a16:rowId xmlns:a16="http://schemas.microsoft.com/office/drawing/2014/main" val="1516761405"/>
+                  </a:ext>
+                </a:extLst>
+              </a:tr>
+              <a:tr h="219075">
+                <a:tc>
+                  <a:txBody>
+                    <a:bodyPr/>
+                    <a:lstStyle/>
+                    <a:p>
+                      <a:r>
+                        <a:rPr lang="en-US" sz="1000" dirty="0">
+                          <a:effectLst/>
+                        </a:rPr>
+                        <a:t>CreditRequiredStats02</a:t>
+                      </a:r>
+                    </a:p>
+                  </a:txBody>
+                  <a:tcPr marL="47625" marR="47625" marT="38100" marB="38100" anchor="ctr"/>
+                </a:tc>
+                <a:tc>
+                  <a:txBody>
+                    <a:bodyPr/>
+                    <a:lstStyle/>
+                    <a:p>
+                      <a:pPr algn="ctr"/>
+                      <a:r>
+                        <a:rPr lang="en-US" sz="1000" dirty="0">
+                          <a:effectLst/>
+                        </a:rPr>
+                        <a:t>-</a:t>
+                      </a:r>
+                      <a:r>
+                        <a:rPr lang="en-US" sz="1000" dirty="0" smtClean="0">
+                          <a:effectLst/>
+                        </a:rPr>
+                        <a:t>25,314,694</a:t>
+                      </a:r>
+                      <a:endParaRPr lang="en-US" sz="1000" dirty="0">
+                        <a:effectLst/>
+                      </a:endParaRPr>
+                    </a:p>
+                  </a:txBody>
+                  <a:tcPr marL="47625" marR="47625" marT="38100" marB="38100" anchor="ctr"/>
+                </a:tc>
+                <a:tc>
+                  <a:txBody>
+                    <a:bodyPr/>
+                    <a:lstStyle/>
+                    <a:p>
+                      <a:pPr algn="ctr"/>
+                      <a:r>
+                        <a:rPr lang="en-US" sz="1000" dirty="0" smtClean="0">
+                          <a:effectLst/>
+                        </a:rPr>
+                        <a:t>38,321,585</a:t>
+                      </a:r>
+                      <a:endParaRPr lang="en-US" sz="1000" dirty="0">
+                        <a:effectLst/>
+                      </a:endParaRPr>
+                    </a:p>
+                  </a:txBody>
+                  <a:tcPr marL="47625" marR="47625" marT="38100" marB="38100" anchor="ctr"/>
+                </a:tc>
+                <a:tc>
+                  <a:txBody>
+                    <a:bodyPr/>
+                    <a:lstStyle/>
+                    <a:p>
+                      <a:pPr algn="ctr"/>
+                      <a:r>
+                        <a:rPr lang="en-US" sz="1000" dirty="0" smtClean="0">
+                          <a:effectLst/>
+                        </a:rPr>
+                        <a:t>14,896</a:t>
+                      </a:r>
+                      <a:endParaRPr lang="en-US" sz="1000" dirty="0">
+                        <a:effectLst/>
+                      </a:endParaRPr>
+                    </a:p>
+                  </a:txBody>
+                  <a:tcPr marL="47625" marR="47625" marT="38100" marB="38100" anchor="ctr"/>
+                </a:tc>
+                <a:tc>
+                  <a:txBody>
+                    <a:bodyPr/>
+                    <a:lstStyle/>
+                    <a:p>
+                      <a:pPr algn="ctr"/>
+                      <a:r>
+                        <a:rPr lang="en-US" sz="1000" dirty="0" smtClean="0">
+                          <a:effectLst/>
+                        </a:rPr>
+                        <a:t>6,019</a:t>
+                      </a:r>
+                      <a:endParaRPr lang="en-US" sz="1000" dirty="0">
+                        <a:effectLst/>
+                      </a:endParaRPr>
+                    </a:p>
+                  </a:txBody>
+                  <a:tcPr marL="47625" marR="47625" marT="38100" marB="38100" anchor="ctr"/>
+                </a:tc>
+                <a:extLst>
+                  <a:ext uri="{0D108BD9-81ED-4DB2-BD59-A6C34878D82A}">
+                    <a16:rowId xmlns:a16="http://schemas.microsoft.com/office/drawing/2014/main" val="487084985"/>
+                  </a:ext>
+                </a:extLst>
+              </a:tr>
+            </a:tbl>
+          </a:graphicData>
+        </a:graphic>
+      </p:graphicFrame>
+    </p:spTree>
+    <p:extLst>
+      <p:ext uri="{BB962C8B-B14F-4D97-AF65-F5344CB8AC3E}">
+        <p14:creationId xmlns:p14="http://schemas.microsoft.com/office/powerpoint/2010/main" val="2372741407"/>
+      </p:ext>
+    </p:extLst>
+  </p:cSld>
+  <p:clrMapOvr>
+    <a:masterClrMapping/>
+  </p:clrMapOvr>
+</p:sld>
+</file>
+
+<file path=ppt/slides/slide26.xml><?xml version="1.0" encoding="utf-8"?>
 <p:sld xmlns:a="http://schemas.openxmlformats.org/drawingml/2006/main" xmlns:r="http://schemas.openxmlformats.org/officeDocument/2006/relationships" xmlns:p="http://schemas.openxmlformats.org/presentationml/2006/main">
   <p:cSld>
     <p:spTree>
@@ -10985,7 +13578,7 @@
           <a:p>
             <a:fld id="{67261995-B660-41D4-8FC6-4FC94EE9C233}" type="datetime1">
               <a:rPr lang="en-US" smtClean="0"/>
-              <a:t>5/15/2017</a:t>
+              <a:t>5/17/2017</a:t>
             </a:fld>
             <a:endParaRPr lang="en-US"/>
           </a:p>
@@ -11009,7 +13602,7 @@
             <a:fld id="{08ED2EC4-456D-42C8-8DCA-F679E5FEF3E2}" type="slidenum">
               <a:rPr lang="en-US" smtClean="0"/>
               <a:pPr/>
-              <a:t>18</a:t>
+              <a:t>26</a:t>
             </a:fld>
             <a:endParaRPr lang="en-US"/>
           </a:p>
@@ -11035,7 +13628,7 @@
 </p:sld>
 </file>
 
-<file path=ppt/slides/slide19.xml><?xml version="1.0" encoding="utf-8"?>
+<file path=ppt/slides/slide27.xml><?xml version="1.0" encoding="utf-8"?>
 <p:sld xmlns:a="http://schemas.openxmlformats.org/drawingml/2006/main" xmlns:r="http://schemas.openxmlformats.org/officeDocument/2006/relationships" xmlns:p="http://schemas.openxmlformats.org/presentationml/2006/main">
   <p:cSld>
     <p:spTree>
@@ -11111,7 +13704,7 @@
           <a:p>
             <a:fld id="{B23014AC-C763-4CE9-B2AE-48A9332E8134}" type="datetime1">
               <a:rPr lang="en-US" smtClean="0"/>
-              <a:t>5/15/2017</a:t>
+              <a:t>5/17/2017</a:t>
             </a:fld>
             <a:endParaRPr lang="en-US"/>
           </a:p>
@@ -11135,7 +13728,7 @@
             <a:fld id="{08ED2EC4-456D-42C8-8DCA-F679E5FEF3E2}" type="slidenum">
               <a:rPr lang="en-US" smtClean="0"/>
               <a:pPr/>
-              <a:t>19</a:t>
+              <a:t>27</a:t>
             </a:fld>
             <a:endParaRPr lang="en-US"/>
           </a:p>
@@ -11161,7 +13754,7 @@
 </p:sld>
 </file>
 
-<file path=ppt/slides/slide2.xml><?xml version="1.0" encoding="utf-8"?>
+<file path=ppt/slides/slide28.xml><?xml version="1.0" encoding="utf-8"?>
 <p:sld xmlns:a="http://schemas.openxmlformats.org/drawingml/2006/main" xmlns:r="http://schemas.openxmlformats.org/officeDocument/2006/relationships" xmlns:p="http://schemas.openxmlformats.org/presentationml/2006/main">
   <p:cSld>
     <p:spTree>
@@ -11180,320 +13773,6 @@
       </p:grpSpPr>
       <p:sp>
         <p:nvSpPr>
-          <p:cNvPr id="2" name="Title 1"/>
-          <p:cNvSpPr>
-            <a:spLocks noGrp="1"/>
-          </p:cNvSpPr>
-          <p:nvPr>
-            <p:ph type="title"/>
-          </p:nvPr>
-        </p:nvSpPr>
-        <p:spPr/>
-        <p:txBody>
-          <a:bodyPr/>
-          <a:lstStyle/>
-          <a:p>
-            <a:r>
-              <a:rPr lang="en-US" dirty="0" smtClean="0"/>
-              <a:t>Motivation</a:t>
-            </a:r>
-            <a:endParaRPr lang="en-US" dirty="0"/>
-          </a:p>
-        </p:txBody>
-      </p:sp>
-      <p:sp>
-        <p:nvSpPr>
-          <p:cNvPr id="3" name="Content Placeholder 2"/>
-          <p:cNvSpPr>
-            <a:spLocks noGrp="1"/>
-          </p:cNvSpPr>
-          <p:nvPr>
-            <p:ph idx="1"/>
-          </p:nvPr>
-        </p:nvSpPr>
-        <p:spPr/>
-        <p:txBody>
-          <a:bodyPr/>
-          <a:lstStyle/>
-          <a:p>
-            <a:r>
-              <a:rPr lang="en-US" dirty="0" smtClean="0"/>
-              <a:t>Why over-collateralization is not good:</a:t>
-            </a:r>
-          </a:p>
-          <a:p>
-            <a:pPr lvl="1"/>
-            <a:r>
-              <a:rPr lang="en-US" dirty="0" smtClean="0"/>
-              <a:t>Illiquid market</a:t>
-            </a:r>
-          </a:p>
-          <a:p>
-            <a:pPr lvl="2"/>
-            <a:r>
-              <a:rPr lang="en-US" dirty="0" smtClean="0"/>
-              <a:t>Auction values are not reflective of actual market value, but may include the cost of posting such collateral</a:t>
-            </a:r>
-          </a:p>
-          <a:p>
-            <a:pPr lvl="2"/>
-            <a:endParaRPr lang="en-US" dirty="0" smtClean="0"/>
-          </a:p>
-          <a:p>
-            <a:pPr lvl="1"/>
-            <a:r>
-              <a:rPr lang="en-US" dirty="0" smtClean="0"/>
-              <a:t>Inefficiency</a:t>
-            </a:r>
-          </a:p>
-          <a:p>
-            <a:pPr lvl="2"/>
-            <a:r>
-              <a:rPr lang="en-US" dirty="0" smtClean="0"/>
-              <a:t>Lack of </a:t>
-            </a:r>
-            <a:r>
-              <a:rPr lang="en-US" dirty="0" err="1" smtClean="0"/>
-              <a:t>counterflow</a:t>
-            </a:r>
-            <a:r>
-              <a:rPr lang="en-US" dirty="0" smtClean="0"/>
-              <a:t> bids may result in high clearing price on paths that affect binding constraints in the prevailing direction</a:t>
-            </a:r>
-            <a:endParaRPr lang="en-US" dirty="0"/>
-          </a:p>
-        </p:txBody>
-      </p:sp>
-      <p:sp>
-        <p:nvSpPr>
-          <p:cNvPr id="4" name="Date Placeholder 3"/>
-          <p:cNvSpPr>
-            <a:spLocks noGrp="1"/>
-          </p:cNvSpPr>
-          <p:nvPr>
-            <p:ph type="dt" sz="half" idx="10"/>
-          </p:nvPr>
-        </p:nvSpPr>
-        <p:spPr/>
-        <p:txBody>
-          <a:bodyPr/>
-          <a:lstStyle/>
-          <a:p>
-            <a:fld id="{02EE789E-1D84-4897-8ED5-C6C6A8AFBCC7}" type="datetime1">
-              <a:rPr lang="en-US" smtClean="0"/>
-              <a:t>5/15/2017</a:t>
-            </a:fld>
-            <a:endParaRPr lang="en-US"/>
-          </a:p>
-        </p:txBody>
-      </p:sp>
-      <p:sp>
-        <p:nvSpPr>
-          <p:cNvPr id="5" name="Slide Number Placeholder 4"/>
-          <p:cNvSpPr>
-            <a:spLocks noGrp="1"/>
-          </p:cNvSpPr>
-          <p:nvPr>
-            <p:ph type="sldNum" sz="quarter" idx="12"/>
-          </p:nvPr>
-        </p:nvSpPr>
-        <p:spPr/>
-        <p:txBody>
-          <a:bodyPr/>
-          <a:lstStyle/>
-          <a:p>
-            <a:fld id="{08ED2EC4-456D-42C8-8DCA-F679E5FEF3E2}" type="slidenum">
-              <a:rPr lang="en-US" smtClean="0"/>
-              <a:pPr/>
-              <a:t>2</a:t>
-            </a:fld>
-            <a:endParaRPr lang="en-US"/>
-          </a:p>
-        </p:txBody>
-      </p:sp>
-    </p:spTree>
-    <p:extLst>
-      <p:ext uri="{BB962C8B-B14F-4D97-AF65-F5344CB8AC3E}">
-        <p14:creationId xmlns:p14="http://schemas.microsoft.com/office/powerpoint/2010/main" val="481656138"/>
-      </p:ext>
-    </p:extLst>
-  </p:cSld>
-  <p:clrMapOvr>
-    <a:masterClrMapping/>
-  </p:clrMapOvr>
-  <p:timing>
-    <p:tnLst>
-      <p:par>
-        <p:cTn id="1" dur="indefinite" restart="never" nodeType="tmRoot"/>
-      </p:par>
-    </p:tnLst>
-  </p:timing>
-</p:sld>
-</file>
-
-<file path=ppt/slides/slide20.xml><?xml version="1.0" encoding="utf-8"?>
-<p:sld xmlns:a="http://schemas.openxmlformats.org/drawingml/2006/main" xmlns:r="http://schemas.openxmlformats.org/officeDocument/2006/relationships" xmlns:p="http://schemas.openxmlformats.org/presentationml/2006/main">
-  <p:cSld>
-    <p:spTree>
-      <p:nvGrpSpPr>
-        <p:cNvPr id="1" name=""/>
-        <p:cNvGrpSpPr/>
-        <p:nvPr/>
-      </p:nvGrpSpPr>
-      <p:grpSpPr>
-        <a:xfrm>
-          <a:off x="0" y="0"/>
-          <a:ext cx="0" cy="0"/>
-          <a:chOff x="0" y="0"/>
-          <a:chExt cx="0" cy="0"/>
-        </a:xfrm>
-      </p:grpSpPr>
-      <p:sp>
-        <p:nvSpPr>
-          <p:cNvPr id="2" name="Title 1"/>
-          <p:cNvSpPr>
-            <a:spLocks noGrp="1"/>
-          </p:cNvSpPr>
-          <p:nvPr>
-            <p:ph type="title"/>
-          </p:nvPr>
-        </p:nvSpPr>
-        <p:spPr/>
-        <p:txBody>
-          <a:bodyPr>
-            <a:normAutofit fontScale="90000"/>
-          </a:bodyPr>
-          <a:lstStyle/>
-          <a:p>
-            <a:r>
-              <a:rPr lang="en-US" dirty="0" err="1" smtClean="0"/>
-              <a:t>Backtesting</a:t>
-            </a:r>
-            <a:r>
-              <a:rPr lang="en-US" dirty="0" smtClean="0"/>
-              <a:t> Credit Requirements </a:t>
-            </a:r>
-            <a:br>
-              <a:rPr lang="en-US" dirty="0" smtClean="0"/>
-            </a:br>
-            <a:r>
-              <a:rPr lang="en-US" dirty="0" smtClean="0"/>
-              <a:t>of PY2016 Auction</a:t>
-            </a:r>
-            <a:endParaRPr lang="en-US" dirty="0"/>
-          </a:p>
-        </p:txBody>
-      </p:sp>
-      <p:sp>
-        <p:nvSpPr>
-          <p:cNvPr id="3" name="Content Placeholder 2"/>
-          <p:cNvSpPr>
-            <a:spLocks noGrp="1"/>
-          </p:cNvSpPr>
-          <p:nvPr>
-            <p:ph idx="1"/>
-          </p:nvPr>
-        </p:nvSpPr>
-        <p:spPr/>
-        <p:txBody>
-          <a:bodyPr/>
-          <a:lstStyle/>
-          <a:p>
-            <a:r>
-              <a:rPr lang="en-US" dirty="0" smtClean="0"/>
-              <a:t>Current Ref Price and the X%-tile </a:t>
-            </a:r>
-            <a:r>
-              <a:rPr lang="en-US" dirty="0" err="1" smtClean="0"/>
-              <a:t>WorstCase</a:t>
-            </a:r>
-            <a:r>
-              <a:rPr lang="en-US" dirty="0" smtClean="0"/>
-              <a:t> value. (test against the 5%-tile, 2%tile, and 1%tile)</a:t>
-            </a:r>
-            <a:endParaRPr lang="en-US" dirty="0"/>
-          </a:p>
-        </p:txBody>
-      </p:sp>
-      <p:sp>
-        <p:nvSpPr>
-          <p:cNvPr id="4" name="Slide Number Placeholder 3"/>
-          <p:cNvSpPr>
-            <a:spLocks noGrp="1"/>
-          </p:cNvSpPr>
-          <p:nvPr>
-            <p:ph type="sldNum" sz="quarter" idx="12"/>
-          </p:nvPr>
-        </p:nvSpPr>
-        <p:spPr/>
-        <p:txBody>
-          <a:bodyPr/>
-          <a:lstStyle/>
-          <a:p>
-            <a:fld id="{08ED2EC4-456D-42C8-8DCA-F679E5FEF3E2}" type="slidenum">
-              <a:rPr lang="en-US" smtClean="0"/>
-              <a:pPr/>
-              <a:t>20</a:t>
-            </a:fld>
-            <a:endParaRPr lang="en-US"/>
-          </a:p>
-        </p:txBody>
-      </p:sp>
-      <p:sp>
-        <p:nvSpPr>
-          <p:cNvPr id="5" name="Date Placeholder 4"/>
-          <p:cNvSpPr>
-            <a:spLocks noGrp="1"/>
-          </p:cNvSpPr>
-          <p:nvPr>
-            <p:ph type="dt" sz="half" idx="10"/>
-          </p:nvPr>
-        </p:nvSpPr>
-        <p:spPr/>
-        <p:txBody>
-          <a:bodyPr/>
-          <a:lstStyle/>
-          <a:p>
-            <a:fld id="{15F1E40C-1ADA-49EE-97E6-66D3E249BA19}" type="datetime1">
-              <a:rPr lang="en-US" smtClean="0"/>
-              <a:t>5/15/2017</a:t>
-            </a:fld>
-            <a:endParaRPr lang="en-US"/>
-          </a:p>
-        </p:txBody>
-      </p:sp>
-    </p:spTree>
-    <p:extLst>
-      <p:ext uri="{BB962C8B-B14F-4D97-AF65-F5344CB8AC3E}">
-        <p14:creationId xmlns:p14="http://schemas.microsoft.com/office/powerpoint/2010/main" val="721728523"/>
-      </p:ext>
-    </p:extLst>
-  </p:cSld>
-  <p:clrMapOvr>
-    <a:masterClrMapping/>
-  </p:clrMapOvr>
-</p:sld>
-</file>
-
-<file path=ppt/slides/slide21.xml><?xml version="1.0" encoding="utf-8"?>
-<p:sld xmlns:a="http://schemas.openxmlformats.org/drawingml/2006/main" xmlns:r="http://schemas.openxmlformats.org/officeDocument/2006/relationships" xmlns:p="http://schemas.openxmlformats.org/presentationml/2006/main">
-  <p:cSld>
-    <p:spTree>
-      <p:nvGrpSpPr>
-        <p:cNvPr id="1" name=""/>
-        <p:cNvGrpSpPr/>
-        <p:nvPr/>
-      </p:nvGrpSpPr>
-      <p:grpSpPr>
-        <a:xfrm>
-          <a:off x="0" y="0"/>
-          <a:ext cx="0" cy="0"/>
-          <a:chOff x="0" y="0"/>
-          <a:chExt cx="0" cy="0"/>
-        </a:xfrm>
-      </p:grpSpPr>
-      <p:sp>
-        <p:nvSpPr>
           <p:cNvPr id="5" name="Title 4"/>
           <p:cNvSpPr>
             <a:spLocks noGrp="1"/>
@@ -11557,7 +13836,7 @@
           <a:p>
             <a:fld id="{DE2C4BE6-EF26-45B8-903D-20D6902B7E3E}" type="datetime1">
               <a:rPr lang="en-US" smtClean="0"/>
-              <a:t>5/15/2017</a:t>
+              <a:t>5/17/2017</a:t>
             </a:fld>
             <a:endParaRPr lang="en-US"/>
           </a:p>
@@ -11581,7 +13860,7 @@
             <a:fld id="{08ED2EC4-456D-42C8-8DCA-F679E5FEF3E2}" type="slidenum">
               <a:rPr lang="en-US" smtClean="0"/>
               <a:pPr/>
-              <a:t>21</a:t>
+              <a:t>28</a:t>
             </a:fld>
             <a:endParaRPr lang="en-US"/>
           </a:p>
@@ -11607,7 +13886,7 @@
 </p:sld>
 </file>
 
-<file path=ppt/slides/slide22.xml><?xml version="1.0" encoding="utf-8"?>
+<file path=ppt/slides/slide29.xml><?xml version="1.0" encoding="utf-8"?>
 <p:sld xmlns:a="http://schemas.openxmlformats.org/drawingml/2006/main" xmlns:r="http://schemas.openxmlformats.org/officeDocument/2006/relationships" xmlns:p="http://schemas.openxmlformats.org/presentationml/2006/main">
   <p:cSld>
     <p:spTree>
@@ -11691,7 +13970,7 @@
           <a:p>
             <a:fld id="{5A4C56E2-66F2-44BA-B218-7B8216EFB5DF}" type="datetime1">
               <a:rPr lang="en-US" smtClean="0"/>
-              <a:t>5/15/2017</a:t>
+              <a:t>5/17/2017</a:t>
             </a:fld>
             <a:endParaRPr lang="en-US"/>
           </a:p>
@@ -11714,7 +13993,7 @@
           <a:p>
             <a:fld id="{08ED2EC4-456D-42C8-8DCA-F679E5FEF3E2}" type="slidenum">
               <a:rPr lang="en-US" smtClean="0"/>
-              <a:t>22</a:t>
+              <a:t>29</a:t>
             </a:fld>
             <a:endParaRPr lang="en-US"/>
           </a:p>
@@ -11740,7 +14019,7 @@
 </p:sld>
 </file>
 
-<file path=ppt/slides/slide23.xml><?xml version="1.0" encoding="utf-8"?>
+<file path=ppt/slides/slide3.xml><?xml version="1.0" encoding="utf-8"?>
 <p:sld xmlns:a="http://schemas.openxmlformats.org/drawingml/2006/main" xmlns:r="http://schemas.openxmlformats.org/officeDocument/2006/relationships" xmlns:p="http://schemas.openxmlformats.org/presentationml/2006/main">
   <p:cSld>
     <p:spTree>
@@ -11774,7 +14053,7 @@
           <a:p>
             <a:r>
               <a:rPr lang="en-US" dirty="0" smtClean="0"/>
-              <a:t>New Nodes</a:t>
+              <a:t>Principles</a:t>
             </a:r>
             <a:endParaRPr lang="en-US" dirty="0"/>
           </a:p>
@@ -11793,6 +14072,178 @@
         <p:spPr/>
         <p:txBody>
           <a:bodyPr>
+            <a:normAutofit/>
+          </a:bodyPr>
+          <a:lstStyle/>
+          <a:p>
+            <a:r>
+              <a:rPr lang="en-US" dirty="0" smtClean="0"/>
+              <a:t>Comply with FERC Order 741</a:t>
+            </a:r>
+            <a:br>
+              <a:rPr lang="en-US" dirty="0" smtClean="0"/>
+            </a:br>
+            <a:endParaRPr lang="en-US" dirty="0" smtClean="0"/>
+          </a:p>
+          <a:p>
+            <a:r>
+              <a:rPr lang="en-US" dirty="0" smtClean="0"/>
+              <a:t>Principles: </a:t>
+            </a:r>
+          </a:p>
+          <a:p>
+            <a:pPr marL="715566" lvl="1" indent="-457200">
+              <a:buFont typeface="+mj-lt"/>
+              <a:buAutoNum type="arabicPeriod"/>
+            </a:pPr>
+            <a:r>
+              <a:rPr lang="en-US" dirty="0" smtClean="0"/>
+              <a:t>More credit requirements with Increasing volatility</a:t>
+            </a:r>
+          </a:p>
+          <a:p>
+            <a:pPr marL="715566" lvl="1" indent="-457200">
+              <a:buFont typeface="+mj-lt"/>
+              <a:buAutoNum type="arabicPeriod"/>
+            </a:pPr>
+            <a:r>
+              <a:rPr lang="en-US" dirty="0" smtClean="0"/>
+              <a:t>More credit requirements with Increasing bids</a:t>
+            </a:r>
+            <a:endParaRPr lang="en-US" dirty="0"/>
+          </a:p>
+          <a:p>
+            <a:pPr marL="715566" lvl="1" indent="-457200">
+              <a:buFont typeface="+mj-lt"/>
+              <a:buAutoNum type="arabicPeriod"/>
+            </a:pPr>
+            <a:r>
+              <a:rPr lang="en-US" dirty="0" smtClean="0"/>
+              <a:t>For new nodes that lack historical data, credit calculation should use historical data of the closest nodes</a:t>
+            </a:r>
+          </a:p>
+        </p:txBody>
+      </p:sp>
+      <p:sp>
+        <p:nvSpPr>
+          <p:cNvPr id="4" name="Date Placeholder 3"/>
+          <p:cNvSpPr>
+            <a:spLocks noGrp="1"/>
+          </p:cNvSpPr>
+          <p:nvPr>
+            <p:ph type="dt" sz="half" idx="10"/>
+          </p:nvPr>
+        </p:nvSpPr>
+        <p:spPr/>
+        <p:txBody>
+          <a:bodyPr/>
+          <a:lstStyle/>
+          <a:p>
+            <a:fld id="{193E42F9-7246-46BA-ACFD-939E0BDD16E6}" type="datetime1">
+              <a:rPr lang="en-US" smtClean="0"/>
+              <a:t>5/17/2017</a:t>
+            </a:fld>
+            <a:endParaRPr lang="en-US"/>
+          </a:p>
+        </p:txBody>
+      </p:sp>
+      <p:sp>
+        <p:nvSpPr>
+          <p:cNvPr id="5" name="Slide Number Placeholder 4"/>
+          <p:cNvSpPr>
+            <a:spLocks noGrp="1"/>
+          </p:cNvSpPr>
+          <p:nvPr>
+            <p:ph type="sldNum" sz="quarter" idx="12"/>
+          </p:nvPr>
+        </p:nvSpPr>
+        <p:spPr/>
+        <p:txBody>
+          <a:bodyPr/>
+          <a:lstStyle/>
+          <a:p>
+            <a:fld id="{08ED2EC4-456D-42C8-8DCA-F679E5FEF3E2}" type="slidenum">
+              <a:rPr lang="en-US" smtClean="0"/>
+              <a:pPr/>
+              <a:t>3</a:t>
+            </a:fld>
+            <a:endParaRPr lang="en-US"/>
+          </a:p>
+        </p:txBody>
+      </p:sp>
+    </p:spTree>
+    <p:extLst>
+      <p:ext uri="{BB962C8B-B14F-4D97-AF65-F5344CB8AC3E}">
+        <p14:creationId xmlns:p14="http://schemas.microsoft.com/office/powerpoint/2010/main" val="4108458385"/>
+      </p:ext>
+    </p:extLst>
+  </p:cSld>
+  <p:clrMapOvr>
+    <a:masterClrMapping/>
+  </p:clrMapOvr>
+  <p:timing>
+    <p:tnLst>
+      <p:par>
+        <p:cTn id="1" dur="indefinite" restart="never" nodeType="tmRoot"/>
+      </p:par>
+    </p:tnLst>
+  </p:timing>
+</p:sld>
+</file>
+
+<file path=ppt/slides/slide30.xml><?xml version="1.0" encoding="utf-8"?>
+<p:sld xmlns:a="http://schemas.openxmlformats.org/drawingml/2006/main" xmlns:r="http://schemas.openxmlformats.org/officeDocument/2006/relationships" xmlns:p="http://schemas.openxmlformats.org/presentationml/2006/main">
+  <p:cSld>
+    <p:spTree>
+      <p:nvGrpSpPr>
+        <p:cNvPr id="1" name=""/>
+        <p:cNvGrpSpPr/>
+        <p:nvPr/>
+      </p:nvGrpSpPr>
+      <p:grpSpPr>
+        <a:xfrm>
+          <a:off x="0" y="0"/>
+          <a:ext cx="0" cy="0"/>
+          <a:chOff x="0" y="0"/>
+          <a:chExt cx="0" cy="0"/>
+        </a:xfrm>
+      </p:grpSpPr>
+      <p:sp>
+        <p:nvSpPr>
+          <p:cNvPr id="2" name="Title 1"/>
+          <p:cNvSpPr>
+            <a:spLocks noGrp="1"/>
+          </p:cNvSpPr>
+          <p:nvPr>
+            <p:ph type="title"/>
+          </p:nvPr>
+        </p:nvSpPr>
+        <p:spPr/>
+        <p:txBody>
+          <a:bodyPr/>
+          <a:lstStyle/>
+          <a:p>
+            <a:r>
+              <a:rPr lang="en-US" dirty="0" smtClean="0"/>
+              <a:t>New Nodes</a:t>
+            </a:r>
+            <a:endParaRPr lang="en-US" dirty="0"/>
+          </a:p>
+        </p:txBody>
+      </p:sp>
+      <p:sp>
+        <p:nvSpPr>
+          <p:cNvPr id="3" name="Content Placeholder 2"/>
+          <p:cNvSpPr>
+            <a:spLocks noGrp="1"/>
+          </p:cNvSpPr>
+          <p:nvPr>
+            <p:ph idx="1"/>
+          </p:nvPr>
+        </p:nvSpPr>
+        <p:spPr/>
+        <p:txBody>
+          <a:bodyPr>
             <a:normAutofit fontScale="92500" lnSpcReduction="20000"/>
           </a:bodyPr>
           <a:lstStyle/>
@@ -11865,7 +14316,7 @@
           <a:p>
             <a:fld id="{EA5AFDA7-7CB9-4939-983D-F402B7996BDF}" type="datetime1">
               <a:rPr lang="en-US" smtClean="0"/>
-              <a:t>5/15/2017</a:t>
+              <a:t>5/17/2017</a:t>
             </a:fld>
             <a:endParaRPr lang="en-US"/>
           </a:p>
@@ -11889,7 +14340,7 @@
             <a:fld id="{08ED2EC4-456D-42C8-8DCA-F679E5FEF3E2}" type="slidenum">
               <a:rPr lang="en-US" smtClean="0"/>
               <a:pPr/>
-              <a:t>23</a:t>
+              <a:t>30</a:t>
             </a:fld>
             <a:endParaRPr lang="en-US"/>
           </a:p>
@@ -12060,7 +14511,7 @@
 </p:sld>
 </file>
 
-<file path=ppt/slides/slide24.xml><?xml version="1.0" encoding="utf-8"?>
+<file path=ppt/slides/slide31.xml><?xml version="1.0" encoding="utf-8"?>
 <p:sld xmlns:a="http://schemas.openxmlformats.org/drawingml/2006/main" xmlns:r="http://schemas.openxmlformats.org/officeDocument/2006/relationships" xmlns:p="http://schemas.openxmlformats.org/presentationml/2006/main">
   <p:cSld>
     <p:spTree>
@@ -12079,6 +14530,32 @@
       </p:grpSpPr>
       <p:sp>
         <p:nvSpPr>
+          <p:cNvPr id="8" name="Content Placeholder 7"/>
+          <p:cNvSpPr>
+            <a:spLocks noGrp="1"/>
+          </p:cNvSpPr>
+          <p:nvPr>
+            <p:ph idx="1"/>
+          </p:nvPr>
+        </p:nvSpPr>
+        <p:spPr/>
+        <p:txBody>
+          <a:bodyPr/>
+          <a:lstStyle/>
+          <a:p>
+            <a:r>
+              <a:rPr lang="en-US" dirty="0" smtClean="0"/>
+              <a:t>Over / Under collateralization on paths that </a:t>
+            </a:r>
+            <a:r>
+              <a:rPr lang="en-US" dirty="0"/>
+              <a:t>are flagged with YEAR_1_PROXY_PRICE_IND</a:t>
+            </a:r>
+          </a:p>
+        </p:txBody>
+      </p:sp>
+      <p:sp>
+        <p:nvSpPr>
           <p:cNvPr id="2" name="Title 1"/>
           <p:cNvSpPr>
             <a:spLocks noGrp="1"/>
@@ -12094,6 +14571,659 @@
           <a:p>
             <a:r>
               <a:rPr lang="en-US" dirty="0" smtClean="0"/>
+              <a:t>If we look at the new paths</a:t>
+            </a:r>
+            <a:endParaRPr lang="en-US" dirty="0"/>
+          </a:p>
+        </p:txBody>
+      </p:sp>
+      <p:sp>
+        <p:nvSpPr>
+          <p:cNvPr id="4" name="Slide Number Placeholder 3"/>
+          <p:cNvSpPr>
+            <a:spLocks noGrp="1"/>
+          </p:cNvSpPr>
+          <p:nvPr>
+            <p:ph type="sldNum" sz="quarter" idx="12"/>
+          </p:nvPr>
+        </p:nvSpPr>
+        <p:spPr/>
+        <p:txBody>
+          <a:bodyPr/>
+          <a:lstStyle/>
+          <a:p>
+            <a:fld id="{08ED2EC4-456D-42C8-8DCA-F679E5FEF3E2}" type="slidenum">
+              <a:rPr lang="en-US" smtClean="0"/>
+              <a:pPr/>
+              <a:t>31</a:t>
+            </a:fld>
+            <a:endParaRPr lang="en-US"/>
+          </a:p>
+        </p:txBody>
+      </p:sp>
+      <p:sp>
+        <p:nvSpPr>
+          <p:cNvPr id="5" name="Date Placeholder 4"/>
+          <p:cNvSpPr>
+            <a:spLocks noGrp="1"/>
+          </p:cNvSpPr>
+          <p:nvPr>
+            <p:ph type="dt" sz="half" idx="10"/>
+          </p:nvPr>
+        </p:nvSpPr>
+        <p:spPr/>
+        <p:txBody>
+          <a:bodyPr/>
+          <a:lstStyle/>
+          <a:p>
+            <a:fld id="{15F1E40C-1ADA-49EE-97E6-66D3E249BA19}" type="datetime1">
+              <a:rPr lang="en-US" smtClean="0"/>
+              <a:t>5/17/2017</a:t>
+            </a:fld>
+            <a:endParaRPr lang="en-US"/>
+          </a:p>
+        </p:txBody>
+      </p:sp>
+      <p:graphicFrame>
+        <p:nvGraphicFramePr>
+          <p:cNvPr id="7" name="Table 6"/>
+          <p:cNvGraphicFramePr>
+            <a:graphicFrameLocks noGrp="1"/>
+          </p:cNvGraphicFramePr>
+          <p:nvPr>
+            <p:extLst>
+              <p:ext uri="{D42A27DB-BD31-4B8C-83A1-F6EECF244321}">
+                <p14:modId xmlns:p14="http://schemas.microsoft.com/office/powerpoint/2010/main" val="1692110231"/>
+              </p:ext>
+            </p:extLst>
+          </p:nvPr>
+        </p:nvGraphicFramePr>
+        <p:xfrm>
+          <a:off x="1320800" y="2929465"/>
+          <a:ext cx="6908801" cy="2048936"/>
+        </p:xfrm>
+        <a:graphic>
+          <a:graphicData uri="http://schemas.openxmlformats.org/drawingml/2006/table">
+            <a:tbl>
+              <a:tblPr firstRow="1" firstCol="1">
+                <a:tableStyleId>{9D7B26C5-4107-4FEC-AEDC-1716B250A1EF}</a:tableStyleId>
+              </a:tblPr>
+              <a:tblGrid>
+                <a:gridCol w="2035515">
+                  <a:extLst>
+                    <a:ext uri="{9D8B030D-6E8A-4147-A177-3AD203B41FA5}">
+                      <a16:colId xmlns:a16="http://schemas.microsoft.com/office/drawing/2014/main" val="2796128852"/>
+                    </a:ext>
+                  </a:extLst>
+                </a:gridCol>
+                <a:gridCol w="1523436">
+                  <a:extLst>
+                    <a:ext uri="{9D8B030D-6E8A-4147-A177-3AD203B41FA5}">
+                      <a16:colId xmlns:a16="http://schemas.microsoft.com/office/drawing/2014/main" val="2556144078"/>
+                    </a:ext>
+                  </a:extLst>
+                </a:gridCol>
+                <a:gridCol w="1536237">
+                  <a:extLst>
+                    <a:ext uri="{9D8B030D-6E8A-4147-A177-3AD203B41FA5}">
+                      <a16:colId xmlns:a16="http://schemas.microsoft.com/office/drawing/2014/main" val="173229078"/>
+                    </a:ext>
+                  </a:extLst>
+                </a:gridCol>
+                <a:gridCol w="955881">
+                  <a:extLst>
+                    <a:ext uri="{9D8B030D-6E8A-4147-A177-3AD203B41FA5}">
+                      <a16:colId xmlns:a16="http://schemas.microsoft.com/office/drawing/2014/main" val="37624267"/>
+                    </a:ext>
+                  </a:extLst>
+                </a:gridCol>
+                <a:gridCol w="857732">
+                  <a:extLst>
+                    <a:ext uri="{9D8B030D-6E8A-4147-A177-3AD203B41FA5}">
+                      <a16:colId xmlns:a16="http://schemas.microsoft.com/office/drawing/2014/main" val="961931367"/>
+                    </a:ext>
+                  </a:extLst>
+                </a:gridCol>
+              </a:tblGrid>
+              <a:tr h="869114">
+                <a:tc>
+                  <a:txBody>
+                    <a:bodyPr/>
+                    <a:lstStyle/>
+                    <a:p>
+                      <a:pPr algn="l" fontAlgn="b"/>
+                      <a:r>
+                        <a:rPr lang="en-US" sz="1400" u="none" strike="noStrike">
+                          <a:effectLst/>
+                        </a:rPr>
+                        <a:t>Method</a:t>
+                      </a:r>
+                      <a:endParaRPr lang="en-US" sz="1400" b="0" i="0" u="none" strike="noStrike">
+                        <a:solidFill>
+                          <a:srgbClr val="000000"/>
+                        </a:solidFill>
+                        <a:effectLst/>
+                        <a:latin typeface="Calibri" panose="020F0502020204030204" pitchFamily="34" charset="0"/>
+                      </a:endParaRPr>
+                    </a:p>
+                  </a:txBody>
+                  <a:tcPr marL="11714" marR="11714" marT="11714" marB="0" anchor="b"/>
+                </a:tc>
+                <a:tc>
+                  <a:txBody>
+                    <a:bodyPr/>
+                    <a:lstStyle/>
+                    <a:p>
+                      <a:pPr algn="l" fontAlgn="b"/>
+                      <a:r>
+                        <a:rPr lang="en-US" sz="1400" u="none" strike="noStrike" dirty="0">
+                          <a:effectLst/>
+                        </a:rPr>
+                        <a:t>Over-Collateralization ($)</a:t>
+                      </a:r>
+                      <a:endParaRPr lang="en-US" sz="1400" b="0" i="0" u="none" strike="noStrike" dirty="0">
+                        <a:solidFill>
+                          <a:srgbClr val="000000"/>
+                        </a:solidFill>
+                        <a:effectLst/>
+                        <a:latin typeface="Calibri" panose="020F0502020204030204" pitchFamily="34" charset="0"/>
+                      </a:endParaRPr>
+                    </a:p>
+                  </a:txBody>
+                  <a:tcPr marL="11714" marR="11714" marT="11714" marB="0" anchor="b"/>
+                </a:tc>
+                <a:tc>
+                  <a:txBody>
+                    <a:bodyPr/>
+                    <a:lstStyle/>
+                    <a:p>
+                      <a:pPr algn="l" fontAlgn="b"/>
+                      <a:r>
+                        <a:rPr lang="en-US" sz="1400" u="none" strike="noStrike" dirty="0">
+                          <a:effectLst/>
+                        </a:rPr>
+                        <a:t>Under-Collateralization ($)</a:t>
+                      </a:r>
+                      <a:endParaRPr lang="en-US" sz="1400" b="0" i="0" u="none" strike="noStrike" dirty="0">
+                        <a:solidFill>
+                          <a:srgbClr val="000000"/>
+                        </a:solidFill>
+                        <a:effectLst/>
+                        <a:latin typeface="Calibri" panose="020F0502020204030204" pitchFamily="34" charset="0"/>
+                      </a:endParaRPr>
+                    </a:p>
+                  </a:txBody>
+                  <a:tcPr marL="11714" marR="11714" marT="11714" marB="0" anchor="b"/>
+                </a:tc>
+                <a:tc>
+                  <a:txBody>
+                    <a:bodyPr/>
+                    <a:lstStyle/>
+                    <a:p>
+                      <a:pPr algn="l" fontAlgn="b"/>
+                      <a:r>
+                        <a:rPr lang="en-US" sz="1400" u="none" strike="noStrike" dirty="0">
+                          <a:effectLst/>
+                        </a:rPr>
+                        <a:t>Over-Collateralization #Bids</a:t>
+                      </a:r>
+                      <a:endParaRPr lang="en-US" sz="1400" b="0" i="0" u="none" strike="noStrike" dirty="0">
+                        <a:solidFill>
+                          <a:srgbClr val="000000"/>
+                        </a:solidFill>
+                        <a:effectLst/>
+                        <a:latin typeface="Calibri" panose="020F0502020204030204" pitchFamily="34" charset="0"/>
+                      </a:endParaRPr>
+                    </a:p>
+                  </a:txBody>
+                  <a:tcPr marL="11714" marR="11714" marT="11714" marB="0" anchor="b"/>
+                </a:tc>
+                <a:tc>
+                  <a:txBody>
+                    <a:bodyPr/>
+                    <a:lstStyle/>
+                    <a:p>
+                      <a:pPr algn="l" fontAlgn="b"/>
+                      <a:r>
+                        <a:rPr lang="en-US" sz="1400" u="none" strike="noStrike">
+                          <a:effectLst/>
+                        </a:rPr>
+                        <a:t>Under-Collateralization #Bids</a:t>
+                      </a:r>
+                      <a:endParaRPr lang="en-US" sz="1400" b="0" i="0" u="none" strike="noStrike">
+                        <a:solidFill>
+                          <a:srgbClr val="000000"/>
+                        </a:solidFill>
+                        <a:effectLst/>
+                        <a:latin typeface="Calibri" panose="020F0502020204030204" pitchFamily="34" charset="0"/>
+                      </a:endParaRPr>
+                    </a:p>
+                  </a:txBody>
+                  <a:tcPr marL="11714" marR="11714" marT="11714" marB="0" anchor="b"/>
+                </a:tc>
+                <a:extLst>
+                  <a:ext uri="{0D108BD9-81ED-4DB2-BD59-A6C34878D82A}">
+                    <a16:rowId xmlns:a16="http://schemas.microsoft.com/office/drawing/2014/main" val="621872839"/>
+                  </a:ext>
+                </a:extLst>
+              </a:tr>
+              <a:tr h="393274">
+                <a:tc>
+                  <a:txBody>
+                    <a:bodyPr/>
+                    <a:lstStyle/>
+                    <a:p>
+                      <a:pPr algn="l" fontAlgn="b"/>
+                      <a:r>
+                        <a:rPr lang="en-US" sz="1400" u="none" strike="noStrike">
+                          <a:effectLst/>
+                        </a:rPr>
+                        <a:t>CreditRequired</a:t>
+                      </a:r>
+                      <a:endParaRPr lang="en-US" sz="1400" b="0" i="0" u="none" strike="noStrike">
+                        <a:solidFill>
+                          <a:srgbClr val="000000"/>
+                        </a:solidFill>
+                        <a:effectLst/>
+                        <a:latin typeface="Calibri" panose="020F0502020204030204" pitchFamily="34" charset="0"/>
+                      </a:endParaRPr>
+                    </a:p>
+                  </a:txBody>
+                  <a:tcPr marL="11714" marR="11714" marT="11714" marB="0" anchor="b"/>
+                </a:tc>
+                <a:tc>
+                  <a:txBody>
+                    <a:bodyPr/>
+                    <a:lstStyle/>
+                    <a:p>
+                      <a:pPr algn="l" fontAlgn="b"/>
+                      <a:r>
+                        <a:rPr lang="en-US" sz="1400" u="none" strike="noStrike">
+                          <a:effectLst/>
+                        </a:rPr>
+                        <a:t> $          (14,433,413)</a:t>
+                      </a:r>
+                      <a:endParaRPr lang="en-US" sz="1400" b="0" i="0" u="none" strike="noStrike">
+                        <a:solidFill>
+                          <a:srgbClr val="000000"/>
+                        </a:solidFill>
+                        <a:effectLst/>
+                        <a:latin typeface="Calibri" panose="020F0502020204030204" pitchFamily="34" charset="0"/>
+                      </a:endParaRPr>
+                    </a:p>
+                  </a:txBody>
+                  <a:tcPr marL="11714" marR="11714" marT="11714" marB="0" anchor="b"/>
+                </a:tc>
+                <a:tc>
+                  <a:txBody>
+                    <a:bodyPr/>
+                    <a:lstStyle/>
+                    <a:p>
+                      <a:pPr algn="l" fontAlgn="b"/>
+                      <a:r>
+                        <a:rPr lang="en-US" sz="1400" u="none" strike="noStrike" dirty="0">
+                          <a:effectLst/>
+                        </a:rPr>
+                        <a:t> $               3,699,350 </a:t>
+                      </a:r>
+                      <a:endParaRPr lang="en-US" sz="1400" b="0" i="0" u="none" strike="noStrike" dirty="0">
+                        <a:solidFill>
+                          <a:srgbClr val="000000"/>
+                        </a:solidFill>
+                        <a:effectLst/>
+                        <a:latin typeface="Calibri" panose="020F0502020204030204" pitchFamily="34" charset="0"/>
+                      </a:endParaRPr>
+                    </a:p>
+                  </a:txBody>
+                  <a:tcPr marL="11714" marR="11714" marT="11714" marB="0" anchor="b"/>
+                </a:tc>
+                <a:tc>
+                  <a:txBody>
+                    <a:bodyPr/>
+                    <a:lstStyle/>
+                    <a:p>
+                      <a:pPr algn="l" fontAlgn="b"/>
+                      <a:r>
+                        <a:rPr lang="en-US" sz="1400" u="none" strike="noStrike">
+                          <a:effectLst/>
+                        </a:rPr>
+                        <a:t>           2,995 </a:t>
+                      </a:r>
+                      <a:endParaRPr lang="en-US" sz="1400" b="0" i="0" u="none" strike="noStrike">
+                        <a:solidFill>
+                          <a:srgbClr val="000000"/>
+                        </a:solidFill>
+                        <a:effectLst/>
+                        <a:latin typeface="Calibri" panose="020F0502020204030204" pitchFamily="34" charset="0"/>
+                      </a:endParaRPr>
+                    </a:p>
+                  </a:txBody>
+                  <a:tcPr marL="11714" marR="11714" marT="11714" marB="0" anchor="b"/>
+                </a:tc>
+                <a:tc>
+                  <a:txBody>
+                    <a:bodyPr/>
+                    <a:lstStyle/>
+                    <a:p>
+                      <a:pPr algn="l" fontAlgn="b"/>
+                      <a:r>
+                        <a:rPr lang="en-US" sz="1400" u="none" strike="noStrike">
+                          <a:effectLst/>
+                        </a:rPr>
+                        <a:t>            680 </a:t>
+                      </a:r>
+                      <a:endParaRPr lang="en-US" sz="1400" b="0" i="0" u="none" strike="noStrike">
+                        <a:solidFill>
+                          <a:srgbClr val="000000"/>
+                        </a:solidFill>
+                        <a:effectLst/>
+                        <a:latin typeface="Calibri" panose="020F0502020204030204" pitchFamily="34" charset="0"/>
+                      </a:endParaRPr>
+                    </a:p>
+                  </a:txBody>
+                  <a:tcPr marL="11714" marR="11714" marT="11714" marB="0" anchor="b"/>
+                </a:tc>
+                <a:extLst>
+                  <a:ext uri="{0D108BD9-81ED-4DB2-BD59-A6C34878D82A}">
+                    <a16:rowId xmlns:a16="http://schemas.microsoft.com/office/drawing/2014/main" val="2227301275"/>
+                  </a:ext>
+                </a:extLst>
+              </a:tr>
+              <a:tr h="393274">
+                <a:tc>
+                  <a:txBody>
+                    <a:bodyPr/>
+                    <a:lstStyle/>
+                    <a:p>
+                      <a:pPr algn="l" fontAlgn="b"/>
+                      <a:r>
+                        <a:rPr lang="en-US" sz="1400" u="none" strike="noStrike">
+                          <a:effectLst/>
+                        </a:rPr>
+                        <a:t>CreditRequiredStats05</a:t>
+                      </a:r>
+                      <a:endParaRPr lang="en-US" sz="1400" b="0" i="0" u="none" strike="noStrike">
+                        <a:solidFill>
+                          <a:srgbClr val="000000"/>
+                        </a:solidFill>
+                        <a:effectLst/>
+                        <a:latin typeface="Calibri" panose="020F0502020204030204" pitchFamily="34" charset="0"/>
+                      </a:endParaRPr>
+                    </a:p>
+                  </a:txBody>
+                  <a:tcPr marL="11714" marR="11714" marT="11714" marB="0" anchor="b"/>
+                </a:tc>
+                <a:tc>
+                  <a:txBody>
+                    <a:bodyPr/>
+                    <a:lstStyle/>
+                    <a:p>
+                      <a:pPr algn="l" fontAlgn="b"/>
+                      <a:r>
+                        <a:rPr lang="en-US" sz="1400" u="none" strike="noStrike">
+                          <a:effectLst/>
+                        </a:rPr>
+                        <a:t> $            (7,200,098)</a:t>
+                      </a:r>
+                      <a:endParaRPr lang="en-US" sz="1400" b="0" i="0" u="none" strike="noStrike">
+                        <a:solidFill>
+                          <a:srgbClr val="000000"/>
+                        </a:solidFill>
+                        <a:effectLst/>
+                        <a:latin typeface="Calibri" panose="020F0502020204030204" pitchFamily="34" charset="0"/>
+                      </a:endParaRPr>
+                    </a:p>
+                  </a:txBody>
+                  <a:tcPr marL="11714" marR="11714" marT="11714" marB="0" anchor="b"/>
+                </a:tc>
+                <a:tc>
+                  <a:txBody>
+                    <a:bodyPr/>
+                    <a:lstStyle/>
+                    <a:p>
+                      <a:pPr algn="l" fontAlgn="b"/>
+                      <a:r>
+                        <a:rPr lang="en-US" sz="1400" u="none" strike="noStrike">
+                          <a:effectLst/>
+                        </a:rPr>
+                        <a:t> $               4,071,253 </a:t>
+                      </a:r>
+                      <a:endParaRPr lang="en-US" sz="1400" b="0" i="0" u="none" strike="noStrike">
+                        <a:solidFill>
+                          <a:srgbClr val="000000"/>
+                        </a:solidFill>
+                        <a:effectLst/>
+                        <a:latin typeface="Calibri" panose="020F0502020204030204" pitchFamily="34" charset="0"/>
+                      </a:endParaRPr>
+                    </a:p>
+                  </a:txBody>
+                  <a:tcPr marL="11714" marR="11714" marT="11714" marB="0" anchor="b"/>
+                </a:tc>
+                <a:tc>
+                  <a:txBody>
+                    <a:bodyPr/>
+                    <a:lstStyle/>
+                    <a:p>
+                      <a:pPr algn="l" fontAlgn="b"/>
+                      <a:r>
+                        <a:rPr lang="en-US" sz="1400" u="none" strike="noStrike">
+                          <a:effectLst/>
+                        </a:rPr>
+                        <a:t>           2,476 </a:t>
+                      </a:r>
+                      <a:endParaRPr lang="en-US" sz="1400" b="0" i="0" u="none" strike="noStrike">
+                        <a:solidFill>
+                          <a:srgbClr val="000000"/>
+                        </a:solidFill>
+                        <a:effectLst/>
+                        <a:latin typeface="Calibri" panose="020F0502020204030204" pitchFamily="34" charset="0"/>
+                      </a:endParaRPr>
+                    </a:p>
+                  </a:txBody>
+                  <a:tcPr marL="11714" marR="11714" marT="11714" marB="0" anchor="b"/>
+                </a:tc>
+                <a:tc>
+                  <a:txBody>
+                    <a:bodyPr/>
+                    <a:lstStyle/>
+                    <a:p>
+                      <a:pPr algn="l" fontAlgn="b"/>
+                      <a:r>
+                        <a:rPr lang="en-US" sz="1400" u="none" strike="noStrike">
+                          <a:effectLst/>
+                        </a:rPr>
+                        <a:t>            813 </a:t>
+                      </a:r>
+                      <a:endParaRPr lang="en-US" sz="1400" b="0" i="0" u="none" strike="noStrike">
+                        <a:solidFill>
+                          <a:srgbClr val="000000"/>
+                        </a:solidFill>
+                        <a:effectLst/>
+                        <a:latin typeface="Calibri" panose="020F0502020204030204" pitchFamily="34" charset="0"/>
+                      </a:endParaRPr>
+                    </a:p>
+                  </a:txBody>
+                  <a:tcPr marL="11714" marR="11714" marT="11714" marB="0" anchor="b"/>
+                </a:tc>
+                <a:extLst>
+                  <a:ext uri="{0D108BD9-81ED-4DB2-BD59-A6C34878D82A}">
+                    <a16:rowId xmlns:a16="http://schemas.microsoft.com/office/drawing/2014/main" val="3703654352"/>
+                  </a:ext>
+                </a:extLst>
+              </a:tr>
+              <a:tr h="393274">
+                <a:tc>
+                  <a:txBody>
+                    <a:bodyPr/>
+                    <a:lstStyle/>
+                    <a:p>
+                      <a:pPr algn="l" fontAlgn="b"/>
+                      <a:r>
+                        <a:rPr lang="en-US" sz="1400" u="none" strike="noStrike">
+                          <a:effectLst/>
+                        </a:rPr>
+                        <a:t>CreditRequiredStats02</a:t>
+                      </a:r>
+                      <a:endParaRPr lang="en-US" sz="1400" b="0" i="0" u="none" strike="noStrike">
+                        <a:solidFill>
+                          <a:srgbClr val="000000"/>
+                        </a:solidFill>
+                        <a:effectLst/>
+                        <a:latin typeface="Calibri" panose="020F0502020204030204" pitchFamily="34" charset="0"/>
+                      </a:endParaRPr>
+                    </a:p>
+                  </a:txBody>
+                  <a:tcPr marL="11714" marR="11714" marT="11714" marB="0" anchor="b"/>
+                </a:tc>
+                <a:tc>
+                  <a:txBody>
+                    <a:bodyPr/>
+                    <a:lstStyle/>
+                    <a:p>
+                      <a:pPr algn="l" fontAlgn="b"/>
+                      <a:r>
+                        <a:rPr lang="en-US" sz="1400" u="none" strike="noStrike">
+                          <a:effectLst/>
+                        </a:rPr>
+                        <a:t> $            (7,545,183)</a:t>
+                      </a:r>
+                      <a:endParaRPr lang="en-US" sz="1400" b="0" i="0" u="none" strike="noStrike">
+                        <a:solidFill>
+                          <a:srgbClr val="000000"/>
+                        </a:solidFill>
+                        <a:effectLst/>
+                        <a:latin typeface="Calibri" panose="020F0502020204030204" pitchFamily="34" charset="0"/>
+                      </a:endParaRPr>
+                    </a:p>
+                  </a:txBody>
+                  <a:tcPr marL="11714" marR="11714" marT="11714" marB="0" anchor="b"/>
+                </a:tc>
+                <a:tc>
+                  <a:txBody>
+                    <a:bodyPr/>
+                    <a:lstStyle/>
+                    <a:p>
+                      <a:pPr algn="l" fontAlgn="b"/>
+                      <a:r>
+                        <a:rPr lang="en-US" sz="1400" u="none" strike="noStrike">
+                          <a:effectLst/>
+                        </a:rPr>
+                        <a:t> $               4,040,428 </a:t>
+                      </a:r>
+                      <a:endParaRPr lang="en-US" sz="1400" b="0" i="0" u="none" strike="noStrike">
+                        <a:solidFill>
+                          <a:srgbClr val="000000"/>
+                        </a:solidFill>
+                        <a:effectLst/>
+                        <a:latin typeface="Calibri" panose="020F0502020204030204" pitchFamily="34" charset="0"/>
+                      </a:endParaRPr>
+                    </a:p>
+                  </a:txBody>
+                  <a:tcPr marL="11714" marR="11714" marT="11714" marB="0" anchor="b"/>
+                </a:tc>
+                <a:tc>
+                  <a:txBody>
+                    <a:bodyPr/>
+                    <a:lstStyle/>
+                    <a:p>
+                      <a:pPr algn="l" fontAlgn="b"/>
+                      <a:r>
+                        <a:rPr lang="en-US" sz="1400" u="none" strike="noStrike">
+                          <a:effectLst/>
+                        </a:rPr>
+                        <a:t>           2,490 </a:t>
+                      </a:r>
+                      <a:endParaRPr lang="en-US" sz="1400" b="0" i="0" u="none" strike="noStrike">
+                        <a:solidFill>
+                          <a:srgbClr val="000000"/>
+                        </a:solidFill>
+                        <a:effectLst/>
+                        <a:latin typeface="Calibri" panose="020F0502020204030204" pitchFamily="34" charset="0"/>
+                      </a:endParaRPr>
+                    </a:p>
+                  </a:txBody>
+                  <a:tcPr marL="11714" marR="11714" marT="11714" marB="0" anchor="b"/>
+                </a:tc>
+                <a:tc>
+                  <a:txBody>
+                    <a:bodyPr/>
+                    <a:lstStyle/>
+                    <a:p>
+                      <a:pPr algn="l" fontAlgn="b"/>
+                      <a:r>
+                        <a:rPr lang="en-US" sz="1400" u="none" strike="noStrike" dirty="0">
+                          <a:effectLst/>
+                        </a:rPr>
+                        <a:t>            808 </a:t>
+                      </a:r>
+                      <a:endParaRPr lang="en-US" sz="1400" b="0" i="0" u="none" strike="noStrike" dirty="0">
+                        <a:solidFill>
+                          <a:srgbClr val="000000"/>
+                        </a:solidFill>
+                        <a:effectLst/>
+                        <a:latin typeface="Calibri" panose="020F0502020204030204" pitchFamily="34" charset="0"/>
+                      </a:endParaRPr>
+                    </a:p>
+                  </a:txBody>
+                  <a:tcPr marL="11714" marR="11714" marT="11714" marB="0" anchor="b"/>
+                </a:tc>
+                <a:extLst>
+                  <a:ext uri="{0D108BD9-81ED-4DB2-BD59-A6C34878D82A}">
+                    <a16:rowId xmlns:a16="http://schemas.microsoft.com/office/drawing/2014/main" val="2731337277"/>
+                  </a:ext>
+                </a:extLst>
+              </a:tr>
+            </a:tbl>
+          </a:graphicData>
+        </a:graphic>
+      </p:graphicFrame>
+    </p:spTree>
+    <p:extLst>
+      <p:ext uri="{BB962C8B-B14F-4D97-AF65-F5344CB8AC3E}">
+        <p14:creationId xmlns:p14="http://schemas.microsoft.com/office/powerpoint/2010/main" val="2027370204"/>
+      </p:ext>
+    </p:extLst>
+  </p:cSld>
+  <p:clrMapOvr>
+    <a:masterClrMapping/>
+  </p:clrMapOvr>
+</p:sld>
+</file>
+
+<file path=ppt/slides/slide32.xml><?xml version="1.0" encoding="utf-8"?>
+<p:sld xmlns:a="http://schemas.openxmlformats.org/drawingml/2006/main" xmlns:r="http://schemas.openxmlformats.org/officeDocument/2006/relationships" xmlns:p="http://schemas.openxmlformats.org/presentationml/2006/main">
+  <p:cSld>
+    <p:spTree>
+      <p:nvGrpSpPr>
+        <p:cNvPr id="1" name=""/>
+        <p:cNvGrpSpPr/>
+        <p:nvPr/>
+      </p:nvGrpSpPr>
+      <p:grpSpPr>
+        <a:xfrm>
+          <a:off x="0" y="0"/>
+          <a:ext cx="0" cy="0"/>
+          <a:chOff x="0" y="0"/>
+          <a:chExt cx="0" cy="0"/>
+        </a:xfrm>
+      </p:grpSpPr>
+      <p:sp>
+        <p:nvSpPr>
+          <p:cNvPr id="2" name="Title 1"/>
+          <p:cNvSpPr>
+            <a:spLocks noGrp="1"/>
+          </p:cNvSpPr>
+          <p:nvPr>
+            <p:ph type="title"/>
+          </p:nvPr>
+        </p:nvSpPr>
+        <p:spPr/>
+        <p:txBody>
+          <a:bodyPr/>
+          <a:lstStyle/>
+          <a:p>
+            <a:r>
+              <a:rPr lang="en-US" dirty="0" smtClean="0"/>
               <a:t>Proposal #2</a:t>
             </a:r>
             <a:endParaRPr lang="en-US" dirty="0"/>
@@ -12149,7 +15279,7 @@
           <a:p>
             <a:fld id="{99D11DF9-A47C-497D-9422-A14D7972A9CD}" type="datetime1">
               <a:rPr lang="en-US" smtClean="0"/>
-              <a:t>5/15/2017</a:t>
+              <a:t>5/17/2017</a:t>
             </a:fld>
             <a:endParaRPr lang="en-US"/>
           </a:p>
@@ -12173,7 +15303,7 @@
             <a:fld id="{08ED2EC4-456D-42C8-8DCA-F679E5FEF3E2}" type="slidenum">
               <a:rPr lang="en-US" smtClean="0"/>
               <a:pPr/>
-              <a:t>24</a:t>
+              <a:t>32</a:t>
             </a:fld>
             <a:endParaRPr lang="en-US"/>
           </a:p>
@@ -12199,7 +15329,7 @@
 </p:sld>
 </file>
 
-<file path=ppt/slides/slide25.xml><?xml version="1.0" encoding="utf-8"?>
+<file path=ppt/slides/slide33.xml><?xml version="1.0" encoding="utf-8"?>
 <p:sld xmlns:a="http://schemas.openxmlformats.org/drawingml/2006/main" xmlns:r="http://schemas.openxmlformats.org/officeDocument/2006/relationships" xmlns:p="http://schemas.openxmlformats.org/presentationml/2006/main">
   <p:cSld>
     <p:spTree>
@@ -12327,7 +15457,7 @@
             <a:fld id="{08ED2EC4-456D-42C8-8DCA-F679E5FEF3E2}" type="slidenum">
               <a:rPr lang="en-US" smtClean="0"/>
               <a:pPr/>
-              <a:t>25</a:t>
+              <a:t>33</a:t>
             </a:fld>
             <a:endParaRPr lang="en-US"/>
           </a:p>
@@ -12350,7 +15480,7 @@
           <a:p>
             <a:fld id="{15F1E40C-1ADA-49EE-97E6-66D3E249BA19}" type="datetime1">
               <a:rPr lang="en-US" smtClean="0"/>
-              <a:t>5/15/2017</a:t>
+              <a:t>5/17/2017</a:t>
             </a:fld>
             <a:endParaRPr lang="en-US"/>
           </a:p>
@@ -12376,7 +15506,7 @@
 </p:sld>
 </file>
 
-<file path=ppt/slides/slide26.xml><?xml version="1.0" encoding="utf-8"?>
+<file path=ppt/slides/slide34.xml><?xml version="1.0" encoding="utf-8"?>
 <p:sld xmlns:a="http://schemas.openxmlformats.org/drawingml/2006/main" xmlns:r="http://schemas.openxmlformats.org/officeDocument/2006/relationships" xmlns:p="http://schemas.openxmlformats.org/presentationml/2006/main">
   <p:cSld>
     <p:spTree>
@@ -12452,7 +15582,7 @@
           <a:p>
             <a:fld id="{1B53BFA5-37C2-4F38-A422-53BB79326F92}" type="datetime1">
               <a:rPr lang="en-US" smtClean="0"/>
-              <a:t>5/15/2017</a:t>
+              <a:t>5/17/2017</a:t>
             </a:fld>
             <a:endParaRPr lang="en-US"/>
           </a:p>
@@ -12475,7 +15605,7 @@
           <a:p>
             <a:fld id="{08ED2EC4-456D-42C8-8DCA-F679E5FEF3E2}" type="slidenum">
               <a:rPr lang="en-US" smtClean="0"/>
-              <a:t>26</a:t>
+              <a:t>34</a:t>
             </a:fld>
             <a:endParaRPr lang="en-US"/>
           </a:p>
@@ -12501,7 +15631,7 @@
 </p:sld>
 </file>
 
-<file path=ppt/slides/slide27.xml><?xml version="1.0" encoding="utf-8"?>
+<file path=ppt/slides/slide35.xml><?xml version="1.0" encoding="utf-8"?>
 <p:sld xmlns:a="http://schemas.openxmlformats.org/drawingml/2006/main" xmlns:r="http://schemas.openxmlformats.org/officeDocument/2006/relationships" xmlns:p="http://schemas.openxmlformats.org/presentationml/2006/main">
   <p:cSld>
     <p:spTree>
@@ -12948,7 +16078,7 @@
           <a:p>
             <a:fld id="{8F44D27A-E4D6-48B7-8B9F-A8B1DD49F081}" type="datetime1">
               <a:rPr lang="en-US" smtClean="0"/>
-              <a:t>5/15/2017</a:t>
+              <a:t>5/17/2017</a:t>
             </a:fld>
             <a:endParaRPr lang="en-US"/>
           </a:p>
@@ -12971,7 +16101,7 @@
           <a:p>
             <a:fld id="{08ED2EC4-456D-42C8-8DCA-F679E5FEF3E2}" type="slidenum">
               <a:rPr lang="en-US" smtClean="0"/>
-              <a:t>27</a:t>
+              <a:t>35</a:t>
             </a:fld>
             <a:endParaRPr lang="en-US"/>
           </a:p>
@@ -12997,7 +16127,7 @@
 </p:sld>
 </file>
 
-<file path=ppt/slides/slide28.xml><?xml version="1.0" encoding="utf-8"?>
+<file path=ppt/slides/slide36.xml><?xml version="1.0" encoding="utf-8"?>
 <p:sld xmlns:a="http://schemas.openxmlformats.org/drawingml/2006/main" xmlns:r="http://schemas.openxmlformats.org/officeDocument/2006/relationships" xmlns:p="http://schemas.openxmlformats.org/presentationml/2006/main">
   <p:cSld>
     <p:spTree>
@@ -13458,7 +16588,7 @@
           <a:p>
             <a:fld id="{F7E66C20-724A-4125-9A6E-398B354EF203}" type="datetime1">
               <a:rPr lang="en-US" smtClean="0"/>
-              <a:t>5/15/2017</a:t>
+              <a:t>5/17/2017</a:t>
             </a:fld>
             <a:endParaRPr lang="en-US"/>
           </a:p>
@@ -13481,7 +16611,7 @@
           <a:p>
             <a:fld id="{08ED2EC4-456D-42C8-8DCA-F679E5FEF3E2}" type="slidenum">
               <a:rPr lang="en-US" smtClean="0"/>
-              <a:t>28</a:t>
+              <a:t>36</a:t>
             </a:fld>
             <a:endParaRPr lang="en-US"/>
           </a:p>
@@ -13507,7 +16637,7 @@
 </p:sld>
 </file>
 
-<file path=ppt/slides/slide29.xml><?xml version="1.0" encoding="utf-8"?>
+<file path=ppt/slides/slide37.xml><?xml version="1.0" encoding="utf-8"?>
 <p:sld xmlns:a="http://schemas.openxmlformats.org/drawingml/2006/main" xmlns:r="http://schemas.openxmlformats.org/officeDocument/2006/relationships" xmlns:p="http://schemas.openxmlformats.org/presentationml/2006/main">
   <p:cSld>
     <p:spTree>
@@ -13840,7 +16970,7 @@
           <a:p>
             <a:fld id="{3A23D5B7-62B4-4A7D-9111-6530A6D3FDBF}" type="datetime1">
               <a:rPr lang="en-US" smtClean="0"/>
-              <a:t>5/15/2017</a:t>
+              <a:t>5/17/2017</a:t>
             </a:fld>
             <a:endParaRPr lang="en-US"/>
           </a:p>
@@ -13863,7 +16993,7 @@
           <a:p>
             <a:fld id="{08ED2EC4-456D-42C8-8DCA-F679E5FEF3E2}" type="slidenum">
               <a:rPr lang="en-US" smtClean="0"/>
-              <a:t>29</a:t>
+              <a:t>37</a:t>
             </a:fld>
             <a:endParaRPr lang="en-US"/>
           </a:p>
@@ -13873,178 +17003,6 @@
     <p:extLst>
       <p:ext uri="{BB962C8B-B14F-4D97-AF65-F5344CB8AC3E}">
         <p14:creationId xmlns:p14="http://schemas.microsoft.com/office/powerpoint/2010/main" val="3582641026"/>
-      </p:ext>
-    </p:extLst>
-  </p:cSld>
-  <p:clrMapOvr>
-    <a:masterClrMapping/>
-  </p:clrMapOvr>
-  <p:timing>
-    <p:tnLst>
-      <p:par>
-        <p:cTn id="1" dur="indefinite" restart="never" nodeType="tmRoot"/>
-      </p:par>
-    </p:tnLst>
-  </p:timing>
-</p:sld>
-</file>
-
-<file path=ppt/slides/slide3.xml><?xml version="1.0" encoding="utf-8"?>
-<p:sld xmlns:a="http://schemas.openxmlformats.org/drawingml/2006/main" xmlns:r="http://schemas.openxmlformats.org/officeDocument/2006/relationships" xmlns:p="http://schemas.openxmlformats.org/presentationml/2006/main">
-  <p:cSld>
-    <p:spTree>
-      <p:nvGrpSpPr>
-        <p:cNvPr id="1" name=""/>
-        <p:cNvGrpSpPr/>
-        <p:nvPr/>
-      </p:nvGrpSpPr>
-      <p:grpSpPr>
-        <a:xfrm>
-          <a:off x="0" y="0"/>
-          <a:ext cx="0" cy="0"/>
-          <a:chOff x="0" y="0"/>
-          <a:chExt cx="0" cy="0"/>
-        </a:xfrm>
-      </p:grpSpPr>
-      <p:sp>
-        <p:nvSpPr>
-          <p:cNvPr id="2" name="Title 1"/>
-          <p:cNvSpPr>
-            <a:spLocks noGrp="1"/>
-          </p:cNvSpPr>
-          <p:nvPr>
-            <p:ph type="title"/>
-          </p:nvPr>
-        </p:nvSpPr>
-        <p:spPr/>
-        <p:txBody>
-          <a:bodyPr/>
-          <a:lstStyle/>
-          <a:p>
-            <a:r>
-              <a:rPr lang="en-US" dirty="0" smtClean="0"/>
-              <a:t>Principles</a:t>
-            </a:r>
-            <a:endParaRPr lang="en-US" dirty="0"/>
-          </a:p>
-        </p:txBody>
-      </p:sp>
-      <p:sp>
-        <p:nvSpPr>
-          <p:cNvPr id="3" name="Content Placeholder 2"/>
-          <p:cNvSpPr>
-            <a:spLocks noGrp="1"/>
-          </p:cNvSpPr>
-          <p:nvPr>
-            <p:ph idx="1"/>
-          </p:nvPr>
-        </p:nvSpPr>
-        <p:spPr/>
-        <p:txBody>
-          <a:bodyPr>
-            <a:normAutofit/>
-          </a:bodyPr>
-          <a:lstStyle/>
-          <a:p>
-            <a:r>
-              <a:rPr lang="en-US" dirty="0" smtClean="0"/>
-              <a:t>Comply with FERC Order 741</a:t>
-            </a:r>
-            <a:br>
-              <a:rPr lang="en-US" dirty="0" smtClean="0"/>
-            </a:br>
-            <a:endParaRPr lang="en-US" dirty="0" smtClean="0"/>
-          </a:p>
-          <a:p>
-            <a:r>
-              <a:rPr lang="en-US" dirty="0" smtClean="0"/>
-              <a:t>Principles: </a:t>
-            </a:r>
-          </a:p>
-          <a:p>
-            <a:pPr marL="715566" lvl="1" indent="-457200">
-              <a:buFont typeface="+mj-lt"/>
-              <a:buAutoNum type="arabicPeriod"/>
-            </a:pPr>
-            <a:r>
-              <a:rPr lang="en-US" dirty="0" smtClean="0"/>
-              <a:t>More credit requirements with Increasing volatility</a:t>
-            </a:r>
-          </a:p>
-          <a:p>
-            <a:pPr marL="715566" lvl="1" indent="-457200">
-              <a:buFont typeface="+mj-lt"/>
-              <a:buAutoNum type="arabicPeriod"/>
-            </a:pPr>
-            <a:r>
-              <a:rPr lang="en-US" dirty="0" smtClean="0"/>
-              <a:t>More credit requirements with Increasing bids</a:t>
-            </a:r>
-            <a:endParaRPr lang="en-US" dirty="0"/>
-          </a:p>
-          <a:p>
-            <a:pPr marL="715566" lvl="1" indent="-457200">
-              <a:buFont typeface="+mj-lt"/>
-              <a:buAutoNum type="arabicPeriod"/>
-            </a:pPr>
-            <a:r>
-              <a:rPr lang="en-US" dirty="0" smtClean="0"/>
-              <a:t>For new nodes that lack historical data, credit calculation should use historical data of the closest nodes</a:t>
-            </a:r>
-          </a:p>
-        </p:txBody>
-      </p:sp>
-      <p:sp>
-        <p:nvSpPr>
-          <p:cNvPr id="4" name="Date Placeholder 3"/>
-          <p:cNvSpPr>
-            <a:spLocks noGrp="1"/>
-          </p:cNvSpPr>
-          <p:nvPr>
-            <p:ph type="dt" sz="half" idx="10"/>
-          </p:nvPr>
-        </p:nvSpPr>
-        <p:spPr/>
-        <p:txBody>
-          <a:bodyPr/>
-          <a:lstStyle/>
-          <a:p>
-            <a:fld id="{193E42F9-7246-46BA-ACFD-939E0BDD16E6}" type="datetime1">
-              <a:rPr lang="en-US" smtClean="0"/>
-              <a:t>5/15/2017</a:t>
-            </a:fld>
-            <a:endParaRPr lang="en-US"/>
-          </a:p>
-        </p:txBody>
-      </p:sp>
-      <p:sp>
-        <p:nvSpPr>
-          <p:cNvPr id="5" name="Slide Number Placeholder 4"/>
-          <p:cNvSpPr>
-            <a:spLocks noGrp="1"/>
-          </p:cNvSpPr>
-          <p:nvPr>
-            <p:ph type="sldNum" sz="quarter" idx="12"/>
-          </p:nvPr>
-        </p:nvSpPr>
-        <p:spPr/>
-        <p:txBody>
-          <a:bodyPr/>
-          <a:lstStyle/>
-          <a:p>
-            <a:fld id="{08ED2EC4-456D-42C8-8DCA-F679E5FEF3E2}" type="slidenum">
-              <a:rPr lang="en-US" smtClean="0"/>
-              <a:pPr/>
-              <a:t>3</a:t>
-            </a:fld>
-            <a:endParaRPr lang="en-US"/>
-          </a:p>
-        </p:txBody>
-      </p:sp>
-    </p:spTree>
-    <p:extLst>
-      <p:ext uri="{BB962C8B-B14F-4D97-AF65-F5344CB8AC3E}">
-        <p14:creationId xmlns:p14="http://schemas.microsoft.com/office/powerpoint/2010/main" val="4108458385"/>
       </p:ext>
     </p:extLst>
   </p:cSld>
@@ -14460,7 +17418,7 @@
           <a:p>
             <a:fld id="{02509BB5-7594-4E2C-AD31-6E71F932CBD5}" type="datetime1">
               <a:rPr lang="en-US" smtClean="0"/>
-              <a:t>5/15/2017</a:t>
+              <a:t>5/17/2017</a:t>
             </a:fld>
             <a:endParaRPr lang="en-US"/>
           </a:p>
@@ -15084,7 +18042,7 @@
           <a:p>
             <a:fld id="{73654314-6442-4A30-BD0E-D5CFC826B6F6}" type="datetime1">
               <a:rPr lang="en-US" smtClean="0"/>
-              <a:t>5/15/2017</a:t>
+              <a:t>5/17/2017</a:t>
             </a:fld>
             <a:endParaRPr lang="en-US"/>
           </a:p>
@@ -15236,7 +18194,7 @@
           <a:p>
             <a:fld id="{CD9BA50C-F3CE-4421-AF99-B3B8738D4AEB}" type="datetime1">
               <a:rPr lang="en-US" smtClean="0"/>
-              <a:t>5/15/2017</a:t>
+              <a:t>5/17/2017</a:t>
             </a:fld>
             <a:endParaRPr lang="en-US"/>
           </a:p>
@@ -17186,7 +20144,7 @@
           <a:p>
             <a:fld id="{3CDEAFCB-6FD7-45C9-8EAC-D20D6E1B8ED5}" type="datetime1">
               <a:rPr lang="en-US" smtClean="0"/>
-              <a:t>5/15/2017</a:t>
+              <a:t>5/17/2017</a:t>
             </a:fld>
             <a:endParaRPr lang="en-US"/>
           </a:p>
@@ -17462,7 +20420,7 @@
           <a:p>
             <a:fld id="{CB0C22E2-02EF-4C49-AD7F-87037CC0F4DE}" type="datetime1">
               <a:rPr lang="en-US" smtClean="0"/>
-              <a:t>5/15/2017</a:t>
+              <a:t>5/17/2017</a:t>
             </a:fld>
             <a:endParaRPr lang="en-US"/>
           </a:p>
@@ -17648,7 +20606,7 @@
           <a:p>
             <a:fld id="{46ED6C3A-6D6B-41C7-990B-03054BDE5A6E}" type="datetime1">
               <a:rPr lang="en-US" smtClean="0"/>
-              <a:t>5/15/2017</a:t>
+              <a:t>5/17/2017</a:t>
             </a:fld>
             <a:endParaRPr lang="en-US"/>
           </a:p>

</xml_diff>

<commit_message>
remove a line that does not quite make sense on the concluding remarks / observation slide.
</commit_message>
<xml_diff>
--- a/ppt/SPP TCR Reference Price Calculation.pptx
+++ b/ppt/SPP TCR Reference Price Calculation.pptx
@@ -14998,13 +14998,8 @@
             </a:r>
             <a:r>
               <a:rPr lang="en-US" dirty="0" smtClean="0"/>
-              <a:t>Participants over-collateralization: </a:t>
-            </a:r>
-            <a:r>
-              <a:rPr lang="en-US" dirty="0" smtClean="0"/>
-              <a:t>$44,967,333</a:t>
-            </a:r>
-            <a:endParaRPr lang="en-US" dirty="0" smtClean="0"/>
+              <a:t>Participants over-collateralization: $44,967,333</a:t>
+            </a:r>
           </a:p>
           <a:p>
             <a:pPr lvl="1"/>
@@ -15020,19 +15015,13 @@
               <a:rPr lang="en-US" dirty="0" smtClean="0"/>
               <a:t>9,046,537</a:t>
             </a:r>
-            <a:endParaRPr lang="en-US" dirty="0" smtClean="0"/>
           </a:p>
           <a:p>
             <a:pPr lvl="1"/>
             <a:r>
               <a:rPr lang="en-US" dirty="0" smtClean="0"/>
-              <a:t>Or a ratio of </a:t>
-            </a:r>
-            <a:r>
-              <a:rPr lang="en-US" dirty="0" smtClean="0"/>
-              <a:t>5.0</a:t>
-            </a:r>
-            <a:endParaRPr lang="en-US" dirty="0" smtClean="0"/>
+              <a:t>Or a ratio of 5.0</a:t>
+            </a:r>
           </a:p>
           <a:p>
             <a:r>
@@ -15044,11 +15033,7 @@
             <a:pPr lvl="1"/>
             <a:r>
               <a:rPr lang="en-US" dirty="0" smtClean="0"/>
-              <a:t>A ratio of </a:t>
-            </a:r>
-            <a:r>
-              <a:rPr lang="en-US" dirty="0" smtClean="0"/>
-              <a:t>4.8</a:t>
+              <a:t>A ratio of 4.8</a:t>
             </a:r>
             <a:endParaRPr lang="en-US" dirty="0"/>
           </a:p>
@@ -15869,7 +15854,7 @@
         <p:spPr/>
         <p:txBody>
           <a:bodyPr>
-            <a:normAutofit fontScale="85000" lnSpcReduction="20000"/>
+            <a:normAutofit fontScale="85000" lnSpcReduction="10000"/>
           </a:bodyPr>
           <a:lstStyle/>
           <a:p>
@@ -15925,14 +15910,11 @@
             <a:pPr lvl="2"/>
             <a:r>
               <a:rPr lang="en-US" dirty="0" smtClean="0"/>
-              <a:t>Deviations are not due to the method to arrive to a reference price, but rather it is due to the changes in the network topology.</a:t>
-            </a:r>
-          </a:p>
-          <a:p>
-            <a:pPr lvl="2"/>
+              <a:t>Over-Under </a:t>
+            </a:r>
             <a:r>
               <a:rPr lang="en-US" dirty="0" smtClean="0"/>
-              <a:t>Over-Under Collateralization Charts for all periods are included in the Appendix section.</a:t>
+              <a:t>Collateralization Charts for all periods are included in the Appendix section.</a:t>
             </a:r>
           </a:p>
           <a:p>

</xml_diff>